<commit_message>
Update CseGe Kft prototype.pptx and CseGe Kft prototype angol.pptx
Co-authored-by: Cursor <cursoragent@cursor.com>
</commit_message>
<xml_diff>
--- a/CseGe Kft prototype angol.pptx
+++ b/CseGe Kft prototype angol.pptx
@@ -8070,7 +8070,7 @@
   <dgm:whole/>
   <dgm:extLst>
     <a:ext uri="http://schemas.microsoft.com/office/drawing/2008/diagram">
-      <dsp:dataModelExt xmlns:dsp="http://schemas.microsoft.com/office/drawing/2008/diagram" relId="rId7" minVer="http://schemas.openxmlformats.org/drawingml/2006/diagram"/>
+      <dsp:dataModelExt xmlns:dsp="http://schemas.microsoft.com/office/drawing/2008/diagram" relId="rId6" minVer="http://schemas.openxmlformats.org/drawingml/2006/diagram"/>
     </a:ext>
   </dgm:extLst>
 </dgm:dataModel>
@@ -22457,7 +22457,7 @@
           <a:p>
             <a:fld id="{7739F995-2A69-754E-9252-9A6746B31172}" type="datetimeFigureOut">
               <a:rPr lang="hu-HU" smtClean="0"/>
-              <a:t>2026. 02. 19.</a:t>
+              <a:t>2026. 02. 23.</a:t>
             </a:fld>
             <a:endParaRPr lang="hu-HU"/>
           </a:p>
@@ -23123,7 +23123,7 @@
           <a:p>
             <a:fld id="{C1F1339E-E161-F24A-B4B5-7BC3AF4BBE53}" type="datetimeFigureOut">
               <a:rPr lang="hu-HU" smtClean="0"/>
-              <a:t>2026. 02. 19.</a:t>
+              <a:t>2026. 02. 23.</a:t>
             </a:fld>
             <a:endParaRPr lang="hu-HU"/>
           </a:p>
@@ -23321,7 +23321,7 @@
           <a:p>
             <a:fld id="{C1F1339E-E161-F24A-B4B5-7BC3AF4BBE53}" type="datetimeFigureOut">
               <a:rPr lang="hu-HU" smtClean="0"/>
-              <a:t>2026. 02. 19.</a:t>
+              <a:t>2026. 02. 23.</a:t>
             </a:fld>
             <a:endParaRPr lang="hu-HU"/>
           </a:p>
@@ -23529,7 +23529,7 @@
           <a:p>
             <a:fld id="{C1F1339E-E161-F24A-B4B5-7BC3AF4BBE53}" type="datetimeFigureOut">
               <a:rPr lang="hu-HU" smtClean="0"/>
-              <a:t>2026. 02. 19.</a:t>
+              <a:t>2026. 02. 23.</a:t>
             </a:fld>
             <a:endParaRPr lang="hu-HU"/>
           </a:p>
@@ -23727,7 +23727,7 @@
           <a:p>
             <a:fld id="{C1F1339E-E161-F24A-B4B5-7BC3AF4BBE53}" type="datetimeFigureOut">
               <a:rPr lang="hu-HU" smtClean="0"/>
-              <a:t>2026. 02. 19.</a:t>
+              <a:t>2026. 02. 23.</a:t>
             </a:fld>
             <a:endParaRPr lang="hu-HU"/>
           </a:p>
@@ -24002,7 +24002,7 @@
           <a:p>
             <a:fld id="{C1F1339E-E161-F24A-B4B5-7BC3AF4BBE53}" type="datetimeFigureOut">
               <a:rPr lang="hu-HU" smtClean="0"/>
-              <a:t>2026. 02. 19.</a:t>
+              <a:t>2026. 02. 23.</a:t>
             </a:fld>
             <a:endParaRPr lang="hu-HU"/>
           </a:p>
@@ -24267,7 +24267,7 @@
           <a:p>
             <a:fld id="{C1F1339E-E161-F24A-B4B5-7BC3AF4BBE53}" type="datetimeFigureOut">
               <a:rPr lang="hu-HU" smtClean="0"/>
-              <a:t>2026. 02. 19.</a:t>
+              <a:t>2026. 02. 23.</a:t>
             </a:fld>
             <a:endParaRPr lang="hu-HU"/>
           </a:p>
@@ -24679,7 +24679,7 @@
           <a:p>
             <a:fld id="{C1F1339E-E161-F24A-B4B5-7BC3AF4BBE53}" type="datetimeFigureOut">
               <a:rPr lang="hu-HU" smtClean="0"/>
-              <a:t>2026. 02. 19.</a:t>
+              <a:t>2026. 02. 23.</a:t>
             </a:fld>
             <a:endParaRPr lang="hu-HU"/>
           </a:p>
@@ -24820,7 +24820,7 @@
           <a:p>
             <a:fld id="{C1F1339E-E161-F24A-B4B5-7BC3AF4BBE53}" type="datetimeFigureOut">
               <a:rPr lang="hu-HU" smtClean="0"/>
-              <a:t>2026. 02. 19.</a:t>
+              <a:t>2026. 02. 23.</a:t>
             </a:fld>
             <a:endParaRPr lang="hu-HU"/>
           </a:p>
@@ -24933,7 +24933,7 @@
           <a:p>
             <a:fld id="{C1F1339E-E161-F24A-B4B5-7BC3AF4BBE53}" type="datetimeFigureOut">
               <a:rPr lang="hu-HU" smtClean="0"/>
-              <a:t>2026. 02. 19.</a:t>
+              <a:t>2026. 02. 23.</a:t>
             </a:fld>
             <a:endParaRPr lang="hu-HU"/>
           </a:p>
@@ -25244,7 +25244,7 @@
           <a:p>
             <a:fld id="{C1F1339E-E161-F24A-B4B5-7BC3AF4BBE53}" type="datetimeFigureOut">
               <a:rPr lang="hu-HU" smtClean="0"/>
-              <a:t>2026. 02. 19.</a:t>
+              <a:t>2026. 02. 23.</a:t>
             </a:fld>
             <a:endParaRPr lang="hu-HU"/>
           </a:p>
@@ -25532,7 +25532,7 @@
           <a:p>
             <a:fld id="{C1F1339E-E161-F24A-B4B5-7BC3AF4BBE53}" type="datetimeFigureOut">
               <a:rPr lang="hu-HU" smtClean="0"/>
-              <a:t>2026. 02. 19.</a:t>
+              <a:t>2026. 02. 23.</a:t>
             </a:fld>
             <a:endParaRPr lang="hu-HU"/>
           </a:p>
@@ -25773,7 +25773,7 @@
           <a:p>
             <a:fld id="{C1F1339E-E161-F24A-B4B5-7BC3AF4BBE53}" type="datetimeFigureOut">
               <a:rPr lang="hu-HU" smtClean="0"/>
-              <a:t>2026. 02. 19.</a:t>
+              <a:t>2026. 02. 23.</a:t>
             </a:fld>
             <a:endParaRPr lang="hu-HU"/>
           </a:p>
@@ -31341,72 +31341,6 @@
       </p:grpSpPr>
       <p:sp>
         <p:nvSpPr>
-          <p:cNvPr id="2" name="Cím 1">
-            <a:extLst>
-              <a:ext uri="{FF2B5EF4-FFF2-40B4-BE49-F238E27FC236}">
-                <a16:creationId xmlns:a16="http://schemas.microsoft.com/office/drawing/2014/main" id="{9647EE7C-5BB4-67D8-AE97-7475AD4C61D8}"/>
-              </a:ext>
-            </a:extLst>
-          </p:cNvPr>
-          <p:cNvSpPr>
-            <a:spLocks noGrp="1"/>
-          </p:cNvSpPr>
-          <p:nvPr>
-            <p:ph type="title"/>
-          </p:nvPr>
-        </p:nvSpPr>
-        <p:spPr>
-          <a:xfrm>
-            <a:off x="6417733" y="490537"/>
-            <a:ext cx="5291663" cy="1628775"/>
-          </a:xfrm>
-        </p:spPr>
-        <p:txBody>
-          <a:bodyPr anchor="b">
-            <a:normAutofit/>
-          </a:bodyPr>
-          <a:lstStyle/>
-          <a:p>
-            <a:r>
-              <a:rPr lang="hu-HU" sz="4000"/>
-              <a:t>Mi az a JIRA?</a:t>
-            </a:r>
-            <a:endParaRPr lang="hu-HU" sz="4000" dirty="0"/>
-          </a:p>
-        </p:txBody>
-      </p:sp>
-      <p:pic>
-        <p:nvPicPr>
-          <p:cNvPr id="6" name="Kép 5">
-            <a:extLst>
-              <a:ext uri="{FF2B5EF4-FFF2-40B4-BE49-F238E27FC236}">
-                <a16:creationId xmlns:a16="http://schemas.microsoft.com/office/drawing/2014/main" id="{87BFFC00-06EE-0639-0A40-E5ED723E6250}"/>
-              </a:ext>
-            </a:extLst>
-          </p:cNvPr>
-          <p:cNvPicPr>
-            <a:picLocks noChangeAspect="1"/>
-          </p:cNvPicPr>
-          <p:nvPr/>
-        </p:nvPicPr>
-        <p:blipFill>
-          <a:blip r:embed="rId2"/>
-          <a:stretch>
-            <a:fillRect/>
-          </a:stretch>
-        </p:blipFill>
-        <p:spPr>
-          <a:xfrm>
-            <a:off x="2628900" y="0"/>
-            <a:ext cx="6934200" cy="3746853"/>
-          </a:xfrm>
-          <a:prstGeom prst="rect">
-            <a:avLst/>
-          </a:prstGeom>
-        </p:spPr>
-      </p:pic>
-      <p:sp>
-        <p:nvSpPr>
           <p:cNvPr id="13" name="Cím 1">
             <a:extLst>
               <a:ext uri="{FF2B5EF4-FFF2-40B4-BE49-F238E27FC236}">
@@ -31498,10 +31432,65 @@
         </p:xfrm>
         <a:graphic>
           <a:graphicData uri="http://schemas.openxmlformats.org/drawingml/2006/diagram">
-            <dgm:relIds xmlns:dgm="http://schemas.openxmlformats.org/drawingml/2006/diagram" xmlns:r="http://schemas.openxmlformats.org/officeDocument/2006/relationships" r:dm="rId3" r:lo="rId4" r:qs="rId5" r:cs="rId6"/>
+            <dgm:relIds xmlns:dgm="http://schemas.openxmlformats.org/drawingml/2006/diagram" xmlns:r="http://schemas.openxmlformats.org/officeDocument/2006/relationships" r:dm="rId2" r:lo="rId3" r:qs="rId4" r:cs="rId5"/>
           </a:graphicData>
         </a:graphic>
       </p:graphicFrame>
+      <p:sp>
+        <p:nvSpPr>
+          <p:cNvPr id="5" name="Cím 4">
+            <a:extLst>
+              <a:ext uri="{FF2B5EF4-FFF2-40B4-BE49-F238E27FC236}">
+                <a16:creationId xmlns:a16="http://schemas.microsoft.com/office/drawing/2014/main" id="{7E680038-B466-6AF7-EE82-C05E6837DA6A}"/>
+              </a:ext>
+            </a:extLst>
+          </p:cNvPr>
+          <p:cNvSpPr>
+            <a:spLocks noGrp="1"/>
+          </p:cNvSpPr>
+          <p:nvPr>
+            <p:ph type="title"/>
+          </p:nvPr>
+        </p:nvSpPr>
+        <p:spPr/>
+        <p:txBody>
+          <a:bodyPr/>
+          <a:lstStyle/>
+          <a:p>
+            <a:endParaRPr lang="hu-HU"/>
+          </a:p>
+        </p:txBody>
+      </p:sp>
+      <p:pic>
+        <p:nvPicPr>
+          <p:cNvPr id="7" name="Kép 6">
+            <a:extLst>
+              <a:ext uri="{FF2B5EF4-FFF2-40B4-BE49-F238E27FC236}">
+                <a16:creationId xmlns:a16="http://schemas.microsoft.com/office/drawing/2014/main" id="{17A6657F-CF29-FDBE-9794-B6317FE35802}"/>
+              </a:ext>
+            </a:extLst>
+          </p:cNvPr>
+          <p:cNvPicPr>
+            <a:picLocks noChangeAspect="1"/>
+          </p:cNvPicPr>
+          <p:nvPr/>
+        </p:nvPicPr>
+        <p:blipFill>
+          <a:blip r:embed="rId7"/>
+          <a:stretch>
+            <a:fillRect/>
+          </a:stretch>
+        </p:blipFill>
+        <p:spPr>
+          <a:xfrm>
+            <a:off x="2566907" y="0"/>
+            <a:ext cx="7058186" cy="3809179"/>
+          </a:xfrm>
+          <a:prstGeom prst="rect">
+            <a:avLst/>
+          </a:prstGeom>
+        </p:spPr>
+      </p:pic>
     </p:spTree>
     <p:extLst>
       <p:ext uri="{BB962C8B-B14F-4D97-AF65-F5344CB8AC3E}">

</xml_diff>

<commit_message>
Update docs: presentations and Dokumentáció_Ramriders
Made-with: Cursor
</commit_message>
<xml_diff>
--- a/CseGe Kft prototype angol.pptx
+++ b/CseGe Kft prototype angol.pptx
@@ -5,7 +5,7 @@
     <p:sldMasterId id="2147483648" r:id="rId1"/>
   </p:sldMasterIdLst>
   <p:notesMasterIdLst>
-    <p:notesMasterId r:id="rId19"/>
+    <p:notesMasterId r:id="rId21"/>
   </p:notesMasterIdLst>
   <p:sldIdLst>
     <p:sldId id="258" r:id="rId2"/>
@@ -24,7 +24,9 @@
     <p:sldId id="277" r:id="rId15"/>
     <p:sldId id="278" r:id="rId16"/>
     <p:sldId id="272" r:id="rId17"/>
-    <p:sldId id="271" r:id="rId18"/>
+    <p:sldId id="280" r:id="rId18"/>
+    <p:sldId id="271" r:id="rId19"/>
+    <p:sldId id="279" r:id="rId20"/>
   </p:sldIdLst>
   <p:sldSz cx="12192000" cy="6858000"/>
   <p:notesSz cx="6858000" cy="9144000"/>
@@ -4735,6 +4737,757 @@
   <dgm:styleLbl name="revTx">
     <dgm:fillClrLst meth="repeat">
       <a:schemeClr val="lt1">
+        <a:alpha val="0"/>
+      </a:schemeClr>
+    </dgm:fillClrLst>
+    <dgm:linClrLst meth="repeat">
+      <a:schemeClr val="dk1">
+        <a:alpha val="0"/>
+      </a:schemeClr>
+    </dgm:linClrLst>
+    <dgm:effectClrLst/>
+    <dgm:txLinClrLst/>
+    <dgm:txFillClrLst meth="repeat">
+      <a:schemeClr val="tx1"/>
+    </dgm:txFillClrLst>
+    <dgm:txEffectClrLst/>
+  </dgm:styleLbl>
+</dgm:colorsDef>
+</file>
+
+<file path=ppt/diagrams/colors7.xml><?xml version="1.0" encoding="utf-8"?>
+<dgm:colorsDef xmlns:dgm="http://schemas.openxmlformats.org/drawingml/2006/diagram" xmlns:a="http://schemas.openxmlformats.org/drawingml/2006/main" uniqueId="urn:microsoft.com/office/officeart/2005/8/colors/accent0_3">
+  <dgm:title val=""/>
+  <dgm:desc val=""/>
+  <dgm:catLst>
+    <dgm:cat type="mainScheme" pri="10300"/>
+  </dgm:catLst>
+  <dgm:styleLbl name="node0">
+    <dgm:fillClrLst meth="repeat">
+      <a:schemeClr val="dk2"/>
+    </dgm:fillClrLst>
+    <dgm:linClrLst meth="repeat">
+      <a:schemeClr val="lt2"/>
+    </dgm:linClrLst>
+    <dgm:effectClrLst/>
+    <dgm:txLinClrLst/>
+    <dgm:txFillClrLst/>
+    <dgm:txEffectClrLst/>
+  </dgm:styleLbl>
+  <dgm:styleLbl name="alignNode1">
+    <dgm:fillClrLst meth="repeat">
+      <a:schemeClr val="dk2"/>
+    </dgm:fillClrLst>
+    <dgm:linClrLst meth="repeat">
+      <a:schemeClr val="dk2"/>
+    </dgm:linClrLst>
+    <dgm:effectClrLst/>
+    <dgm:txLinClrLst/>
+    <dgm:txFillClrLst/>
+    <dgm:txEffectClrLst/>
+  </dgm:styleLbl>
+  <dgm:styleLbl name="node1">
+    <dgm:fillClrLst meth="repeat">
+      <a:schemeClr val="dk2"/>
+    </dgm:fillClrLst>
+    <dgm:linClrLst meth="repeat">
+      <a:schemeClr val="lt2"/>
+    </dgm:linClrLst>
+    <dgm:effectClrLst/>
+    <dgm:txLinClrLst/>
+    <dgm:txFillClrLst/>
+    <dgm:txEffectClrLst/>
+  </dgm:styleLbl>
+  <dgm:styleLbl name="lnNode1">
+    <dgm:fillClrLst meth="repeat">
+      <a:schemeClr val="dk2"/>
+    </dgm:fillClrLst>
+    <dgm:linClrLst meth="repeat">
+      <a:schemeClr val="lt2"/>
+    </dgm:linClrLst>
+    <dgm:effectClrLst/>
+    <dgm:txLinClrLst/>
+    <dgm:txFillClrLst/>
+    <dgm:txEffectClrLst/>
+  </dgm:styleLbl>
+  <dgm:styleLbl name="vennNode1">
+    <dgm:fillClrLst meth="repeat">
+      <a:schemeClr val="dk2">
+        <a:alpha val="50000"/>
+      </a:schemeClr>
+    </dgm:fillClrLst>
+    <dgm:linClrLst meth="repeat">
+      <a:schemeClr val="lt2"/>
+    </dgm:linClrLst>
+    <dgm:effectClrLst/>
+    <dgm:txLinClrLst/>
+    <dgm:txFillClrLst/>
+    <dgm:txEffectClrLst/>
+  </dgm:styleLbl>
+  <dgm:styleLbl name="node2">
+    <dgm:fillClrLst meth="repeat">
+      <a:schemeClr val="dk2"/>
+    </dgm:fillClrLst>
+    <dgm:linClrLst meth="repeat">
+      <a:schemeClr val="lt2"/>
+    </dgm:linClrLst>
+    <dgm:effectClrLst/>
+    <dgm:txLinClrLst/>
+    <dgm:txFillClrLst/>
+    <dgm:txEffectClrLst/>
+  </dgm:styleLbl>
+  <dgm:styleLbl name="node3">
+    <dgm:fillClrLst meth="repeat">
+      <a:schemeClr val="dk2"/>
+    </dgm:fillClrLst>
+    <dgm:linClrLst meth="repeat">
+      <a:schemeClr val="lt2"/>
+    </dgm:linClrLst>
+    <dgm:effectClrLst/>
+    <dgm:txLinClrLst/>
+    <dgm:txFillClrLst/>
+    <dgm:txEffectClrLst/>
+  </dgm:styleLbl>
+  <dgm:styleLbl name="node4">
+    <dgm:fillClrLst meth="repeat">
+      <a:schemeClr val="dk2"/>
+    </dgm:fillClrLst>
+    <dgm:linClrLst meth="repeat">
+      <a:schemeClr val="lt2"/>
+    </dgm:linClrLst>
+    <dgm:effectClrLst/>
+    <dgm:txLinClrLst/>
+    <dgm:txFillClrLst/>
+    <dgm:txEffectClrLst/>
+  </dgm:styleLbl>
+  <dgm:styleLbl name="fgImgPlace1">
+    <dgm:fillClrLst meth="repeat">
+      <a:schemeClr val="dk2">
+        <a:tint val="50000"/>
+      </a:schemeClr>
+    </dgm:fillClrLst>
+    <dgm:linClrLst meth="repeat">
+      <a:schemeClr val="lt2"/>
+    </dgm:linClrLst>
+    <dgm:effectClrLst/>
+    <dgm:txLinClrLst/>
+    <dgm:txFillClrLst meth="repeat">
+      <a:schemeClr val="lt2"/>
+    </dgm:txFillClrLst>
+    <dgm:txEffectClrLst/>
+  </dgm:styleLbl>
+  <dgm:styleLbl name="alignImgPlace1">
+    <dgm:fillClrLst meth="repeat">
+      <a:schemeClr val="dk2">
+        <a:tint val="50000"/>
+      </a:schemeClr>
+    </dgm:fillClrLst>
+    <dgm:linClrLst meth="repeat">
+      <a:schemeClr val="dk2">
+        <a:shade val="80000"/>
+      </a:schemeClr>
+    </dgm:linClrLst>
+    <dgm:effectClrLst/>
+    <dgm:txLinClrLst/>
+    <dgm:txFillClrLst meth="repeat">
+      <a:schemeClr val="lt2"/>
+    </dgm:txFillClrLst>
+    <dgm:txEffectClrLst/>
+  </dgm:styleLbl>
+  <dgm:styleLbl name="bgImgPlace1">
+    <dgm:fillClrLst meth="repeat">
+      <a:schemeClr val="dk2">
+        <a:tint val="50000"/>
+      </a:schemeClr>
+    </dgm:fillClrLst>
+    <dgm:linClrLst meth="repeat">
+      <a:schemeClr val="dk2">
+        <a:shade val="80000"/>
+      </a:schemeClr>
+    </dgm:linClrLst>
+    <dgm:effectClrLst/>
+    <dgm:txLinClrLst/>
+    <dgm:txFillClrLst meth="repeat">
+      <a:schemeClr val="lt2"/>
+    </dgm:txFillClrLst>
+    <dgm:txEffectClrLst/>
+  </dgm:styleLbl>
+  <dgm:styleLbl name="sibTrans2D1">
+    <dgm:fillClrLst meth="repeat">
+      <a:schemeClr val="dk2">
+        <a:tint val="60000"/>
+      </a:schemeClr>
+    </dgm:fillClrLst>
+    <dgm:linClrLst meth="repeat">
+      <a:schemeClr val="dk2">
+        <a:tint val="60000"/>
+      </a:schemeClr>
+    </dgm:linClrLst>
+    <dgm:effectClrLst/>
+    <dgm:txLinClrLst/>
+    <dgm:txFillClrLst/>
+    <dgm:txEffectClrLst/>
+  </dgm:styleLbl>
+  <dgm:styleLbl name="fgSibTrans2D1">
+    <dgm:fillClrLst meth="repeat">
+      <a:schemeClr val="dk2">
+        <a:tint val="60000"/>
+      </a:schemeClr>
+    </dgm:fillClrLst>
+    <dgm:linClrLst meth="repeat">
+      <a:schemeClr val="dk2">
+        <a:tint val="60000"/>
+      </a:schemeClr>
+    </dgm:linClrLst>
+    <dgm:effectClrLst/>
+    <dgm:txLinClrLst/>
+    <dgm:txFillClrLst/>
+    <dgm:txEffectClrLst/>
+  </dgm:styleLbl>
+  <dgm:styleLbl name="bgSibTrans2D1">
+    <dgm:fillClrLst meth="repeat">
+      <a:schemeClr val="dk2">
+        <a:tint val="60000"/>
+      </a:schemeClr>
+    </dgm:fillClrLst>
+    <dgm:linClrLst meth="repeat">
+      <a:schemeClr val="dk2">
+        <a:tint val="60000"/>
+      </a:schemeClr>
+    </dgm:linClrLst>
+    <dgm:effectClrLst/>
+    <dgm:txLinClrLst/>
+    <dgm:txFillClrLst/>
+    <dgm:txEffectClrLst/>
+  </dgm:styleLbl>
+  <dgm:styleLbl name="sibTrans1D1">
+    <dgm:fillClrLst meth="repeat">
+      <a:schemeClr val="dk2"/>
+    </dgm:fillClrLst>
+    <dgm:linClrLst meth="repeat">
+      <a:schemeClr val="dk2"/>
+    </dgm:linClrLst>
+    <dgm:effectClrLst/>
+    <dgm:txLinClrLst/>
+    <dgm:txFillClrLst meth="repeat">
+      <a:schemeClr val="lt2"/>
+    </dgm:txFillClrLst>
+    <dgm:txEffectClrLst/>
+  </dgm:styleLbl>
+  <dgm:styleLbl name="callout">
+    <dgm:fillClrLst meth="repeat">
+      <a:schemeClr val="dk2"/>
+    </dgm:fillClrLst>
+    <dgm:linClrLst meth="repeat">
+      <a:schemeClr val="dk2">
+        <a:tint val="50000"/>
+      </a:schemeClr>
+    </dgm:linClrLst>
+    <dgm:effectClrLst/>
+    <dgm:txLinClrLst/>
+    <dgm:txFillClrLst meth="repeat">
+      <a:schemeClr val="lt2"/>
+    </dgm:txFillClrLst>
+    <dgm:txEffectClrLst/>
+  </dgm:styleLbl>
+  <dgm:styleLbl name="asst0">
+    <dgm:fillClrLst meth="repeat">
+      <a:schemeClr val="dk2"/>
+    </dgm:fillClrLst>
+    <dgm:linClrLst meth="repeat">
+      <a:schemeClr val="lt2"/>
+    </dgm:linClrLst>
+    <dgm:effectClrLst/>
+    <dgm:txLinClrLst/>
+    <dgm:txFillClrLst/>
+    <dgm:txEffectClrLst/>
+  </dgm:styleLbl>
+  <dgm:styleLbl name="asst1">
+    <dgm:fillClrLst meth="repeat">
+      <a:schemeClr val="dk2"/>
+    </dgm:fillClrLst>
+    <dgm:linClrLst meth="repeat">
+      <a:schemeClr val="lt2"/>
+    </dgm:linClrLst>
+    <dgm:effectClrLst/>
+    <dgm:txLinClrLst/>
+    <dgm:txFillClrLst/>
+    <dgm:txEffectClrLst/>
+  </dgm:styleLbl>
+  <dgm:styleLbl name="asst2">
+    <dgm:fillClrLst meth="repeat">
+      <a:schemeClr val="dk2"/>
+    </dgm:fillClrLst>
+    <dgm:linClrLst meth="repeat">
+      <a:schemeClr val="lt2"/>
+    </dgm:linClrLst>
+    <dgm:effectClrLst/>
+    <dgm:txLinClrLst/>
+    <dgm:txFillClrLst/>
+    <dgm:txEffectClrLst/>
+  </dgm:styleLbl>
+  <dgm:styleLbl name="asst3">
+    <dgm:fillClrLst meth="repeat">
+      <a:schemeClr val="dk2"/>
+    </dgm:fillClrLst>
+    <dgm:linClrLst meth="repeat">
+      <a:schemeClr val="lt2"/>
+    </dgm:linClrLst>
+    <dgm:effectClrLst/>
+    <dgm:txLinClrLst/>
+    <dgm:txFillClrLst/>
+    <dgm:txEffectClrLst/>
+  </dgm:styleLbl>
+  <dgm:styleLbl name="asst4">
+    <dgm:fillClrLst meth="repeat">
+      <a:schemeClr val="dk2"/>
+    </dgm:fillClrLst>
+    <dgm:linClrLst meth="repeat">
+      <a:schemeClr val="lt2"/>
+    </dgm:linClrLst>
+    <dgm:effectClrLst/>
+    <dgm:txLinClrLst/>
+    <dgm:txFillClrLst/>
+    <dgm:txEffectClrLst/>
+  </dgm:styleLbl>
+  <dgm:styleLbl name="parChTrans2D1">
+    <dgm:fillClrLst meth="repeat">
+      <a:schemeClr val="dk2">
+        <a:tint val="60000"/>
+      </a:schemeClr>
+    </dgm:fillClrLst>
+    <dgm:linClrLst meth="repeat">
+      <a:schemeClr val="dk2">
+        <a:tint val="60000"/>
+      </a:schemeClr>
+    </dgm:linClrLst>
+    <dgm:effectClrLst/>
+    <dgm:txLinClrLst/>
+    <dgm:txFillClrLst meth="repeat">
+      <a:schemeClr val="lt2"/>
+    </dgm:txFillClrLst>
+    <dgm:txEffectClrLst/>
+  </dgm:styleLbl>
+  <dgm:styleLbl name="parChTrans2D2">
+    <dgm:fillClrLst meth="repeat">
+      <a:schemeClr val="dk2"/>
+    </dgm:fillClrLst>
+    <dgm:linClrLst meth="repeat">
+      <a:schemeClr val="dk2"/>
+    </dgm:linClrLst>
+    <dgm:effectClrLst/>
+    <dgm:txLinClrLst/>
+    <dgm:txFillClrLst meth="repeat">
+      <a:schemeClr val="lt2"/>
+    </dgm:txFillClrLst>
+    <dgm:txEffectClrLst/>
+  </dgm:styleLbl>
+  <dgm:styleLbl name="parChTrans2D3">
+    <dgm:fillClrLst meth="repeat">
+      <a:schemeClr val="dk2"/>
+    </dgm:fillClrLst>
+    <dgm:linClrLst meth="repeat">
+      <a:schemeClr val="dk2"/>
+    </dgm:linClrLst>
+    <dgm:effectClrLst/>
+    <dgm:txLinClrLst/>
+    <dgm:txFillClrLst meth="repeat">
+      <a:schemeClr val="lt2"/>
+    </dgm:txFillClrLst>
+    <dgm:txEffectClrLst/>
+  </dgm:styleLbl>
+  <dgm:styleLbl name="parChTrans2D4">
+    <dgm:fillClrLst meth="repeat">
+      <a:schemeClr val="dk2"/>
+    </dgm:fillClrLst>
+    <dgm:linClrLst meth="repeat">
+      <a:schemeClr val="dk2"/>
+    </dgm:linClrLst>
+    <dgm:effectClrLst/>
+    <dgm:txLinClrLst/>
+    <dgm:txFillClrLst meth="repeat">
+      <a:schemeClr val="lt2"/>
+    </dgm:txFillClrLst>
+    <dgm:txEffectClrLst/>
+  </dgm:styleLbl>
+  <dgm:styleLbl name="parChTrans1D1">
+    <dgm:fillClrLst meth="repeat">
+      <a:schemeClr val="dk2"/>
+    </dgm:fillClrLst>
+    <dgm:linClrLst meth="repeat">
+      <a:schemeClr val="dk2">
+        <a:shade val="60000"/>
+      </a:schemeClr>
+    </dgm:linClrLst>
+    <dgm:effectClrLst/>
+    <dgm:txLinClrLst/>
+    <dgm:txFillClrLst meth="repeat">
+      <a:schemeClr val="tx1"/>
+    </dgm:txFillClrLst>
+    <dgm:txEffectClrLst/>
+  </dgm:styleLbl>
+  <dgm:styleLbl name="parChTrans1D2">
+    <dgm:fillClrLst meth="repeat">
+      <a:schemeClr val="dk2"/>
+    </dgm:fillClrLst>
+    <dgm:linClrLst meth="repeat">
+      <a:schemeClr val="dk2">
+        <a:shade val="60000"/>
+      </a:schemeClr>
+    </dgm:linClrLst>
+    <dgm:effectClrLst/>
+    <dgm:txLinClrLst/>
+    <dgm:txFillClrLst meth="repeat">
+      <a:schemeClr val="tx1"/>
+    </dgm:txFillClrLst>
+    <dgm:txEffectClrLst/>
+  </dgm:styleLbl>
+  <dgm:styleLbl name="parChTrans1D3">
+    <dgm:fillClrLst meth="repeat">
+      <a:schemeClr val="dk2"/>
+    </dgm:fillClrLst>
+    <dgm:linClrLst meth="repeat">
+      <a:schemeClr val="dk2">
+        <a:shade val="80000"/>
+      </a:schemeClr>
+    </dgm:linClrLst>
+    <dgm:effectClrLst/>
+    <dgm:txLinClrLst/>
+    <dgm:txFillClrLst meth="repeat">
+      <a:schemeClr val="tx1"/>
+    </dgm:txFillClrLst>
+    <dgm:txEffectClrLst/>
+  </dgm:styleLbl>
+  <dgm:styleLbl name="parChTrans1D4">
+    <dgm:fillClrLst meth="repeat">
+      <a:schemeClr val="dk2"/>
+    </dgm:fillClrLst>
+    <dgm:linClrLst meth="repeat">
+      <a:schemeClr val="dk2">
+        <a:shade val="80000"/>
+      </a:schemeClr>
+    </dgm:linClrLst>
+    <dgm:effectClrLst/>
+    <dgm:txLinClrLst/>
+    <dgm:txFillClrLst meth="repeat">
+      <a:schemeClr val="tx1"/>
+    </dgm:txFillClrLst>
+    <dgm:txEffectClrLst/>
+  </dgm:styleLbl>
+  <dgm:styleLbl name="fgAcc1">
+    <dgm:fillClrLst meth="repeat">
+      <a:schemeClr val="lt2">
+        <a:alpha val="90000"/>
+      </a:schemeClr>
+    </dgm:fillClrLst>
+    <dgm:linClrLst meth="repeat">
+      <a:schemeClr val="dk2"/>
+    </dgm:linClrLst>
+    <dgm:effectClrLst/>
+    <dgm:txLinClrLst/>
+    <dgm:txFillClrLst meth="repeat">
+      <a:schemeClr val="dk1"/>
+    </dgm:txFillClrLst>
+    <dgm:txEffectClrLst/>
+  </dgm:styleLbl>
+  <dgm:styleLbl name="conFgAcc1">
+    <dgm:fillClrLst meth="repeat">
+      <a:schemeClr val="lt2">
+        <a:alpha val="90000"/>
+      </a:schemeClr>
+    </dgm:fillClrLst>
+    <dgm:linClrLst meth="repeat">
+      <a:schemeClr val="dk2"/>
+    </dgm:linClrLst>
+    <dgm:effectClrLst/>
+    <dgm:txLinClrLst/>
+    <dgm:txFillClrLst meth="repeat">
+      <a:schemeClr val="dk1"/>
+    </dgm:txFillClrLst>
+    <dgm:txEffectClrLst/>
+  </dgm:styleLbl>
+  <dgm:styleLbl name="alignAcc1">
+    <dgm:fillClrLst meth="repeat">
+      <a:schemeClr val="lt2">
+        <a:alpha val="90000"/>
+      </a:schemeClr>
+    </dgm:fillClrLst>
+    <dgm:linClrLst meth="repeat">
+      <a:schemeClr val="dk2"/>
+    </dgm:linClrLst>
+    <dgm:effectClrLst/>
+    <dgm:txLinClrLst/>
+    <dgm:txFillClrLst meth="repeat">
+      <a:schemeClr val="dk1"/>
+    </dgm:txFillClrLst>
+    <dgm:txEffectClrLst/>
+  </dgm:styleLbl>
+  <dgm:styleLbl name="trAlignAcc1">
+    <dgm:fillClrLst meth="repeat">
+      <a:schemeClr val="lt2">
+        <a:alpha val="40000"/>
+      </a:schemeClr>
+    </dgm:fillClrLst>
+    <dgm:linClrLst meth="repeat">
+      <a:schemeClr val="dk2"/>
+    </dgm:linClrLst>
+    <dgm:effectClrLst/>
+    <dgm:txLinClrLst/>
+    <dgm:txFillClrLst meth="repeat">
+      <a:schemeClr val="dk1"/>
+    </dgm:txFillClrLst>
+    <dgm:txEffectClrLst/>
+  </dgm:styleLbl>
+  <dgm:styleLbl name="bgAcc1">
+    <dgm:fillClrLst meth="repeat">
+      <a:schemeClr val="lt2">
+        <a:alpha val="90000"/>
+      </a:schemeClr>
+    </dgm:fillClrLst>
+    <dgm:linClrLst meth="repeat">
+      <a:schemeClr val="dk2"/>
+    </dgm:linClrLst>
+    <dgm:effectClrLst/>
+    <dgm:txLinClrLst/>
+    <dgm:txFillClrLst meth="repeat">
+      <a:schemeClr val="dk1"/>
+    </dgm:txFillClrLst>
+    <dgm:txEffectClrLst/>
+  </dgm:styleLbl>
+  <dgm:styleLbl name="solidFgAcc1">
+    <dgm:fillClrLst meth="repeat">
+      <a:schemeClr val="lt2"/>
+    </dgm:fillClrLst>
+    <dgm:linClrLst meth="repeat">
+      <a:schemeClr val="dk2"/>
+    </dgm:linClrLst>
+    <dgm:effectClrLst/>
+    <dgm:txLinClrLst/>
+    <dgm:txFillClrLst meth="repeat">
+      <a:schemeClr val="dk1"/>
+    </dgm:txFillClrLst>
+    <dgm:txEffectClrLst/>
+  </dgm:styleLbl>
+  <dgm:styleLbl name="solidAlignAcc1">
+    <dgm:fillClrLst meth="repeat">
+      <a:schemeClr val="lt2"/>
+    </dgm:fillClrLst>
+    <dgm:linClrLst meth="repeat">
+      <a:schemeClr val="dk2"/>
+    </dgm:linClrLst>
+    <dgm:effectClrLst/>
+    <dgm:txLinClrLst/>
+    <dgm:txFillClrLst meth="repeat">
+      <a:schemeClr val="dk1"/>
+    </dgm:txFillClrLst>
+    <dgm:txEffectClrLst/>
+  </dgm:styleLbl>
+  <dgm:styleLbl name="solidBgAcc1">
+    <dgm:fillClrLst meth="repeat">
+      <a:schemeClr val="lt2"/>
+    </dgm:fillClrLst>
+    <dgm:linClrLst meth="repeat">
+      <a:schemeClr val="dk2"/>
+    </dgm:linClrLst>
+    <dgm:effectClrLst/>
+    <dgm:txLinClrLst/>
+    <dgm:txFillClrLst meth="repeat">
+      <a:schemeClr val="dk1"/>
+    </dgm:txFillClrLst>
+    <dgm:txEffectClrLst/>
+  </dgm:styleLbl>
+  <dgm:styleLbl name="fgAccFollowNode1">
+    <dgm:fillClrLst meth="repeat">
+      <a:schemeClr val="dk2">
+        <a:alpha val="90000"/>
+        <a:tint val="40000"/>
+      </a:schemeClr>
+    </dgm:fillClrLst>
+    <dgm:linClrLst meth="repeat">
+      <a:schemeClr val="dk2">
+        <a:alpha val="90000"/>
+        <a:tint val="40000"/>
+      </a:schemeClr>
+    </dgm:linClrLst>
+    <dgm:effectClrLst/>
+    <dgm:txLinClrLst/>
+    <dgm:txFillClrLst meth="repeat">
+      <a:schemeClr val="dk1"/>
+    </dgm:txFillClrLst>
+    <dgm:txEffectClrLst/>
+  </dgm:styleLbl>
+  <dgm:styleLbl name="alignAccFollowNode1">
+    <dgm:fillClrLst meth="repeat">
+      <a:schemeClr val="dk2">
+        <a:alpha val="90000"/>
+        <a:tint val="40000"/>
+      </a:schemeClr>
+    </dgm:fillClrLst>
+    <dgm:linClrLst meth="repeat">
+      <a:schemeClr val="dk2">
+        <a:alpha val="90000"/>
+        <a:tint val="40000"/>
+      </a:schemeClr>
+    </dgm:linClrLst>
+    <dgm:effectClrLst/>
+    <dgm:txLinClrLst/>
+    <dgm:txFillClrLst meth="repeat">
+      <a:schemeClr val="dk1"/>
+    </dgm:txFillClrLst>
+    <dgm:txEffectClrLst/>
+  </dgm:styleLbl>
+  <dgm:styleLbl name="bgAccFollowNode1">
+    <dgm:fillClrLst meth="repeat">
+      <a:schemeClr val="dk2">
+        <a:alpha val="90000"/>
+        <a:tint val="40000"/>
+      </a:schemeClr>
+    </dgm:fillClrLst>
+    <dgm:linClrLst meth="repeat">
+      <a:schemeClr val="dk2">
+        <a:alpha val="90000"/>
+        <a:tint val="40000"/>
+      </a:schemeClr>
+    </dgm:linClrLst>
+    <dgm:effectClrLst/>
+    <dgm:txLinClrLst/>
+    <dgm:txFillClrLst meth="repeat">
+      <a:schemeClr val="dk1"/>
+    </dgm:txFillClrLst>
+    <dgm:txEffectClrLst/>
+  </dgm:styleLbl>
+  <dgm:styleLbl name="fgAcc0">
+    <dgm:fillClrLst meth="repeat">
+      <a:schemeClr val="lt2">
+        <a:alpha val="90000"/>
+      </a:schemeClr>
+    </dgm:fillClrLst>
+    <dgm:linClrLst meth="repeat">
+      <a:schemeClr val="dk2"/>
+    </dgm:linClrLst>
+    <dgm:effectClrLst/>
+    <dgm:txLinClrLst/>
+    <dgm:txFillClrLst meth="repeat">
+      <a:schemeClr val="dk1"/>
+    </dgm:txFillClrLst>
+    <dgm:txEffectClrLst/>
+  </dgm:styleLbl>
+  <dgm:styleLbl name="fgAcc2">
+    <dgm:fillClrLst meth="repeat">
+      <a:schemeClr val="lt2">
+        <a:alpha val="90000"/>
+      </a:schemeClr>
+    </dgm:fillClrLst>
+    <dgm:linClrLst meth="repeat">
+      <a:schemeClr val="dk2"/>
+    </dgm:linClrLst>
+    <dgm:effectClrLst/>
+    <dgm:txLinClrLst/>
+    <dgm:txFillClrLst meth="repeat">
+      <a:schemeClr val="dk1"/>
+    </dgm:txFillClrLst>
+    <dgm:txEffectClrLst/>
+  </dgm:styleLbl>
+  <dgm:styleLbl name="fgAcc3">
+    <dgm:fillClrLst meth="repeat">
+      <a:schemeClr val="lt2">
+        <a:alpha val="90000"/>
+      </a:schemeClr>
+    </dgm:fillClrLst>
+    <dgm:linClrLst meth="repeat">
+      <a:schemeClr val="dk2"/>
+    </dgm:linClrLst>
+    <dgm:effectClrLst/>
+    <dgm:txLinClrLst/>
+    <dgm:txFillClrLst meth="repeat">
+      <a:schemeClr val="dk1"/>
+    </dgm:txFillClrLst>
+    <dgm:txEffectClrLst/>
+  </dgm:styleLbl>
+  <dgm:styleLbl name="fgAcc4">
+    <dgm:fillClrLst meth="repeat">
+      <a:schemeClr val="lt2">
+        <a:alpha val="90000"/>
+      </a:schemeClr>
+    </dgm:fillClrLst>
+    <dgm:linClrLst meth="repeat">
+      <a:schemeClr val="dk2"/>
+    </dgm:linClrLst>
+    <dgm:effectClrLst/>
+    <dgm:txLinClrLst/>
+    <dgm:txFillClrLst meth="repeat">
+      <a:schemeClr val="dk1"/>
+    </dgm:txFillClrLst>
+    <dgm:txEffectClrLst/>
+  </dgm:styleLbl>
+  <dgm:styleLbl name="bgShp">
+    <dgm:fillClrLst meth="repeat">
+      <a:schemeClr val="dk2">
+        <a:tint val="40000"/>
+      </a:schemeClr>
+    </dgm:fillClrLst>
+    <dgm:linClrLst meth="repeat">
+      <a:schemeClr val="dk2"/>
+    </dgm:linClrLst>
+    <dgm:effectClrLst/>
+    <dgm:txLinClrLst/>
+    <dgm:txFillClrLst meth="repeat">
+      <a:schemeClr val="dk1"/>
+    </dgm:txFillClrLst>
+    <dgm:txEffectClrLst/>
+  </dgm:styleLbl>
+  <dgm:styleLbl name="dkBgShp">
+    <dgm:fillClrLst meth="repeat">
+      <a:schemeClr val="dk2">
+        <a:shade val="80000"/>
+      </a:schemeClr>
+    </dgm:fillClrLst>
+    <dgm:linClrLst meth="repeat">
+      <a:schemeClr val="dk2"/>
+    </dgm:linClrLst>
+    <dgm:effectClrLst/>
+    <dgm:txLinClrLst/>
+    <dgm:txFillClrLst meth="repeat">
+      <a:schemeClr val="lt1"/>
+    </dgm:txFillClrLst>
+    <dgm:txEffectClrLst/>
+  </dgm:styleLbl>
+  <dgm:styleLbl name="trBgShp">
+    <dgm:fillClrLst meth="repeat">
+      <a:schemeClr val="dk2">
+        <a:tint val="50000"/>
+        <a:alpha val="40000"/>
+      </a:schemeClr>
+    </dgm:fillClrLst>
+    <dgm:linClrLst meth="repeat">
+      <a:schemeClr val="dk2"/>
+    </dgm:linClrLst>
+    <dgm:effectClrLst/>
+    <dgm:txLinClrLst/>
+    <dgm:txFillClrLst meth="repeat">
+      <a:schemeClr val="lt1"/>
+    </dgm:txFillClrLst>
+    <dgm:txEffectClrLst/>
+  </dgm:styleLbl>
+  <dgm:styleLbl name="fgShp">
+    <dgm:fillClrLst meth="repeat">
+      <a:schemeClr val="dk2">
+        <a:tint val="60000"/>
+      </a:schemeClr>
+    </dgm:fillClrLst>
+    <dgm:linClrLst meth="repeat">
+      <a:schemeClr val="lt2"/>
+    </dgm:linClrLst>
+    <dgm:effectClrLst/>
+    <dgm:txLinClrLst/>
+    <dgm:txFillClrLst meth="repeat">
+      <a:schemeClr val="dk1"/>
+    </dgm:txFillClrLst>
+    <dgm:txEffectClrLst/>
+  </dgm:styleLbl>
+  <dgm:styleLbl name="revTx">
+    <dgm:fillClrLst meth="repeat">
+      <a:schemeClr val="lt2">
         <a:alpha val="0"/>
       </a:schemeClr>
     </dgm:fillClrLst>
@@ -8065,6 +8818,248 @@
     <dgm:cxn modelId="{2D5DFC4A-FC44-6E48-8953-E167243BE1A5}" type="presParOf" srcId="{DA662260-7625-D848-904A-F1C4A10D5ECE}" destId="{DEBF9FDE-4516-104F-920F-8F9C748E848D}" srcOrd="12" destOrd="0" presId="urn:microsoft.com/office/officeart/2005/8/layout/vProcess5"/>
     <dgm:cxn modelId="{35C1CA41-475B-434D-9299-AACE25AE5C5D}" type="presParOf" srcId="{DA662260-7625-D848-904A-F1C4A10D5ECE}" destId="{618399A5-8A25-8F4C-B89F-1BFEF1ADA3A4}" srcOrd="13" destOrd="0" presId="urn:microsoft.com/office/officeart/2005/8/layout/vProcess5"/>
     <dgm:cxn modelId="{F57DB4CA-DF8B-E44F-A0DD-A2B580A30FA6}" type="presParOf" srcId="{DA662260-7625-D848-904A-F1C4A10D5ECE}" destId="{59F1B3A2-00CF-6C4E-BCAF-16CB3ACB45AD}" srcOrd="14" destOrd="0" presId="urn:microsoft.com/office/officeart/2005/8/layout/vProcess5"/>
+  </dgm:cxnLst>
+  <dgm:bg/>
+  <dgm:whole/>
+  <dgm:extLst>
+    <a:ext uri="http://schemas.microsoft.com/office/drawing/2008/diagram">
+      <dsp:dataModelExt xmlns:dsp="http://schemas.microsoft.com/office/drawing/2008/diagram" relId="rId6" minVer="http://schemas.openxmlformats.org/drawingml/2006/diagram"/>
+    </a:ext>
+  </dgm:extLst>
+</dgm:dataModel>
+</file>
+
+<file path=ppt/diagrams/data7.xml><?xml version="1.0" encoding="utf-8"?>
+<dgm:dataModel xmlns:dgm="http://schemas.openxmlformats.org/drawingml/2006/diagram" xmlns:a="http://schemas.openxmlformats.org/drawingml/2006/main">
+  <dgm:ptLst>
+    <dgm:pt modelId="{D8A6040F-0C16-4126-935D-1ED84030B112}" type="doc">
+      <dgm:prSet loTypeId="urn:microsoft.com/office/officeart/2005/8/layout/hierarchy1" loCatId="hierarchy" qsTypeId="urn:microsoft.com/office/officeart/2005/8/quickstyle/simple1" qsCatId="simple" csTypeId="urn:microsoft.com/office/officeart/2005/8/colors/accent0_3" csCatId="mainScheme"/>
+      <dgm:spPr/>
+      <dgm:t>
+        <a:bodyPr/>
+        <a:lstStyle/>
+        <a:p>
+          <a:endParaRPr lang="en-US"/>
+        </a:p>
+      </dgm:t>
+    </dgm:pt>
+    <dgm:pt modelId="{7AF25066-87F3-464D-80C6-CEBA81CF74C2}">
+      <dgm:prSet/>
+      <dgm:spPr/>
+      <dgm:t>
+        <a:bodyPr/>
+        <a:lstStyle/>
+        <a:p>
+          <a:r>
+            <a:rPr lang="hu-HU"/>
+            <a:t>Building a faster and more scalable infrastructure</a:t>
+          </a:r>
+          <a:endParaRPr lang="en-US"/>
+        </a:p>
+      </dgm:t>
+    </dgm:pt>
+    <dgm:pt modelId="{7F9788DE-48F2-462F-B779-59645F4EB771}" type="parTrans" cxnId="{AE3CDF23-983D-4997-873D-6BD426448662}">
+      <dgm:prSet/>
+      <dgm:spPr/>
+      <dgm:t>
+        <a:bodyPr/>
+        <a:lstStyle/>
+        <a:p>
+          <a:endParaRPr lang="en-US"/>
+        </a:p>
+      </dgm:t>
+    </dgm:pt>
+    <dgm:pt modelId="{A110BF06-CA25-4F59-9B1A-E9FD3DEC3942}" type="sibTrans" cxnId="{AE3CDF23-983D-4997-873D-6BD426448662}">
+      <dgm:prSet/>
+      <dgm:spPr/>
+      <dgm:t>
+        <a:bodyPr/>
+        <a:lstStyle/>
+        <a:p>
+          <a:endParaRPr lang="en-US"/>
+        </a:p>
+      </dgm:t>
+    </dgm:pt>
+    <dgm:pt modelId="{D82CA5D1-F03D-4570-A52C-BD3829600940}">
+      <dgm:prSet/>
+      <dgm:spPr/>
+      <dgm:t>
+        <a:bodyPr/>
+        <a:lstStyle/>
+        <a:p>
+          <a:r>
+            <a:rPr lang="en-US"/>
+            <a:t>Implementing cloud integration</a:t>
+          </a:r>
+        </a:p>
+      </dgm:t>
+    </dgm:pt>
+    <dgm:pt modelId="{0525E6ED-A4FA-4EC9-951A-18BD013A97E5}" type="parTrans" cxnId="{15BDBCE2-D20E-4A1F-9E48-73B29A44953B}">
+      <dgm:prSet/>
+      <dgm:spPr/>
+      <dgm:t>
+        <a:bodyPr/>
+        <a:lstStyle/>
+        <a:p>
+          <a:endParaRPr lang="en-US"/>
+        </a:p>
+      </dgm:t>
+    </dgm:pt>
+    <dgm:pt modelId="{B6D4FC03-2248-48A0-9966-38159E46FE3B}" type="sibTrans" cxnId="{15BDBCE2-D20E-4A1F-9E48-73B29A44953B}">
+      <dgm:prSet/>
+      <dgm:spPr/>
+      <dgm:t>
+        <a:bodyPr/>
+        <a:lstStyle/>
+        <a:p>
+          <a:endParaRPr lang="en-US"/>
+        </a:p>
+      </dgm:t>
+    </dgm:pt>
+    <dgm:pt modelId="{F626BBE1-BF07-4B3A-9244-D192FAADC296}">
+      <dgm:prSet/>
+      <dgm:spPr/>
+      <dgm:t>
+        <a:bodyPr/>
+        <a:lstStyle/>
+        <a:p>
+          <a:r>
+            <a:rPr lang="en-US"/>
+            <a:t>Further improving network security</a:t>
+          </a:r>
+        </a:p>
+      </dgm:t>
+    </dgm:pt>
+    <dgm:pt modelId="{C654FB9B-83B0-4C64-91F2-E28720F19CE8}" type="parTrans" cxnId="{7C65A8F8-4A1A-4116-852B-23C168C1628A}">
+      <dgm:prSet/>
+      <dgm:spPr/>
+      <dgm:t>
+        <a:bodyPr/>
+        <a:lstStyle/>
+        <a:p>
+          <a:endParaRPr lang="en-US"/>
+        </a:p>
+      </dgm:t>
+    </dgm:pt>
+    <dgm:pt modelId="{A689D167-8D2A-4C79-82E4-54CEFC3681D9}" type="sibTrans" cxnId="{7C65A8F8-4A1A-4116-852B-23C168C1628A}">
+      <dgm:prSet/>
+      <dgm:spPr/>
+      <dgm:t>
+        <a:bodyPr/>
+        <a:lstStyle/>
+        <a:p>
+          <a:endParaRPr lang="en-US"/>
+        </a:p>
+      </dgm:t>
+    </dgm:pt>
+    <dgm:pt modelId="{CDB93DA1-5178-4249-B78C-E395F30FB553}" type="pres">
+      <dgm:prSet presAssocID="{D8A6040F-0C16-4126-935D-1ED84030B112}" presName="hierChild1" presStyleCnt="0">
+        <dgm:presLayoutVars>
+          <dgm:chPref val="1"/>
+          <dgm:dir/>
+          <dgm:animOne val="branch"/>
+          <dgm:animLvl val="lvl"/>
+          <dgm:resizeHandles/>
+        </dgm:presLayoutVars>
+      </dgm:prSet>
+      <dgm:spPr/>
+    </dgm:pt>
+    <dgm:pt modelId="{469DA8C4-863E-9A43-833B-6EDF1768622C}" type="pres">
+      <dgm:prSet presAssocID="{7AF25066-87F3-464D-80C6-CEBA81CF74C2}" presName="hierRoot1" presStyleCnt="0"/>
+      <dgm:spPr/>
+    </dgm:pt>
+    <dgm:pt modelId="{C7B80F3F-73ED-D44E-8758-8C4F3CC17F39}" type="pres">
+      <dgm:prSet presAssocID="{7AF25066-87F3-464D-80C6-CEBA81CF74C2}" presName="composite" presStyleCnt="0"/>
+      <dgm:spPr/>
+    </dgm:pt>
+    <dgm:pt modelId="{69170AC2-B2CA-7A43-98D0-DCA40EAAB270}" type="pres">
+      <dgm:prSet presAssocID="{7AF25066-87F3-464D-80C6-CEBA81CF74C2}" presName="background" presStyleLbl="node0" presStyleIdx="0" presStyleCnt="3"/>
+      <dgm:spPr/>
+    </dgm:pt>
+    <dgm:pt modelId="{9F1E82CF-8594-A242-9222-5B96E8234F50}" type="pres">
+      <dgm:prSet presAssocID="{7AF25066-87F3-464D-80C6-CEBA81CF74C2}" presName="text" presStyleLbl="fgAcc0" presStyleIdx="0" presStyleCnt="3">
+        <dgm:presLayoutVars>
+          <dgm:chPref val="3"/>
+        </dgm:presLayoutVars>
+      </dgm:prSet>
+      <dgm:spPr/>
+    </dgm:pt>
+    <dgm:pt modelId="{B4486A55-9EFE-064C-9ABB-34AD45D828CF}" type="pres">
+      <dgm:prSet presAssocID="{7AF25066-87F3-464D-80C6-CEBA81CF74C2}" presName="hierChild2" presStyleCnt="0"/>
+      <dgm:spPr/>
+    </dgm:pt>
+    <dgm:pt modelId="{8EC333AE-C5C9-124D-B000-E0F67EAD48C4}" type="pres">
+      <dgm:prSet presAssocID="{D82CA5D1-F03D-4570-A52C-BD3829600940}" presName="hierRoot1" presStyleCnt="0"/>
+      <dgm:spPr/>
+    </dgm:pt>
+    <dgm:pt modelId="{4C133E9D-D74D-CB44-8E17-ECFC83E2B5DB}" type="pres">
+      <dgm:prSet presAssocID="{D82CA5D1-F03D-4570-A52C-BD3829600940}" presName="composite" presStyleCnt="0"/>
+      <dgm:spPr/>
+    </dgm:pt>
+    <dgm:pt modelId="{F6F1EC4F-7BAA-8348-9AFE-6FB12043BE06}" type="pres">
+      <dgm:prSet presAssocID="{D82CA5D1-F03D-4570-A52C-BD3829600940}" presName="background" presStyleLbl="node0" presStyleIdx="1" presStyleCnt="3"/>
+      <dgm:spPr/>
+    </dgm:pt>
+    <dgm:pt modelId="{E9DE5ACD-9A9C-5149-8FA3-9C3CF7CF51A7}" type="pres">
+      <dgm:prSet presAssocID="{D82CA5D1-F03D-4570-A52C-BD3829600940}" presName="text" presStyleLbl="fgAcc0" presStyleIdx="1" presStyleCnt="3">
+        <dgm:presLayoutVars>
+          <dgm:chPref val="3"/>
+        </dgm:presLayoutVars>
+      </dgm:prSet>
+      <dgm:spPr/>
+    </dgm:pt>
+    <dgm:pt modelId="{966885DF-5D6A-AE42-B886-83857EF7DC02}" type="pres">
+      <dgm:prSet presAssocID="{D82CA5D1-F03D-4570-A52C-BD3829600940}" presName="hierChild2" presStyleCnt="0"/>
+      <dgm:spPr/>
+    </dgm:pt>
+    <dgm:pt modelId="{245A4271-6F55-2243-9681-9B77FEB16130}" type="pres">
+      <dgm:prSet presAssocID="{F626BBE1-BF07-4B3A-9244-D192FAADC296}" presName="hierRoot1" presStyleCnt="0"/>
+      <dgm:spPr/>
+    </dgm:pt>
+    <dgm:pt modelId="{481AB7A0-14B4-524F-94E1-7B4BA93FBDE6}" type="pres">
+      <dgm:prSet presAssocID="{F626BBE1-BF07-4B3A-9244-D192FAADC296}" presName="composite" presStyleCnt="0"/>
+      <dgm:spPr/>
+    </dgm:pt>
+    <dgm:pt modelId="{768973E8-FC52-6841-8DC4-A81DB071916E}" type="pres">
+      <dgm:prSet presAssocID="{F626BBE1-BF07-4B3A-9244-D192FAADC296}" presName="background" presStyleLbl="node0" presStyleIdx="2" presStyleCnt="3"/>
+      <dgm:spPr/>
+    </dgm:pt>
+    <dgm:pt modelId="{0DF91388-21D0-D64F-A04E-E05828D74C57}" type="pres">
+      <dgm:prSet presAssocID="{F626BBE1-BF07-4B3A-9244-D192FAADC296}" presName="text" presStyleLbl="fgAcc0" presStyleIdx="2" presStyleCnt="3">
+        <dgm:presLayoutVars>
+          <dgm:chPref val="3"/>
+        </dgm:presLayoutVars>
+      </dgm:prSet>
+      <dgm:spPr/>
+    </dgm:pt>
+    <dgm:pt modelId="{106C646B-423D-5742-9160-F7E5167030A9}" type="pres">
+      <dgm:prSet presAssocID="{F626BBE1-BF07-4B3A-9244-D192FAADC296}" presName="hierChild2" presStyleCnt="0"/>
+      <dgm:spPr/>
+    </dgm:pt>
+  </dgm:ptLst>
+  <dgm:cxnLst>
+    <dgm:cxn modelId="{F739DB0C-A2D2-4941-B364-B39D24925BAB}" type="presOf" srcId="{F626BBE1-BF07-4B3A-9244-D192FAADC296}" destId="{0DF91388-21D0-D64F-A04E-E05828D74C57}" srcOrd="0" destOrd="0" presId="urn:microsoft.com/office/officeart/2005/8/layout/hierarchy1"/>
+    <dgm:cxn modelId="{8AA70C0D-A827-9F4F-935C-F109DA5B2B21}" type="presOf" srcId="{7AF25066-87F3-464D-80C6-CEBA81CF74C2}" destId="{9F1E82CF-8594-A242-9222-5B96E8234F50}" srcOrd="0" destOrd="0" presId="urn:microsoft.com/office/officeart/2005/8/layout/hierarchy1"/>
+    <dgm:cxn modelId="{2D38E219-E276-274F-BE84-6EF70A903880}" type="presOf" srcId="{D8A6040F-0C16-4126-935D-1ED84030B112}" destId="{CDB93DA1-5178-4249-B78C-E395F30FB553}" srcOrd="0" destOrd="0" presId="urn:microsoft.com/office/officeart/2005/8/layout/hierarchy1"/>
+    <dgm:cxn modelId="{6286D21A-F6EE-7D47-B997-3E9EDA239335}" type="presOf" srcId="{D82CA5D1-F03D-4570-A52C-BD3829600940}" destId="{E9DE5ACD-9A9C-5149-8FA3-9C3CF7CF51A7}" srcOrd="0" destOrd="0" presId="urn:microsoft.com/office/officeart/2005/8/layout/hierarchy1"/>
+    <dgm:cxn modelId="{AE3CDF23-983D-4997-873D-6BD426448662}" srcId="{D8A6040F-0C16-4126-935D-1ED84030B112}" destId="{7AF25066-87F3-464D-80C6-CEBA81CF74C2}" srcOrd="0" destOrd="0" parTransId="{7F9788DE-48F2-462F-B779-59645F4EB771}" sibTransId="{A110BF06-CA25-4F59-9B1A-E9FD3DEC3942}"/>
+    <dgm:cxn modelId="{15BDBCE2-D20E-4A1F-9E48-73B29A44953B}" srcId="{D8A6040F-0C16-4126-935D-1ED84030B112}" destId="{D82CA5D1-F03D-4570-A52C-BD3829600940}" srcOrd="1" destOrd="0" parTransId="{0525E6ED-A4FA-4EC9-951A-18BD013A97E5}" sibTransId="{B6D4FC03-2248-48A0-9966-38159E46FE3B}"/>
+    <dgm:cxn modelId="{7C65A8F8-4A1A-4116-852B-23C168C1628A}" srcId="{D8A6040F-0C16-4126-935D-1ED84030B112}" destId="{F626BBE1-BF07-4B3A-9244-D192FAADC296}" srcOrd="2" destOrd="0" parTransId="{C654FB9B-83B0-4C64-91F2-E28720F19CE8}" sibTransId="{A689D167-8D2A-4C79-82E4-54CEFC3681D9}"/>
+    <dgm:cxn modelId="{63A2B97D-40B7-464C-827F-11BA7E52540F}" type="presParOf" srcId="{CDB93DA1-5178-4249-B78C-E395F30FB553}" destId="{469DA8C4-863E-9A43-833B-6EDF1768622C}" srcOrd="0" destOrd="0" presId="urn:microsoft.com/office/officeart/2005/8/layout/hierarchy1"/>
+    <dgm:cxn modelId="{85C966AD-2B3B-0342-A9A5-F05F0F35EAF0}" type="presParOf" srcId="{469DA8C4-863E-9A43-833B-6EDF1768622C}" destId="{C7B80F3F-73ED-D44E-8758-8C4F3CC17F39}" srcOrd="0" destOrd="0" presId="urn:microsoft.com/office/officeart/2005/8/layout/hierarchy1"/>
+    <dgm:cxn modelId="{2588FD44-A00C-5E4D-87D0-149A1CF04232}" type="presParOf" srcId="{C7B80F3F-73ED-D44E-8758-8C4F3CC17F39}" destId="{69170AC2-B2CA-7A43-98D0-DCA40EAAB270}" srcOrd="0" destOrd="0" presId="urn:microsoft.com/office/officeart/2005/8/layout/hierarchy1"/>
+    <dgm:cxn modelId="{8DCE41E7-6BAE-0146-8578-6C53DE9CC105}" type="presParOf" srcId="{C7B80F3F-73ED-D44E-8758-8C4F3CC17F39}" destId="{9F1E82CF-8594-A242-9222-5B96E8234F50}" srcOrd="1" destOrd="0" presId="urn:microsoft.com/office/officeart/2005/8/layout/hierarchy1"/>
+    <dgm:cxn modelId="{9B23C5CD-3F78-9F4C-9255-6B1FCFCD0976}" type="presParOf" srcId="{469DA8C4-863E-9A43-833B-6EDF1768622C}" destId="{B4486A55-9EFE-064C-9ABB-34AD45D828CF}" srcOrd="1" destOrd="0" presId="urn:microsoft.com/office/officeart/2005/8/layout/hierarchy1"/>
+    <dgm:cxn modelId="{A7C9135E-6D33-944E-B685-2111D8445908}" type="presParOf" srcId="{CDB93DA1-5178-4249-B78C-E395F30FB553}" destId="{8EC333AE-C5C9-124D-B000-E0F67EAD48C4}" srcOrd="1" destOrd="0" presId="urn:microsoft.com/office/officeart/2005/8/layout/hierarchy1"/>
+    <dgm:cxn modelId="{5DEE61B2-2CCF-B948-83FF-B8DB001F8EED}" type="presParOf" srcId="{8EC333AE-C5C9-124D-B000-E0F67EAD48C4}" destId="{4C133E9D-D74D-CB44-8E17-ECFC83E2B5DB}" srcOrd="0" destOrd="0" presId="urn:microsoft.com/office/officeart/2005/8/layout/hierarchy1"/>
+    <dgm:cxn modelId="{91DCA858-2D8E-C64F-886F-F6A0CC7826D8}" type="presParOf" srcId="{4C133E9D-D74D-CB44-8E17-ECFC83E2B5DB}" destId="{F6F1EC4F-7BAA-8348-9AFE-6FB12043BE06}" srcOrd="0" destOrd="0" presId="urn:microsoft.com/office/officeart/2005/8/layout/hierarchy1"/>
+    <dgm:cxn modelId="{207CEF40-AA9B-4C48-BBDE-241F39572FD8}" type="presParOf" srcId="{4C133E9D-D74D-CB44-8E17-ECFC83E2B5DB}" destId="{E9DE5ACD-9A9C-5149-8FA3-9C3CF7CF51A7}" srcOrd="1" destOrd="0" presId="urn:microsoft.com/office/officeart/2005/8/layout/hierarchy1"/>
+    <dgm:cxn modelId="{7D068C6D-289A-0D44-9FA1-D4F36C52C5A1}" type="presParOf" srcId="{8EC333AE-C5C9-124D-B000-E0F67EAD48C4}" destId="{966885DF-5D6A-AE42-B886-83857EF7DC02}" srcOrd="1" destOrd="0" presId="urn:microsoft.com/office/officeart/2005/8/layout/hierarchy1"/>
+    <dgm:cxn modelId="{D181F4F1-94CC-7346-BCDA-818DC7F82232}" type="presParOf" srcId="{CDB93DA1-5178-4249-B78C-E395F30FB553}" destId="{245A4271-6F55-2243-9681-9B77FEB16130}" srcOrd="2" destOrd="0" presId="urn:microsoft.com/office/officeart/2005/8/layout/hierarchy1"/>
+    <dgm:cxn modelId="{E4CE6C1A-2BCB-2441-AAA4-984055A6CE28}" type="presParOf" srcId="{245A4271-6F55-2243-9681-9B77FEB16130}" destId="{481AB7A0-14B4-524F-94E1-7B4BA93FBDE6}" srcOrd="0" destOrd="0" presId="urn:microsoft.com/office/officeart/2005/8/layout/hierarchy1"/>
+    <dgm:cxn modelId="{B4F77739-EB5E-8548-933E-567C7E12956A}" type="presParOf" srcId="{481AB7A0-14B4-524F-94E1-7B4BA93FBDE6}" destId="{768973E8-FC52-6841-8DC4-A81DB071916E}" srcOrd="0" destOrd="0" presId="urn:microsoft.com/office/officeart/2005/8/layout/hierarchy1"/>
+    <dgm:cxn modelId="{66AB1D57-1CC1-034F-8207-D3BC553A0FAA}" type="presParOf" srcId="{481AB7A0-14B4-524F-94E1-7B4BA93FBDE6}" destId="{0DF91388-21D0-D64F-A04E-E05828D74C57}" srcOrd="1" destOrd="0" presId="urn:microsoft.com/office/officeart/2005/8/layout/hierarchy1"/>
+    <dgm:cxn modelId="{41CE84DD-F8D0-2B40-A32C-E10AA4BCA67D}" type="presParOf" srcId="{245A4271-6F55-2243-9681-9B77FEB16130}" destId="{106C646B-423D-5742-9160-F7E5167030A9}" srcOrd="1" destOrd="0" presId="urn:microsoft.com/office/officeart/2005/8/layout/hierarchy1"/>
   </dgm:cxnLst>
   <dgm:bg/>
   <dgm:whole/>
@@ -12860,6 +13855,412 @@
 </dsp:drawing>
 </file>
 
+<file path=ppt/diagrams/drawing7.xml><?xml version="1.0" encoding="utf-8"?>
+<dsp:drawing xmlns:dgm="http://schemas.openxmlformats.org/drawingml/2006/diagram" xmlns:dsp="http://schemas.microsoft.com/office/drawing/2008/diagram" xmlns:a="http://schemas.openxmlformats.org/drawingml/2006/main">
+  <dsp:spTree>
+    <dsp:nvGrpSpPr>
+      <dsp:cNvPr id="0" name=""/>
+      <dsp:cNvGrpSpPr/>
+    </dsp:nvGrpSpPr>
+    <dsp:grpSpPr/>
+    <dsp:sp modelId="{69170AC2-B2CA-7A43-98D0-DCA40EAAB270}">
+      <dsp:nvSpPr>
+        <dsp:cNvPr id="0" name=""/>
+        <dsp:cNvSpPr/>
+      </dsp:nvSpPr>
+      <dsp:spPr>
+        <a:xfrm>
+          <a:off x="0" y="524133"/>
+          <a:ext cx="2918936" cy="1853524"/>
+        </a:xfrm>
+        <a:prstGeom prst="roundRect">
+          <a:avLst>
+            <a:gd name="adj" fmla="val 10000"/>
+          </a:avLst>
+        </a:prstGeom>
+        <a:solidFill>
+          <a:schemeClr val="dk2">
+            <a:hueOff val="0"/>
+            <a:satOff val="0"/>
+            <a:lumOff val="0"/>
+            <a:alphaOff val="0"/>
+          </a:schemeClr>
+        </a:solidFill>
+        <a:ln w="19050" cap="flat" cmpd="sng" algn="ctr">
+          <a:solidFill>
+            <a:schemeClr val="lt2">
+              <a:hueOff val="0"/>
+              <a:satOff val="0"/>
+              <a:lumOff val="0"/>
+              <a:alphaOff val="0"/>
+            </a:schemeClr>
+          </a:solidFill>
+          <a:prstDash val="solid"/>
+          <a:miter lim="800000"/>
+        </a:ln>
+        <a:effectLst/>
+      </dsp:spPr>
+      <dsp:style>
+        <a:lnRef idx="2">
+          <a:scrgbClr r="0" g="0" b="0"/>
+        </a:lnRef>
+        <a:fillRef idx="1">
+          <a:scrgbClr r="0" g="0" b="0"/>
+        </a:fillRef>
+        <a:effectRef idx="0">
+          <a:scrgbClr r="0" g="0" b="0"/>
+        </a:effectRef>
+        <a:fontRef idx="minor">
+          <a:schemeClr val="lt1"/>
+        </a:fontRef>
+      </dsp:style>
+    </dsp:sp>
+    <dsp:sp modelId="{9F1E82CF-8594-A242-9222-5B96E8234F50}">
+      <dsp:nvSpPr>
+        <dsp:cNvPr id="0" name=""/>
+        <dsp:cNvSpPr/>
+      </dsp:nvSpPr>
+      <dsp:spPr>
+        <a:xfrm>
+          <a:off x="324326" y="832243"/>
+          <a:ext cx="2918936" cy="1853524"/>
+        </a:xfrm>
+        <a:prstGeom prst="roundRect">
+          <a:avLst>
+            <a:gd name="adj" fmla="val 10000"/>
+          </a:avLst>
+        </a:prstGeom>
+        <a:solidFill>
+          <a:schemeClr val="lt2">
+            <a:alpha val="90000"/>
+            <a:hueOff val="0"/>
+            <a:satOff val="0"/>
+            <a:lumOff val="0"/>
+            <a:alphaOff val="0"/>
+          </a:schemeClr>
+        </a:solidFill>
+        <a:ln w="19050" cap="flat" cmpd="sng" algn="ctr">
+          <a:solidFill>
+            <a:schemeClr val="dk2">
+              <a:hueOff val="0"/>
+              <a:satOff val="0"/>
+              <a:lumOff val="0"/>
+              <a:alphaOff val="0"/>
+            </a:schemeClr>
+          </a:solidFill>
+          <a:prstDash val="solid"/>
+          <a:miter lim="800000"/>
+        </a:ln>
+        <a:effectLst/>
+      </dsp:spPr>
+      <dsp:style>
+        <a:lnRef idx="2">
+          <a:scrgbClr r="0" g="0" b="0"/>
+        </a:lnRef>
+        <a:fillRef idx="1">
+          <a:scrgbClr r="0" g="0" b="0"/>
+        </a:fillRef>
+        <a:effectRef idx="0">
+          <a:scrgbClr r="0" g="0" b="0"/>
+        </a:effectRef>
+        <a:fontRef idx="minor"/>
+      </dsp:style>
+      <dsp:txBody>
+        <a:bodyPr spcFirstLastPara="0" vert="horz" wrap="square" lIns="102870" tIns="102870" rIns="102870" bIns="102870" numCol="1" spcCol="1270" anchor="ctr" anchorCtr="0">
+          <a:noAutofit/>
+        </a:bodyPr>
+        <a:lstStyle/>
+        <a:p>
+          <a:pPr marL="0" lvl="0" indent="0" algn="ctr" defTabSz="1200150">
+            <a:lnSpc>
+              <a:spcPct val="90000"/>
+            </a:lnSpc>
+            <a:spcBef>
+              <a:spcPct val="0"/>
+            </a:spcBef>
+            <a:spcAft>
+              <a:spcPct val="35000"/>
+            </a:spcAft>
+            <a:buNone/>
+          </a:pPr>
+          <a:r>
+            <a:rPr lang="hu-HU" sz="2700" kern="1200"/>
+            <a:t>Building a faster and more scalable infrastructure</a:t>
+          </a:r>
+          <a:endParaRPr lang="en-US" sz="2700" kern="1200"/>
+        </a:p>
+      </dsp:txBody>
+      <dsp:txXfrm>
+        <a:off x="378614" y="886531"/>
+        <a:ext cx="2810360" cy="1744948"/>
+      </dsp:txXfrm>
+    </dsp:sp>
+    <dsp:sp modelId="{F6F1EC4F-7BAA-8348-9AFE-6FB12043BE06}">
+      <dsp:nvSpPr>
+        <dsp:cNvPr id="0" name=""/>
+        <dsp:cNvSpPr/>
+      </dsp:nvSpPr>
+      <dsp:spPr>
+        <a:xfrm>
+          <a:off x="3567588" y="524133"/>
+          <a:ext cx="2918936" cy="1853524"/>
+        </a:xfrm>
+        <a:prstGeom prst="roundRect">
+          <a:avLst>
+            <a:gd name="adj" fmla="val 10000"/>
+          </a:avLst>
+        </a:prstGeom>
+        <a:solidFill>
+          <a:schemeClr val="dk2">
+            <a:hueOff val="0"/>
+            <a:satOff val="0"/>
+            <a:lumOff val="0"/>
+            <a:alphaOff val="0"/>
+          </a:schemeClr>
+        </a:solidFill>
+        <a:ln w="19050" cap="flat" cmpd="sng" algn="ctr">
+          <a:solidFill>
+            <a:schemeClr val="lt2">
+              <a:hueOff val="0"/>
+              <a:satOff val="0"/>
+              <a:lumOff val="0"/>
+              <a:alphaOff val="0"/>
+            </a:schemeClr>
+          </a:solidFill>
+          <a:prstDash val="solid"/>
+          <a:miter lim="800000"/>
+        </a:ln>
+        <a:effectLst/>
+      </dsp:spPr>
+      <dsp:style>
+        <a:lnRef idx="2">
+          <a:scrgbClr r="0" g="0" b="0"/>
+        </a:lnRef>
+        <a:fillRef idx="1">
+          <a:scrgbClr r="0" g="0" b="0"/>
+        </a:fillRef>
+        <a:effectRef idx="0">
+          <a:scrgbClr r="0" g="0" b="0"/>
+        </a:effectRef>
+        <a:fontRef idx="minor">
+          <a:schemeClr val="lt1"/>
+        </a:fontRef>
+      </dsp:style>
+    </dsp:sp>
+    <dsp:sp modelId="{E9DE5ACD-9A9C-5149-8FA3-9C3CF7CF51A7}">
+      <dsp:nvSpPr>
+        <dsp:cNvPr id="0" name=""/>
+        <dsp:cNvSpPr/>
+      </dsp:nvSpPr>
+      <dsp:spPr>
+        <a:xfrm>
+          <a:off x="3891915" y="832243"/>
+          <a:ext cx="2918936" cy="1853524"/>
+        </a:xfrm>
+        <a:prstGeom prst="roundRect">
+          <a:avLst>
+            <a:gd name="adj" fmla="val 10000"/>
+          </a:avLst>
+        </a:prstGeom>
+        <a:solidFill>
+          <a:schemeClr val="lt2">
+            <a:alpha val="90000"/>
+            <a:hueOff val="0"/>
+            <a:satOff val="0"/>
+            <a:lumOff val="0"/>
+            <a:alphaOff val="0"/>
+          </a:schemeClr>
+        </a:solidFill>
+        <a:ln w="19050" cap="flat" cmpd="sng" algn="ctr">
+          <a:solidFill>
+            <a:schemeClr val="dk2">
+              <a:hueOff val="0"/>
+              <a:satOff val="0"/>
+              <a:lumOff val="0"/>
+              <a:alphaOff val="0"/>
+            </a:schemeClr>
+          </a:solidFill>
+          <a:prstDash val="solid"/>
+          <a:miter lim="800000"/>
+        </a:ln>
+        <a:effectLst/>
+      </dsp:spPr>
+      <dsp:style>
+        <a:lnRef idx="2">
+          <a:scrgbClr r="0" g="0" b="0"/>
+        </a:lnRef>
+        <a:fillRef idx="1">
+          <a:scrgbClr r="0" g="0" b="0"/>
+        </a:fillRef>
+        <a:effectRef idx="0">
+          <a:scrgbClr r="0" g="0" b="0"/>
+        </a:effectRef>
+        <a:fontRef idx="minor"/>
+      </dsp:style>
+      <dsp:txBody>
+        <a:bodyPr spcFirstLastPara="0" vert="horz" wrap="square" lIns="102870" tIns="102870" rIns="102870" bIns="102870" numCol="1" spcCol="1270" anchor="ctr" anchorCtr="0">
+          <a:noAutofit/>
+        </a:bodyPr>
+        <a:lstStyle/>
+        <a:p>
+          <a:pPr marL="0" lvl="0" indent="0" algn="ctr" defTabSz="1200150">
+            <a:lnSpc>
+              <a:spcPct val="90000"/>
+            </a:lnSpc>
+            <a:spcBef>
+              <a:spcPct val="0"/>
+            </a:spcBef>
+            <a:spcAft>
+              <a:spcPct val="35000"/>
+            </a:spcAft>
+            <a:buNone/>
+          </a:pPr>
+          <a:r>
+            <a:rPr lang="en-US" sz="2700" kern="1200"/>
+            <a:t>Implementing cloud integration</a:t>
+          </a:r>
+        </a:p>
+      </dsp:txBody>
+      <dsp:txXfrm>
+        <a:off x="3946203" y="886531"/>
+        <a:ext cx="2810360" cy="1744948"/>
+      </dsp:txXfrm>
+    </dsp:sp>
+    <dsp:sp modelId="{768973E8-FC52-6841-8DC4-A81DB071916E}">
+      <dsp:nvSpPr>
+        <dsp:cNvPr id="0" name=""/>
+        <dsp:cNvSpPr/>
+      </dsp:nvSpPr>
+      <dsp:spPr>
+        <a:xfrm>
+          <a:off x="7135177" y="524133"/>
+          <a:ext cx="2918936" cy="1853524"/>
+        </a:xfrm>
+        <a:prstGeom prst="roundRect">
+          <a:avLst>
+            <a:gd name="adj" fmla="val 10000"/>
+          </a:avLst>
+        </a:prstGeom>
+        <a:solidFill>
+          <a:schemeClr val="dk2">
+            <a:hueOff val="0"/>
+            <a:satOff val="0"/>
+            <a:lumOff val="0"/>
+            <a:alphaOff val="0"/>
+          </a:schemeClr>
+        </a:solidFill>
+        <a:ln w="19050" cap="flat" cmpd="sng" algn="ctr">
+          <a:solidFill>
+            <a:schemeClr val="lt2">
+              <a:hueOff val="0"/>
+              <a:satOff val="0"/>
+              <a:lumOff val="0"/>
+              <a:alphaOff val="0"/>
+            </a:schemeClr>
+          </a:solidFill>
+          <a:prstDash val="solid"/>
+          <a:miter lim="800000"/>
+        </a:ln>
+        <a:effectLst/>
+      </dsp:spPr>
+      <dsp:style>
+        <a:lnRef idx="2">
+          <a:scrgbClr r="0" g="0" b="0"/>
+        </a:lnRef>
+        <a:fillRef idx="1">
+          <a:scrgbClr r="0" g="0" b="0"/>
+        </a:fillRef>
+        <a:effectRef idx="0">
+          <a:scrgbClr r="0" g="0" b="0"/>
+        </a:effectRef>
+        <a:fontRef idx="minor">
+          <a:schemeClr val="lt1"/>
+        </a:fontRef>
+      </dsp:style>
+    </dsp:sp>
+    <dsp:sp modelId="{0DF91388-21D0-D64F-A04E-E05828D74C57}">
+      <dsp:nvSpPr>
+        <dsp:cNvPr id="0" name=""/>
+        <dsp:cNvSpPr/>
+      </dsp:nvSpPr>
+      <dsp:spPr>
+        <a:xfrm>
+          <a:off x="7459503" y="832243"/>
+          <a:ext cx="2918936" cy="1853524"/>
+        </a:xfrm>
+        <a:prstGeom prst="roundRect">
+          <a:avLst>
+            <a:gd name="adj" fmla="val 10000"/>
+          </a:avLst>
+        </a:prstGeom>
+        <a:solidFill>
+          <a:schemeClr val="lt2">
+            <a:alpha val="90000"/>
+            <a:hueOff val="0"/>
+            <a:satOff val="0"/>
+            <a:lumOff val="0"/>
+            <a:alphaOff val="0"/>
+          </a:schemeClr>
+        </a:solidFill>
+        <a:ln w="19050" cap="flat" cmpd="sng" algn="ctr">
+          <a:solidFill>
+            <a:schemeClr val="dk2">
+              <a:hueOff val="0"/>
+              <a:satOff val="0"/>
+              <a:lumOff val="0"/>
+              <a:alphaOff val="0"/>
+            </a:schemeClr>
+          </a:solidFill>
+          <a:prstDash val="solid"/>
+          <a:miter lim="800000"/>
+        </a:ln>
+        <a:effectLst/>
+      </dsp:spPr>
+      <dsp:style>
+        <a:lnRef idx="2">
+          <a:scrgbClr r="0" g="0" b="0"/>
+        </a:lnRef>
+        <a:fillRef idx="1">
+          <a:scrgbClr r="0" g="0" b="0"/>
+        </a:fillRef>
+        <a:effectRef idx="0">
+          <a:scrgbClr r="0" g="0" b="0"/>
+        </a:effectRef>
+        <a:fontRef idx="minor"/>
+      </dsp:style>
+      <dsp:txBody>
+        <a:bodyPr spcFirstLastPara="0" vert="horz" wrap="square" lIns="102870" tIns="102870" rIns="102870" bIns="102870" numCol="1" spcCol="1270" anchor="ctr" anchorCtr="0">
+          <a:noAutofit/>
+        </a:bodyPr>
+        <a:lstStyle/>
+        <a:p>
+          <a:pPr marL="0" lvl="0" indent="0" algn="ctr" defTabSz="1200150">
+            <a:lnSpc>
+              <a:spcPct val="90000"/>
+            </a:lnSpc>
+            <a:spcBef>
+              <a:spcPct val="0"/>
+            </a:spcBef>
+            <a:spcAft>
+              <a:spcPct val="35000"/>
+            </a:spcAft>
+            <a:buNone/>
+          </a:pPr>
+          <a:r>
+            <a:rPr lang="en-US" sz="2700" kern="1200"/>
+            <a:t>Further improving network security</a:t>
+          </a:r>
+        </a:p>
+      </dsp:txBody>
+      <dsp:txXfrm>
+        <a:off x="7513791" y="886531"/>
+        <a:ext cx="2810360" cy="1744948"/>
+      </dsp:txXfrm>
+    </dsp:sp>
+  </dsp:spTree>
+</dsp:drawing>
+</file>
+
 <file path=ppt/diagrams/layout1.xml><?xml version="1.0" encoding="utf-8"?>
 <dgm:layoutDef xmlns:dgm="http://schemas.openxmlformats.org/drawingml/2006/diagram" xmlns:a="http://schemas.openxmlformats.org/drawingml/2006/main" uniqueId="urn:microsoft.com/office/officeart/2005/8/layout/list1">
   <dgm:title val=""/>
@@ -16171,6 +17572,569 @@
 </dgm:layoutDef>
 </file>
 
+<file path=ppt/diagrams/layout7.xml><?xml version="1.0" encoding="utf-8"?>
+<dgm:layoutDef xmlns:dgm="http://schemas.openxmlformats.org/drawingml/2006/diagram" xmlns:a="http://schemas.openxmlformats.org/drawingml/2006/main" uniqueId="urn:microsoft.com/office/officeart/2005/8/layout/hierarchy1">
+  <dgm:title val=""/>
+  <dgm:desc val=""/>
+  <dgm:catLst>
+    <dgm:cat type="hierarchy" pri="2000"/>
+  </dgm:catLst>
+  <dgm:sampData>
+    <dgm:dataModel>
+      <dgm:ptLst>
+        <dgm:pt modelId="0" type="doc"/>
+        <dgm:pt modelId="1">
+          <dgm:prSet phldr="1"/>
+        </dgm:pt>
+        <dgm:pt modelId="2">
+          <dgm:prSet phldr="1"/>
+        </dgm:pt>
+        <dgm:pt modelId="21">
+          <dgm:prSet phldr="1"/>
+        </dgm:pt>
+        <dgm:pt modelId="22">
+          <dgm:prSet phldr="1"/>
+        </dgm:pt>
+        <dgm:pt modelId="3">
+          <dgm:prSet phldr="1"/>
+        </dgm:pt>
+        <dgm:pt modelId="31">
+          <dgm:prSet phldr="1"/>
+        </dgm:pt>
+      </dgm:ptLst>
+      <dgm:cxnLst>
+        <dgm:cxn modelId="4" srcId="0" destId="1" srcOrd="0" destOrd="0"/>
+        <dgm:cxn modelId="5" srcId="1" destId="2" srcOrd="0" destOrd="0"/>
+        <dgm:cxn modelId="6" srcId="1" destId="3" srcOrd="1" destOrd="0"/>
+        <dgm:cxn modelId="23" srcId="2" destId="21" srcOrd="0" destOrd="0"/>
+        <dgm:cxn modelId="24" srcId="2" destId="22" srcOrd="1" destOrd="0"/>
+        <dgm:cxn modelId="33" srcId="3" destId="31" srcOrd="0" destOrd="0"/>
+      </dgm:cxnLst>
+      <dgm:bg/>
+      <dgm:whole/>
+    </dgm:dataModel>
+  </dgm:sampData>
+  <dgm:styleData>
+    <dgm:dataModel>
+      <dgm:ptLst>
+        <dgm:pt modelId="0" type="doc"/>
+        <dgm:pt modelId="1"/>
+        <dgm:pt modelId="11"/>
+        <dgm:pt modelId="12"/>
+      </dgm:ptLst>
+      <dgm:cxnLst>
+        <dgm:cxn modelId="2" srcId="0" destId="1" srcOrd="0" destOrd="0"/>
+        <dgm:cxn modelId="13" srcId="1" destId="11" srcOrd="0" destOrd="0"/>
+        <dgm:cxn modelId="14" srcId="1" destId="12" srcOrd="1" destOrd="0"/>
+      </dgm:cxnLst>
+      <dgm:bg/>
+      <dgm:whole/>
+    </dgm:dataModel>
+  </dgm:styleData>
+  <dgm:clrData>
+    <dgm:dataModel>
+      <dgm:ptLst>
+        <dgm:pt modelId="0" type="doc"/>
+        <dgm:pt modelId="1"/>
+        <dgm:pt modelId="2"/>
+        <dgm:pt modelId="21"/>
+        <dgm:pt modelId="211"/>
+        <dgm:pt modelId="3"/>
+        <dgm:pt modelId="31"/>
+        <dgm:pt modelId="311"/>
+      </dgm:ptLst>
+      <dgm:cxnLst>
+        <dgm:cxn modelId="4" srcId="0" destId="1" srcOrd="0" destOrd="0"/>
+        <dgm:cxn modelId="5" srcId="1" destId="2" srcOrd="0" destOrd="0"/>
+        <dgm:cxn modelId="6" srcId="1" destId="3" srcOrd="1" destOrd="0"/>
+        <dgm:cxn modelId="23" srcId="2" destId="21" srcOrd="0" destOrd="0"/>
+        <dgm:cxn modelId="24" srcId="21" destId="211" srcOrd="0" destOrd="0"/>
+        <dgm:cxn modelId="33" srcId="3" destId="31" srcOrd="0" destOrd="0"/>
+        <dgm:cxn modelId="34" srcId="31" destId="311" srcOrd="0" destOrd="0"/>
+      </dgm:cxnLst>
+      <dgm:bg/>
+      <dgm:whole/>
+    </dgm:dataModel>
+  </dgm:clrData>
+  <dgm:layoutNode name="hierChild1">
+    <dgm:varLst>
+      <dgm:chPref val="1"/>
+      <dgm:dir/>
+      <dgm:animOne val="branch"/>
+      <dgm:animLvl val="lvl"/>
+      <dgm:resizeHandles/>
+    </dgm:varLst>
+    <dgm:choose name="Name0">
+      <dgm:if name="Name1" func="var" arg="dir" op="equ" val="norm">
+        <dgm:alg type="hierChild">
+          <dgm:param type="linDir" val="fromL"/>
+        </dgm:alg>
+      </dgm:if>
+      <dgm:else name="Name2">
+        <dgm:alg type="hierChild">
+          <dgm:param type="linDir" val="fromR"/>
+        </dgm:alg>
+      </dgm:else>
+    </dgm:choose>
+    <dgm:shape xmlns:r="http://schemas.openxmlformats.org/officeDocument/2006/relationships" r:blip="">
+      <dgm:adjLst/>
+    </dgm:shape>
+    <dgm:presOf/>
+    <dgm:constrLst>
+      <dgm:constr type="primFontSz" for="des" ptType="node" op="equ" val="65"/>
+      <dgm:constr type="w" for="des" forName="composite" refType="w"/>
+      <dgm:constr type="h" for="des" forName="composite" refType="w" refFor="des" refForName="composite" fact="0.667"/>
+      <dgm:constr type="w" for="des" forName="composite2" refType="w" refFor="des" refForName="composite"/>
+      <dgm:constr type="h" for="des" forName="composite2" refType="h" refFor="des" refForName="composite"/>
+      <dgm:constr type="w" for="des" forName="composite3" refType="w" refFor="des" refForName="composite"/>
+      <dgm:constr type="h" for="des" forName="composite3" refType="h" refFor="des" refForName="composite"/>
+      <dgm:constr type="w" for="des" forName="composite4" refType="w" refFor="des" refForName="composite"/>
+      <dgm:constr type="h" for="des" forName="composite4" refType="h" refFor="des" refForName="composite"/>
+      <dgm:constr type="w" for="des" forName="composite5" refType="w" refFor="des" refForName="composite"/>
+      <dgm:constr type="h" for="des" forName="composite5" refType="h" refFor="des" refForName="composite"/>
+      <dgm:constr type="sibSp" refType="w" refFor="des" refForName="composite" fact="0.1"/>
+      <dgm:constr type="sibSp" for="des" forName="hierChild2" refType="sibSp"/>
+      <dgm:constr type="sibSp" for="des" forName="hierChild3" refType="sibSp"/>
+      <dgm:constr type="sibSp" for="des" forName="hierChild4" refType="sibSp"/>
+      <dgm:constr type="sibSp" for="des" forName="hierChild5" refType="sibSp"/>
+      <dgm:constr type="sibSp" for="des" forName="hierChild6" refType="sibSp"/>
+      <dgm:constr type="sp" for="des" forName="hierRoot1" refType="h" refFor="des" refForName="composite" fact="0.25"/>
+      <dgm:constr type="sp" for="des" forName="hierRoot2" refType="sp" refFor="des" refForName="hierRoot1"/>
+      <dgm:constr type="sp" for="des" forName="hierRoot3" refType="sp" refFor="des" refForName="hierRoot1"/>
+      <dgm:constr type="sp" for="des" forName="hierRoot4" refType="sp" refFor="des" refForName="hierRoot1"/>
+      <dgm:constr type="sp" for="des" forName="hierRoot5" refType="sp" refFor="des" refForName="hierRoot1"/>
+    </dgm:constrLst>
+    <dgm:ruleLst/>
+    <dgm:forEach name="Name3" axis="ch">
+      <dgm:forEach name="Name4" axis="self" ptType="node">
+        <dgm:layoutNode name="hierRoot1">
+          <dgm:alg type="hierRoot"/>
+          <dgm:shape xmlns:r="http://schemas.openxmlformats.org/officeDocument/2006/relationships" r:blip="">
+            <dgm:adjLst/>
+          </dgm:shape>
+          <dgm:presOf/>
+          <dgm:constrLst>
+            <dgm:constr type="bendDist" for="des" ptType="parTrans" refType="sp" fact="0.5"/>
+          </dgm:constrLst>
+          <dgm:ruleLst/>
+          <dgm:layoutNode name="composite">
+            <dgm:alg type="composite"/>
+            <dgm:shape xmlns:r="http://schemas.openxmlformats.org/officeDocument/2006/relationships" r:blip="">
+              <dgm:adjLst/>
+            </dgm:shape>
+            <dgm:presOf/>
+            <dgm:constrLst>
+              <dgm:constr type="w" for="ch" forName="background" refType="w" fact="0.9"/>
+              <dgm:constr type="h" for="ch" forName="background" refType="w" refFor="ch" refForName="background" fact="0.635"/>
+              <dgm:constr type="t" for="ch" forName="background"/>
+              <dgm:constr type="l" for="ch" forName="background"/>
+              <dgm:constr type="w" for="ch" forName="text" refType="w" fact="0.9"/>
+              <dgm:constr type="h" for="ch" forName="text" refType="w" refFor="ch" refForName="text" fact="0.635"/>
+              <dgm:constr type="t" for="ch" forName="text" refType="w" fact="0.095"/>
+              <dgm:constr type="l" for="ch" forName="text" refType="w" fact="0.1"/>
+            </dgm:constrLst>
+            <dgm:ruleLst/>
+            <dgm:layoutNode name="background" styleLbl="node0" moveWith="text">
+              <dgm:alg type="sp"/>
+              <dgm:shape xmlns:r="http://schemas.openxmlformats.org/officeDocument/2006/relationships" type="roundRect" r:blip="">
+                <dgm:adjLst>
+                  <dgm:adj idx="1" val="0.1"/>
+                </dgm:adjLst>
+              </dgm:shape>
+              <dgm:presOf/>
+              <dgm:constrLst/>
+              <dgm:ruleLst/>
+            </dgm:layoutNode>
+            <dgm:layoutNode name="text" styleLbl="fgAcc0">
+              <dgm:varLst>
+                <dgm:chPref val="3"/>
+              </dgm:varLst>
+              <dgm:alg type="tx"/>
+              <dgm:shape xmlns:r="http://schemas.openxmlformats.org/officeDocument/2006/relationships" type="roundRect" r:blip="">
+                <dgm:adjLst>
+                  <dgm:adj idx="1" val="0.1"/>
+                </dgm:adjLst>
+              </dgm:shape>
+              <dgm:presOf axis="self"/>
+              <dgm:constrLst>
+                <dgm:constr type="tMarg" refType="primFontSz" fact="0.3"/>
+                <dgm:constr type="bMarg" refType="primFontSz" fact="0.3"/>
+                <dgm:constr type="lMarg" refType="primFontSz" fact="0.3"/>
+                <dgm:constr type="rMarg" refType="primFontSz" fact="0.3"/>
+              </dgm:constrLst>
+              <dgm:ruleLst>
+                <dgm:rule type="primFontSz" val="5" fact="NaN" max="NaN"/>
+              </dgm:ruleLst>
+            </dgm:layoutNode>
+          </dgm:layoutNode>
+          <dgm:layoutNode name="hierChild2">
+            <dgm:choose name="Name5">
+              <dgm:if name="Name6" func="var" arg="dir" op="equ" val="norm">
+                <dgm:alg type="hierChild">
+                  <dgm:param type="linDir" val="fromL"/>
+                </dgm:alg>
+              </dgm:if>
+              <dgm:else name="Name7">
+                <dgm:alg type="hierChild">
+                  <dgm:param type="linDir" val="fromR"/>
+                </dgm:alg>
+              </dgm:else>
+            </dgm:choose>
+            <dgm:shape xmlns:r="http://schemas.openxmlformats.org/officeDocument/2006/relationships" r:blip="">
+              <dgm:adjLst/>
+            </dgm:shape>
+            <dgm:presOf/>
+            <dgm:constrLst/>
+            <dgm:ruleLst/>
+            <dgm:forEach name="Name8" axis="ch">
+              <dgm:forEach name="Name9" axis="self" ptType="parTrans" cnt="1">
+                <dgm:layoutNode name="Name10">
+                  <dgm:alg type="conn">
+                    <dgm:param type="dim" val="1D"/>
+                    <dgm:param type="endSty" val="noArr"/>
+                    <dgm:param type="connRout" val="bend"/>
+                    <dgm:param type="bendPt" val="end"/>
+                    <dgm:param type="begPts" val="bCtr"/>
+                    <dgm:param type="endPts" val="tCtr"/>
+                    <dgm:param type="srcNode" val="background"/>
+                    <dgm:param type="dstNode" val="background2"/>
+                  </dgm:alg>
+                  <dgm:shape xmlns:r="http://schemas.openxmlformats.org/officeDocument/2006/relationships" type="conn" r:blip="" zOrderOff="-999">
+                    <dgm:adjLst/>
+                  </dgm:shape>
+                  <dgm:presOf axis="self"/>
+                  <dgm:constrLst>
+                    <dgm:constr type="begPad"/>
+                    <dgm:constr type="endPad"/>
+                  </dgm:constrLst>
+                  <dgm:ruleLst/>
+                </dgm:layoutNode>
+              </dgm:forEach>
+              <dgm:forEach name="Name11" axis="self" ptType="node">
+                <dgm:layoutNode name="hierRoot2">
+                  <dgm:alg type="hierRoot"/>
+                  <dgm:shape xmlns:r="http://schemas.openxmlformats.org/officeDocument/2006/relationships" r:blip="">
+                    <dgm:adjLst/>
+                  </dgm:shape>
+                  <dgm:presOf/>
+                  <dgm:constrLst>
+                    <dgm:constr type="bendDist" for="des" ptType="parTrans" refType="sp" fact="0.5"/>
+                  </dgm:constrLst>
+                  <dgm:ruleLst/>
+                  <dgm:layoutNode name="composite2">
+                    <dgm:alg type="composite"/>
+                    <dgm:shape xmlns:r="http://schemas.openxmlformats.org/officeDocument/2006/relationships" r:blip="">
+                      <dgm:adjLst/>
+                    </dgm:shape>
+                    <dgm:presOf/>
+                    <dgm:constrLst>
+                      <dgm:constr type="w" for="ch" forName="background2" refType="w" fact="0.9"/>
+                      <dgm:constr type="h" for="ch" forName="background2" refType="w" refFor="ch" refForName="background2" fact="0.635"/>
+                      <dgm:constr type="t" for="ch" forName="background2"/>
+                      <dgm:constr type="l" for="ch" forName="background2"/>
+                      <dgm:constr type="w" for="ch" forName="text2" refType="w" fact="0.9"/>
+                      <dgm:constr type="h" for="ch" forName="text2" refType="w" refFor="ch" refForName="text2" fact="0.635"/>
+                      <dgm:constr type="t" for="ch" forName="text2" refType="w" fact="0.095"/>
+                      <dgm:constr type="l" for="ch" forName="text2" refType="w" fact="0.1"/>
+                    </dgm:constrLst>
+                    <dgm:ruleLst/>
+                    <dgm:layoutNode name="background2" moveWith="text2">
+                      <dgm:alg type="sp"/>
+                      <dgm:shape xmlns:r="http://schemas.openxmlformats.org/officeDocument/2006/relationships" type="roundRect" r:blip="">
+                        <dgm:adjLst>
+                          <dgm:adj idx="1" val="0.1"/>
+                        </dgm:adjLst>
+                      </dgm:shape>
+                      <dgm:presOf/>
+                      <dgm:constrLst/>
+                      <dgm:ruleLst/>
+                    </dgm:layoutNode>
+                    <dgm:layoutNode name="text2" styleLbl="fgAcc2">
+                      <dgm:varLst>
+                        <dgm:chPref val="3"/>
+                      </dgm:varLst>
+                      <dgm:alg type="tx"/>
+                      <dgm:shape xmlns:r="http://schemas.openxmlformats.org/officeDocument/2006/relationships" type="roundRect" r:blip="">
+                        <dgm:adjLst>
+                          <dgm:adj idx="1" val="0.1"/>
+                        </dgm:adjLst>
+                      </dgm:shape>
+                      <dgm:presOf axis="self"/>
+                      <dgm:constrLst>
+                        <dgm:constr type="tMarg" refType="primFontSz" fact="0.3"/>
+                        <dgm:constr type="bMarg" refType="primFontSz" fact="0.3"/>
+                        <dgm:constr type="lMarg" refType="primFontSz" fact="0.3"/>
+                        <dgm:constr type="rMarg" refType="primFontSz" fact="0.3"/>
+                      </dgm:constrLst>
+                      <dgm:ruleLst>
+                        <dgm:rule type="primFontSz" val="5" fact="NaN" max="NaN"/>
+                      </dgm:ruleLst>
+                    </dgm:layoutNode>
+                  </dgm:layoutNode>
+                  <dgm:layoutNode name="hierChild3">
+                    <dgm:choose name="Name12">
+                      <dgm:if name="Name13" func="var" arg="dir" op="equ" val="norm">
+                        <dgm:alg type="hierChild">
+                          <dgm:param type="linDir" val="fromL"/>
+                        </dgm:alg>
+                      </dgm:if>
+                      <dgm:else name="Name14">
+                        <dgm:alg type="hierChild">
+                          <dgm:param type="linDir" val="fromR"/>
+                        </dgm:alg>
+                      </dgm:else>
+                    </dgm:choose>
+                    <dgm:shape xmlns:r="http://schemas.openxmlformats.org/officeDocument/2006/relationships" r:blip="">
+                      <dgm:adjLst/>
+                    </dgm:shape>
+                    <dgm:presOf/>
+                    <dgm:constrLst/>
+                    <dgm:ruleLst/>
+                    <dgm:forEach name="Name15" axis="ch">
+                      <dgm:forEach name="Name16" axis="self" ptType="parTrans" cnt="1">
+                        <dgm:layoutNode name="Name17">
+                          <dgm:alg type="conn">
+                            <dgm:param type="dim" val="1D"/>
+                            <dgm:param type="endSty" val="noArr"/>
+                            <dgm:param type="connRout" val="bend"/>
+                            <dgm:param type="bendPt" val="end"/>
+                            <dgm:param type="begPts" val="bCtr"/>
+                            <dgm:param type="endPts" val="tCtr"/>
+                            <dgm:param type="srcNode" val="background2"/>
+                            <dgm:param type="dstNode" val="background3"/>
+                          </dgm:alg>
+                          <dgm:shape xmlns:r="http://schemas.openxmlformats.org/officeDocument/2006/relationships" type="conn" r:blip="" zOrderOff="-999">
+                            <dgm:adjLst/>
+                          </dgm:shape>
+                          <dgm:presOf axis="self"/>
+                          <dgm:constrLst>
+                            <dgm:constr type="begPad"/>
+                            <dgm:constr type="endPad"/>
+                          </dgm:constrLst>
+                          <dgm:ruleLst/>
+                        </dgm:layoutNode>
+                      </dgm:forEach>
+                      <dgm:forEach name="Name18" axis="self" ptType="node">
+                        <dgm:layoutNode name="hierRoot3">
+                          <dgm:alg type="hierRoot"/>
+                          <dgm:shape xmlns:r="http://schemas.openxmlformats.org/officeDocument/2006/relationships" r:blip="">
+                            <dgm:adjLst/>
+                          </dgm:shape>
+                          <dgm:presOf/>
+                          <dgm:constrLst>
+                            <dgm:constr type="bendDist" for="des" ptType="parTrans" refType="sp" fact="0.5"/>
+                          </dgm:constrLst>
+                          <dgm:ruleLst/>
+                          <dgm:layoutNode name="composite3">
+                            <dgm:alg type="composite"/>
+                            <dgm:shape xmlns:r="http://schemas.openxmlformats.org/officeDocument/2006/relationships" r:blip="">
+                              <dgm:adjLst/>
+                            </dgm:shape>
+                            <dgm:presOf/>
+                            <dgm:constrLst>
+                              <dgm:constr type="w" for="ch" forName="background3" refType="w" fact="0.9"/>
+                              <dgm:constr type="h" for="ch" forName="background3" refType="w" refFor="ch" refForName="background3" fact="0.635"/>
+                              <dgm:constr type="t" for="ch" forName="background3"/>
+                              <dgm:constr type="l" for="ch" forName="background3"/>
+                              <dgm:constr type="w" for="ch" forName="text3" refType="w" fact="0.9"/>
+                              <dgm:constr type="h" for="ch" forName="text3" refType="w" refFor="ch" refForName="text3" fact="0.635"/>
+                              <dgm:constr type="t" for="ch" forName="text3" refType="w" fact="0.095"/>
+                              <dgm:constr type="l" for="ch" forName="text3" refType="w" fact="0.1"/>
+                            </dgm:constrLst>
+                            <dgm:ruleLst/>
+                            <dgm:layoutNode name="background3" moveWith="text3">
+                              <dgm:alg type="sp"/>
+                              <dgm:shape xmlns:r="http://schemas.openxmlformats.org/officeDocument/2006/relationships" type="roundRect" r:blip="">
+                                <dgm:adjLst>
+                                  <dgm:adj idx="1" val="0.1"/>
+                                </dgm:adjLst>
+                              </dgm:shape>
+                              <dgm:presOf/>
+                              <dgm:constrLst/>
+                              <dgm:ruleLst/>
+                            </dgm:layoutNode>
+                            <dgm:layoutNode name="text3" styleLbl="fgAcc3">
+                              <dgm:varLst>
+                                <dgm:chPref val="3"/>
+                              </dgm:varLst>
+                              <dgm:alg type="tx"/>
+                              <dgm:shape xmlns:r="http://schemas.openxmlformats.org/officeDocument/2006/relationships" type="roundRect" r:blip="">
+                                <dgm:adjLst>
+                                  <dgm:adj idx="1" val="0.1"/>
+                                </dgm:adjLst>
+                              </dgm:shape>
+                              <dgm:presOf axis="self"/>
+                              <dgm:constrLst>
+                                <dgm:constr type="tMarg" refType="primFontSz" fact="0.3"/>
+                                <dgm:constr type="bMarg" refType="primFontSz" fact="0.3"/>
+                                <dgm:constr type="lMarg" refType="primFontSz" fact="0.3"/>
+                                <dgm:constr type="rMarg" refType="primFontSz" fact="0.3"/>
+                              </dgm:constrLst>
+                              <dgm:ruleLst>
+                                <dgm:rule type="primFontSz" val="5" fact="NaN" max="NaN"/>
+                              </dgm:ruleLst>
+                            </dgm:layoutNode>
+                          </dgm:layoutNode>
+                          <dgm:layoutNode name="hierChild4">
+                            <dgm:choose name="Name19">
+                              <dgm:if name="Name20" func="var" arg="dir" op="equ" val="norm">
+                                <dgm:alg type="hierChild">
+                                  <dgm:param type="linDir" val="fromL"/>
+                                </dgm:alg>
+                              </dgm:if>
+                              <dgm:else name="Name21">
+                                <dgm:alg type="hierChild">
+                                  <dgm:param type="linDir" val="fromR"/>
+                                </dgm:alg>
+                              </dgm:else>
+                            </dgm:choose>
+                            <dgm:shape xmlns:r="http://schemas.openxmlformats.org/officeDocument/2006/relationships" r:blip="">
+                              <dgm:adjLst/>
+                            </dgm:shape>
+                            <dgm:presOf/>
+                            <dgm:constrLst/>
+                            <dgm:ruleLst/>
+                            <dgm:forEach name="repeat" axis="ch">
+                              <dgm:forEach name="Name22" axis="self" ptType="parTrans" cnt="1">
+                                <dgm:layoutNode name="Name23">
+                                  <dgm:choose name="Name24">
+                                    <dgm:if name="Name25" axis="self" func="depth" op="lte" val="4">
+                                      <dgm:alg type="conn">
+                                        <dgm:param type="dim" val="1D"/>
+                                        <dgm:param type="endSty" val="noArr"/>
+                                        <dgm:param type="connRout" val="bend"/>
+                                        <dgm:param type="bendPt" val="end"/>
+                                        <dgm:param type="begPts" val="bCtr"/>
+                                        <dgm:param type="endPts" val="tCtr"/>
+                                        <dgm:param type="srcNode" val="background3"/>
+                                        <dgm:param type="dstNode" val="background4"/>
+                                      </dgm:alg>
+                                    </dgm:if>
+                                    <dgm:else name="Name26">
+                                      <dgm:alg type="conn">
+                                        <dgm:param type="dim" val="1D"/>
+                                        <dgm:param type="endSty" val="noArr"/>
+                                        <dgm:param type="connRout" val="bend"/>
+                                        <dgm:param type="bendPt" val="end"/>
+                                        <dgm:param type="begPts" val="bCtr"/>
+                                        <dgm:param type="endPts" val="tCtr"/>
+                                        <dgm:param type="srcNode" val="background4"/>
+                                        <dgm:param type="dstNode" val="background4"/>
+                                      </dgm:alg>
+                                    </dgm:else>
+                                  </dgm:choose>
+                                  <dgm:shape xmlns:r="http://schemas.openxmlformats.org/officeDocument/2006/relationships" type="conn" r:blip="" zOrderOff="-999">
+                                    <dgm:adjLst/>
+                                  </dgm:shape>
+                                  <dgm:presOf axis="self"/>
+                                  <dgm:constrLst>
+                                    <dgm:constr type="begPad"/>
+                                    <dgm:constr type="endPad"/>
+                                  </dgm:constrLst>
+                                  <dgm:ruleLst/>
+                                </dgm:layoutNode>
+                              </dgm:forEach>
+                              <dgm:forEach name="Name27" axis="self" ptType="node">
+                                <dgm:layoutNode name="hierRoot4">
+                                  <dgm:alg type="hierRoot"/>
+                                  <dgm:shape xmlns:r="http://schemas.openxmlformats.org/officeDocument/2006/relationships" r:blip="">
+                                    <dgm:adjLst/>
+                                  </dgm:shape>
+                                  <dgm:presOf/>
+                                  <dgm:constrLst>
+                                    <dgm:constr type="bendDist" for="des" ptType="parTrans" refType="sp" fact="0.5"/>
+                                  </dgm:constrLst>
+                                  <dgm:ruleLst/>
+                                  <dgm:layoutNode name="composite4">
+                                    <dgm:alg type="composite"/>
+                                    <dgm:shape xmlns:r="http://schemas.openxmlformats.org/officeDocument/2006/relationships" r:blip="">
+                                      <dgm:adjLst/>
+                                    </dgm:shape>
+                                    <dgm:presOf/>
+                                    <dgm:constrLst>
+                                      <dgm:constr type="w" for="ch" forName="background4" refType="w" fact="0.9"/>
+                                      <dgm:constr type="h" for="ch" forName="background4" refType="w" refFor="ch" refForName="background4" fact="0.635"/>
+                                      <dgm:constr type="t" for="ch" forName="background4"/>
+                                      <dgm:constr type="l" for="ch" forName="background4"/>
+                                      <dgm:constr type="w" for="ch" forName="text4" refType="w" fact="0.9"/>
+                                      <dgm:constr type="h" for="ch" forName="text4" refType="w" refFor="ch" refForName="text4" fact="0.635"/>
+                                      <dgm:constr type="t" for="ch" forName="text4" refType="w" fact="0.095"/>
+                                      <dgm:constr type="l" for="ch" forName="text4" refType="w" fact="0.1"/>
+                                    </dgm:constrLst>
+                                    <dgm:ruleLst/>
+                                    <dgm:layoutNode name="background4" moveWith="text4">
+                                      <dgm:alg type="sp"/>
+                                      <dgm:shape xmlns:r="http://schemas.openxmlformats.org/officeDocument/2006/relationships" type="roundRect" r:blip="">
+                                        <dgm:adjLst>
+                                          <dgm:adj idx="1" val="0.1"/>
+                                        </dgm:adjLst>
+                                      </dgm:shape>
+                                      <dgm:presOf/>
+                                      <dgm:constrLst/>
+                                      <dgm:ruleLst/>
+                                    </dgm:layoutNode>
+                                    <dgm:layoutNode name="text4" styleLbl="fgAcc4">
+                                      <dgm:varLst>
+                                        <dgm:chPref val="3"/>
+                                      </dgm:varLst>
+                                      <dgm:alg type="tx"/>
+                                      <dgm:shape xmlns:r="http://schemas.openxmlformats.org/officeDocument/2006/relationships" type="roundRect" r:blip="">
+                                        <dgm:adjLst>
+                                          <dgm:adj idx="1" val="0.1"/>
+                                        </dgm:adjLst>
+                                      </dgm:shape>
+                                      <dgm:presOf axis="self"/>
+                                      <dgm:constrLst>
+                                        <dgm:constr type="tMarg" refType="primFontSz" fact="0.3"/>
+                                        <dgm:constr type="bMarg" refType="primFontSz" fact="0.3"/>
+                                        <dgm:constr type="lMarg" refType="primFontSz" fact="0.3"/>
+                                        <dgm:constr type="rMarg" refType="primFontSz" fact="0.3"/>
+                                      </dgm:constrLst>
+                                      <dgm:ruleLst>
+                                        <dgm:rule type="primFontSz" val="5" fact="NaN" max="NaN"/>
+                                      </dgm:ruleLst>
+                                    </dgm:layoutNode>
+                                  </dgm:layoutNode>
+                                  <dgm:layoutNode name="hierChild5">
+                                    <dgm:choose name="Name28">
+                                      <dgm:if name="Name29" func="var" arg="dir" op="equ" val="norm">
+                                        <dgm:alg type="hierChild">
+                                          <dgm:param type="linDir" val="fromL"/>
+                                        </dgm:alg>
+                                      </dgm:if>
+                                      <dgm:else name="Name30">
+                                        <dgm:alg type="hierChild">
+                                          <dgm:param type="linDir" val="fromR"/>
+                                        </dgm:alg>
+                                      </dgm:else>
+                                    </dgm:choose>
+                                    <dgm:shape xmlns:r="http://schemas.openxmlformats.org/officeDocument/2006/relationships" r:blip="">
+                                      <dgm:adjLst/>
+                                    </dgm:shape>
+                                    <dgm:presOf/>
+                                    <dgm:constrLst/>
+                                    <dgm:ruleLst/>
+                                    <dgm:forEach name="Name31" ref="repeat"/>
+                                  </dgm:layoutNode>
+                                </dgm:layoutNode>
+                              </dgm:forEach>
+                            </dgm:forEach>
+                          </dgm:layoutNode>
+                        </dgm:layoutNode>
+                      </dgm:forEach>
+                    </dgm:forEach>
+                  </dgm:layoutNode>
+                </dgm:layoutNode>
+              </dgm:forEach>
+            </dgm:forEach>
+          </dgm:layoutNode>
+        </dgm:layoutNode>
+      </dgm:forEach>
+    </dgm:forEach>
+  </dgm:layoutNode>
+</dgm:layoutDef>
+</file>
+
 <file path=ppt/diagrams/quickStyle1.xml><?xml version="1.0" encoding="utf-8"?>
 <dgm:styleDef xmlns:dgm="http://schemas.openxmlformats.org/drawingml/2006/diagram" xmlns:a="http://schemas.openxmlformats.org/drawingml/2006/main" uniqueId="urn:microsoft.com/office/officeart/2005/8/quickstyle/simple4">
   <dgm:title val=""/>
@@ -21342,6 +23306,1040 @@
 </file>
 
 <file path=ppt/diagrams/quickStyle6.xml><?xml version="1.0" encoding="utf-8"?>
+<dgm:styleDef xmlns:dgm="http://schemas.openxmlformats.org/drawingml/2006/diagram" xmlns:a="http://schemas.openxmlformats.org/drawingml/2006/main" uniqueId="urn:microsoft.com/office/officeart/2005/8/quickstyle/simple1">
+  <dgm:title val=""/>
+  <dgm:desc val=""/>
+  <dgm:catLst>
+    <dgm:cat type="simple" pri="10100"/>
+  </dgm:catLst>
+  <dgm:scene3d>
+    <a:camera prst="orthographicFront"/>
+    <a:lightRig rig="threePt" dir="t"/>
+  </dgm:scene3d>
+  <dgm:styleLbl name="node0">
+    <dgm:scene3d>
+      <a:camera prst="orthographicFront"/>
+      <a:lightRig rig="threePt" dir="t"/>
+    </dgm:scene3d>
+    <dgm:sp3d/>
+    <dgm:txPr/>
+    <dgm:style>
+      <a:lnRef idx="2">
+        <a:scrgbClr r="0" g="0" b="0"/>
+      </a:lnRef>
+      <a:fillRef idx="1">
+        <a:scrgbClr r="0" g="0" b="0"/>
+      </a:fillRef>
+      <a:effectRef idx="0">
+        <a:scrgbClr r="0" g="0" b="0"/>
+      </a:effectRef>
+      <a:fontRef idx="minor">
+        <a:schemeClr val="lt1"/>
+      </a:fontRef>
+    </dgm:style>
+  </dgm:styleLbl>
+  <dgm:styleLbl name="lnNode1">
+    <dgm:scene3d>
+      <a:camera prst="orthographicFront"/>
+      <a:lightRig rig="threePt" dir="t"/>
+    </dgm:scene3d>
+    <dgm:sp3d/>
+    <dgm:txPr/>
+    <dgm:style>
+      <a:lnRef idx="2">
+        <a:scrgbClr r="0" g="0" b="0"/>
+      </a:lnRef>
+      <a:fillRef idx="1">
+        <a:scrgbClr r="0" g="0" b="0"/>
+      </a:fillRef>
+      <a:effectRef idx="0">
+        <a:scrgbClr r="0" g="0" b="0"/>
+      </a:effectRef>
+      <a:fontRef idx="minor">
+        <a:schemeClr val="lt1"/>
+      </a:fontRef>
+    </dgm:style>
+  </dgm:styleLbl>
+  <dgm:styleLbl name="vennNode1">
+    <dgm:scene3d>
+      <a:camera prst="orthographicFront"/>
+      <a:lightRig rig="threePt" dir="t"/>
+    </dgm:scene3d>
+    <dgm:sp3d/>
+    <dgm:txPr/>
+    <dgm:style>
+      <a:lnRef idx="2">
+        <a:scrgbClr r="0" g="0" b="0"/>
+      </a:lnRef>
+      <a:fillRef idx="1">
+        <a:scrgbClr r="0" g="0" b="0"/>
+      </a:fillRef>
+      <a:effectRef idx="0">
+        <a:scrgbClr r="0" g="0" b="0"/>
+      </a:effectRef>
+      <a:fontRef idx="minor">
+        <a:schemeClr val="tx1"/>
+      </a:fontRef>
+    </dgm:style>
+  </dgm:styleLbl>
+  <dgm:styleLbl name="alignNode1">
+    <dgm:scene3d>
+      <a:camera prst="orthographicFront"/>
+      <a:lightRig rig="threePt" dir="t"/>
+    </dgm:scene3d>
+    <dgm:sp3d/>
+    <dgm:txPr/>
+    <dgm:style>
+      <a:lnRef idx="2">
+        <a:scrgbClr r="0" g="0" b="0"/>
+      </a:lnRef>
+      <a:fillRef idx="1">
+        <a:scrgbClr r="0" g="0" b="0"/>
+      </a:fillRef>
+      <a:effectRef idx="0">
+        <a:scrgbClr r="0" g="0" b="0"/>
+      </a:effectRef>
+      <a:fontRef idx="minor">
+        <a:schemeClr val="lt1"/>
+      </a:fontRef>
+    </dgm:style>
+  </dgm:styleLbl>
+  <dgm:styleLbl name="node1">
+    <dgm:scene3d>
+      <a:camera prst="orthographicFront"/>
+      <a:lightRig rig="threePt" dir="t"/>
+    </dgm:scene3d>
+    <dgm:sp3d/>
+    <dgm:txPr/>
+    <dgm:style>
+      <a:lnRef idx="2">
+        <a:scrgbClr r="0" g="0" b="0"/>
+      </a:lnRef>
+      <a:fillRef idx="1">
+        <a:scrgbClr r="0" g="0" b="0"/>
+      </a:fillRef>
+      <a:effectRef idx="0">
+        <a:scrgbClr r="0" g="0" b="0"/>
+      </a:effectRef>
+      <a:fontRef idx="minor">
+        <a:schemeClr val="lt1"/>
+      </a:fontRef>
+    </dgm:style>
+  </dgm:styleLbl>
+  <dgm:styleLbl name="node2">
+    <dgm:scene3d>
+      <a:camera prst="orthographicFront"/>
+      <a:lightRig rig="threePt" dir="t"/>
+    </dgm:scene3d>
+    <dgm:sp3d/>
+    <dgm:txPr/>
+    <dgm:style>
+      <a:lnRef idx="2">
+        <a:scrgbClr r="0" g="0" b="0"/>
+      </a:lnRef>
+      <a:fillRef idx="1">
+        <a:scrgbClr r="0" g="0" b="0"/>
+      </a:fillRef>
+      <a:effectRef idx="0">
+        <a:scrgbClr r="0" g="0" b="0"/>
+      </a:effectRef>
+      <a:fontRef idx="minor">
+        <a:schemeClr val="lt1"/>
+      </a:fontRef>
+    </dgm:style>
+  </dgm:styleLbl>
+  <dgm:styleLbl name="node3">
+    <dgm:scene3d>
+      <a:camera prst="orthographicFront"/>
+      <a:lightRig rig="threePt" dir="t"/>
+    </dgm:scene3d>
+    <dgm:sp3d/>
+    <dgm:txPr/>
+    <dgm:style>
+      <a:lnRef idx="2">
+        <a:scrgbClr r="0" g="0" b="0"/>
+      </a:lnRef>
+      <a:fillRef idx="1">
+        <a:scrgbClr r="0" g="0" b="0"/>
+      </a:fillRef>
+      <a:effectRef idx="0">
+        <a:scrgbClr r="0" g="0" b="0"/>
+      </a:effectRef>
+      <a:fontRef idx="minor">
+        <a:schemeClr val="lt1"/>
+      </a:fontRef>
+    </dgm:style>
+  </dgm:styleLbl>
+  <dgm:styleLbl name="node4">
+    <dgm:scene3d>
+      <a:camera prst="orthographicFront"/>
+      <a:lightRig rig="threePt" dir="t"/>
+    </dgm:scene3d>
+    <dgm:sp3d/>
+    <dgm:txPr/>
+    <dgm:style>
+      <a:lnRef idx="2">
+        <a:scrgbClr r="0" g="0" b="0"/>
+      </a:lnRef>
+      <a:fillRef idx="1">
+        <a:scrgbClr r="0" g="0" b="0"/>
+      </a:fillRef>
+      <a:effectRef idx="0">
+        <a:scrgbClr r="0" g="0" b="0"/>
+      </a:effectRef>
+      <a:fontRef idx="minor">
+        <a:schemeClr val="lt1"/>
+      </a:fontRef>
+    </dgm:style>
+  </dgm:styleLbl>
+  <dgm:styleLbl name="fgImgPlace1">
+    <dgm:scene3d>
+      <a:camera prst="orthographicFront"/>
+      <a:lightRig rig="threePt" dir="t"/>
+    </dgm:scene3d>
+    <dgm:sp3d/>
+    <dgm:txPr/>
+    <dgm:style>
+      <a:lnRef idx="2">
+        <a:scrgbClr r="0" g="0" b="0"/>
+      </a:lnRef>
+      <a:fillRef idx="1">
+        <a:scrgbClr r="0" g="0" b="0"/>
+      </a:fillRef>
+      <a:effectRef idx="0">
+        <a:scrgbClr r="0" g="0" b="0"/>
+      </a:effectRef>
+      <a:fontRef idx="minor"/>
+    </dgm:style>
+  </dgm:styleLbl>
+  <dgm:styleLbl name="alignImgPlace1">
+    <dgm:scene3d>
+      <a:camera prst="orthographicFront"/>
+      <a:lightRig rig="threePt" dir="t"/>
+    </dgm:scene3d>
+    <dgm:sp3d/>
+    <dgm:txPr/>
+    <dgm:style>
+      <a:lnRef idx="2">
+        <a:scrgbClr r="0" g="0" b="0"/>
+      </a:lnRef>
+      <a:fillRef idx="1">
+        <a:scrgbClr r="0" g="0" b="0"/>
+      </a:fillRef>
+      <a:effectRef idx="0">
+        <a:scrgbClr r="0" g="0" b="0"/>
+      </a:effectRef>
+      <a:fontRef idx="minor"/>
+    </dgm:style>
+  </dgm:styleLbl>
+  <dgm:styleLbl name="bgImgPlace1">
+    <dgm:scene3d>
+      <a:camera prst="orthographicFront"/>
+      <a:lightRig rig="threePt" dir="t"/>
+    </dgm:scene3d>
+    <dgm:sp3d/>
+    <dgm:txPr/>
+    <dgm:style>
+      <a:lnRef idx="2">
+        <a:scrgbClr r="0" g="0" b="0"/>
+      </a:lnRef>
+      <a:fillRef idx="1">
+        <a:scrgbClr r="0" g="0" b="0"/>
+      </a:fillRef>
+      <a:effectRef idx="0">
+        <a:scrgbClr r="0" g="0" b="0"/>
+      </a:effectRef>
+      <a:fontRef idx="minor"/>
+    </dgm:style>
+  </dgm:styleLbl>
+  <dgm:styleLbl name="sibTrans2D1">
+    <dgm:scene3d>
+      <a:camera prst="orthographicFront"/>
+      <a:lightRig rig="threePt" dir="t"/>
+    </dgm:scene3d>
+    <dgm:sp3d/>
+    <dgm:txPr/>
+    <dgm:style>
+      <a:lnRef idx="0">
+        <a:scrgbClr r="0" g="0" b="0"/>
+      </a:lnRef>
+      <a:fillRef idx="1">
+        <a:scrgbClr r="0" g="0" b="0"/>
+      </a:fillRef>
+      <a:effectRef idx="0">
+        <a:scrgbClr r="0" g="0" b="0"/>
+      </a:effectRef>
+      <a:fontRef idx="minor">
+        <a:schemeClr val="lt1"/>
+      </a:fontRef>
+    </dgm:style>
+  </dgm:styleLbl>
+  <dgm:styleLbl name="fgSibTrans2D1">
+    <dgm:scene3d>
+      <a:camera prst="orthographicFront"/>
+      <a:lightRig rig="threePt" dir="t"/>
+    </dgm:scene3d>
+    <dgm:sp3d/>
+    <dgm:txPr/>
+    <dgm:style>
+      <a:lnRef idx="0">
+        <a:scrgbClr r="0" g="0" b="0"/>
+      </a:lnRef>
+      <a:fillRef idx="1">
+        <a:scrgbClr r="0" g="0" b="0"/>
+      </a:fillRef>
+      <a:effectRef idx="0">
+        <a:scrgbClr r="0" g="0" b="0"/>
+      </a:effectRef>
+      <a:fontRef idx="minor">
+        <a:schemeClr val="lt1"/>
+      </a:fontRef>
+    </dgm:style>
+  </dgm:styleLbl>
+  <dgm:styleLbl name="bgSibTrans2D1">
+    <dgm:scene3d>
+      <a:camera prst="orthographicFront"/>
+      <a:lightRig rig="threePt" dir="t"/>
+    </dgm:scene3d>
+    <dgm:sp3d/>
+    <dgm:txPr/>
+    <dgm:style>
+      <a:lnRef idx="0">
+        <a:scrgbClr r="0" g="0" b="0"/>
+      </a:lnRef>
+      <a:fillRef idx="1">
+        <a:scrgbClr r="0" g="0" b="0"/>
+      </a:fillRef>
+      <a:effectRef idx="0">
+        <a:scrgbClr r="0" g="0" b="0"/>
+      </a:effectRef>
+      <a:fontRef idx="minor">
+        <a:schemeClr val="lt1"/>
+      </a:fontRef>
+    </dgm:style>
+  </dgm:styleLbl>
+  <dgm:styleLbl name="sibTrans1D1">
+    <dgm:scene3d>
+      <a:camera prst="orthographicFront"/>
+      <a:lightRig rig="threePt" dir="t"/>
+    </dgm:scene3d>
+    <dgm:sp3d/>
+    <dgm:txPr/>
+    <dgm:style>
+      <a:lnRef idx="1">
+        <a:scrgbClr r="0" g="0" b="0"/>
+      </a:lnRef>
+      <a:fillRef idx="0">
+        <a:scrgbClr r="0" g="0" b="0"/>
+      </a:fillRef>
+      <a:effectRef idx="0">
+        <a:scrgbClr r="0" g="0" b="0"/>
+      </a:effectRef>
+      <a:fontRef idx="minor"/>
+    </dgm:style>
+  </dgm:styleLbl>
+  <dgm:styleLbl name="callout">
+    <dgm:scene3d>
+      <a:camera prst="orthographicFront"/>
+      <a:lightRig rig="threePt" dir="t"/>
+    </dgm:scene3d>
+    <dgm:sp3d/>
+    <dgm:txPr/>
+    <dgm:style>
+      <a:lnRef idx="2">
+        <a:scrgbClr r="0" g="0" b="0"/>
+      </a:lnRef>
+      <a:fillRef idx="1">
+        <a:scrgbClr r="0" g="0" b="0"/>
+      </a:fillRef>
+      <a:effectRef idx="0">
+        <a:scrgbClr r="0" g="0" b="0"/>
+      </a:effectRef>
+      <a:fontRef idx="minor"/>
+    </dgm:style>
+  </dgm:styleLbl>
+  <dgm:styleLbl name="asst0">
+    <dgm:scene3d>
+      <a:camera prst="orthographicFront"/>
+      <a:lightRig rig="threePt" dir="t"/>
+    </dgm:scene3d>
+    <dgm:sp3d/>
+    <dgm:txPr/>
+    <dgm:style>
+      <a:lnRef idx="2">
+        <a:scrgbClr r="0" g="0" b="0"/>
+      </a:lnRef>
+      <a:fillRef idx="1">
+        <a:scrgbClr r="0" g="0" b="0"/>
+      </a:fillRef>
+      <a:effectRef idx="0">
+        <a:scrgbClr r="0" g="0" b="0"/>
+      </a:effectRef>
+      <a:fontRef idx="minor">
+        <a:schemeClr val="lt1"/>
+      </a:fontRef>
+    </dgm:style>
+  </dgm:styleLbl>
+  <dgm:styleLbl name="asst1">
+    <dgm:scene3d>
+      <a:camera prst="orthographicFront"/>
+      <a:lightRig rig="threePt" dir="t"/>
+    </dgm:scene3d>
+    <dgm:sp3d/>
+    <dgm:txPr/>
+    <dgm:style>
+      <a:lnRef idx="2">
+        <a:scrgbClr r="0" g="0" b="0"/>
+      </a:lnRef>
+      <a:fillRef idx="1">
+        <a:scrgbClr r="0" g="0" b="0"/>
+      </a:fillRef>
+      <a:effectRef idx="0">
+        <a:scrgbClr r="0" g="0" b="0"/>
+      </a:effectRef>
+      <a:fontRef idx="minor">
+        <a:schemeClr val="lt1"/>
+      </a:fontRef>
+    </dgm:style>
+  </dgm:styleLbl>
+  <dgm:styleLbl name="asst2">
+    <dgm:scene3d>
+      <a:camera prst="orthographicFront"/>
+      <a:lightRig rig="threePt" dir="t"/>
+    </dgm:scene3d>
+    <dgm:sp3d/>
+    <dgm:txPr/>
+    <dgm:style>
+      <a:lnRef idx="2">
+        <a:scrgbClr r="0" g="0" b="0"/>
+      </a:lnRef>
+      <a:fillRef idx="1">
+        <a:scrgbClr r="0" g="0" b="0"/>
+      </a:fillRef>
+      <a:effectRef idx="0">
+        <a:scrgbClr r="0" g="0" b="0"/>
+      </a:effectRef>
+      <a:fontRef idx="minor">
+        <a:schemeClr val="lt1"/>
+      </a:fontRef>
+    </dgm:style>
+  </dgm:styleLbl>
+  <dgm:styleLbl name="asst3">
+    <dgm:scene3d>
+      <a:camera prst="orthographicFront"/>
+      <a:lightRig rig="threePt" dir="t"/>
+    </dgm:scene3d>
+    <dgm:sp3d/>
+    <dgm:txPr/>
+    <dgm:style>
+      <a:lnRef idx="2">
+        <a:scrgbClr r="0" g="0" b="0"/>
+      </a:lnRef>
+      <a:fillRef idx="1">
+        <a:scrgbClr r="0" g="0" b="0"/>
+      </a:fillRef>
+      <a:effectRef idx="0">
+        <a:scrgbClr r="0" g="0" b="0"/>
+      </a:effectRef>
+      <a:fontRef idx="minor">
+        <a:schemeClr val="lt1"/>
+      </a:fontRef>
+    </dgm:style>
+  </dgm:styleLbl>
+  <dgm:styleLbl name="asst4">
+    <dgm:scene3d>
+      <a:camera prst="orthographicFront"/>
+      <a:lightRig rig="threePt" dir="t"/>
+    </dgm:scene3d>
+    <dgm:sp3d/>
+    <dgm:txPr/>
+    <dgm:style>
+      <a:lnRef idx="2">
+        <a:scrgbClr r="0" g="0" b="0"/>
+      </a:lnRef>
+      <a:fillRef idx="1">
+        <a:scrgbClr r="0" g="0" b="0"/>
+      </a:fillRef>
+      <a:effectRef idx="0">
+        <a:scrgbClr r="0" g="0" b="0"/>
+      </a:effectRef>
+      <a:fontRef idx="minor">
+        <a:schemeClr val="lt1"/>
+      </a:fontRef>
+    </dgm:style>
+  </dgm:styleLbl>
+  <dgm:styleLbl name="parChTrans2D1">
+    <dgm:scene3d>
+      <a:camera prst="orthographicFront"/>
+      <a:lightRig rig="threePt" dir="t"/>
+    </dgm:scene3d>
+    <dgm:sp3d/>
+    <dgm:txPr/>
+    <dgm:style>
+      <a:lnRef idx="2">
+        <a:scrgbClr r="0" g="0" b="0"/>
+      </a:lnRef>
+      <a:fillRef idx="1">
+        <a:scrgbClr r="0" g="0" b="0"/>
+      </a:fillRef>
+      <a:effectRef idx="0">
+        <a:scrgbClr r="0" g="0" b="0"/>
+      </a:effectRef>
+      <a:fontRef idx="minor">
+        <a:schemeClr val="lt1"/>
+      </a:fontRef>
+    </dgm:style>
+  </dgm:styleLbl>
+  <dgm:styleLbl name="parChTrans2D2">
+    <dgm:scene3d>
+      <a:camera prst="orthographicFront"/>
+      <a:lightRig rig="threePt" dir="t"/>
+    </dgm:scene3d>
+    <dgm:sp3d/>
+    <dgm:txPr/>
+    <dgm:style>
+      <a:lnRef idx="2">
+        <a:scrgbClr r="0" g="0" b="0"/>
+      </a:lnRef>
+      <a:fillRef idx="1">
+        <a:scrgbClr r="0" g="0" b="0"/>
+      </a:fillRef>
+      <a:effectRef idx="0">
+        <a:scrgbClr r="0" g="0" b="0"/>
+      </a:effectRef>
+      <a:fontRef idx="minor">
+        <a:schemeClr val="lt1"/>
+      </a:fontRef>
+    </dgm:style>
+  </dgm:styleLbl>
+  <dgm:styleLbl name="parChTrans2D3">
+    <dgm:scene3d>
+      <a:camera prst="orthographicFront"/>
+      <a:lightRig rig="threePt" dir="t"/>
+    </dgm:scene3d>
+    <dgm:sp3d/>
+    <dgm:txPr/>
+    <dgm:style>
+      <a:lnRef idx="2">
+        <a:scrgbClr r="0" g="0" b="0"/>
+      </a:lnRef>
+      <a:fillRef idx="1">
+        <a:scrgbClr r="0" g="0" b="0"/>
+      </a:fillRef>
+      <a:effectRef idx="0">
+        <a:scrgbClr r="0" g="0" b="0"/>
+      </a:effectRef>
+      <a:fontRef idx="minor">
+        <a:schemeClr val="lt1"/>
+      </a:fontRef>
+    </dgm:style>
+  </dgm:styleLbl>
+  <dgm:styleLbl name="parChTrans2D4">
+    <dgm:scene3d>
+      <a:camera prst="orthographicFront"/>
+      <a:lightRig rig="threePt" dir="t"/>
+    </dgm:scene3d>
+    <dgm:sp3d/>
+    <dgm:txPr/>
+    <dgm:style>
+      <a:lnRef idx="2">
+        <a:scrgbClr r="0" g="0" b="0"/>
+      </a:lnRef>
+      <a:fillRef idx="1">
+        <a:scrgbClr r="0" g="0" b="0"/>
+      </a:fillRef>
+      <a:effectRef idx="0">
+        <a:scrgbClr r="0" g="0" b="0"/>
+      </a:effectRef>
+      <a:fontRef idx="minor">
+        <a:schemeClr val="lt1"/>
+      </a:fontRef>
+    </dgm:style>
+  </dgm:styleLbl>
+  <dgm:styleLbl name="parChTrans1D1">
+    <dgm:scene3d>
+      <a:camera prst="orthographicFront"/>
+      <a:lightRig rig="threePt" dir="t"/>
+    </dgm:scene3d>
+    <dgm:sp3d/>
+    <dgm:txPr/>
+    <dgm:style>
+      <a:lnRef idx="2">
+        <a:scrgbClr r="0" g="0" b="0"/>
+      </a:lnRef>
+      <a:fillRef idx="0">
+        <a:scrgbClr r="0" g="0" b="0"/>
+      </a:fillRef>
+      <a:effectRef idx="0">
+        <a:scrgbClr r="0" g="0" b="0"/>
+      </a:effectRef>
+      <a:fontRef idx="minor"/>
+    </dgm:style>
+  </dgm:styleLbl>
+  <dgm:styleLbl name="parChTrans1D2">
+    <dgm:scene3d>
+      <a:camera prst="orthographicFront"/>
+      <a:lightRig rig="threePt" dir="t"/>
+    </dgm:scene3d>
+    <dgm:sp3d/>
+    <dgm:txPr/>
+    <dgm:style>
+      <a:lnRef idx="2">
+        <a:scrgbClr r="0" g="0" b="0"/>
+      </a:lnRef>
+      <a:fillRef idx="0">
+        <a:scrgbClr r="0" g="0" b="0"/>
+      </a:fillRef>
+      <a:effectRef idx="0">
+        <a:scrgbClr r="0" g="0" b="0"/>
+      </a:effectRef>
+      <a:fontRef idx="minor"/>
+    </dgm:style>
+  </dgm:styleLbl>
+  <dgm:styleLbl name="parChTrans1D3">
+    <dgm:scene3d>
+      <a:camera prst="orthographicFront"/>
+      <a:lightRig rig="threePt" dir="t"/>
+    </dgm:scene3d>
+    <dgm:sp3d/>
+    <dgm:txPr/>
+    <dgm:style>
+      <a:lnRef idx="2">
+        <a:scrgbClr r="0" g="0" b="0"/>
+      </a:lnRef>
+      <a:fillRef idx="0">
+        <a:scrgbClr r="0" g="0" b="0"/>
+      </a:fillRef>
+      <a:effectRef idx="0">
+        <a:scrgbClr r="0" g="0" b="0"/>
+      </a:effectRef>
+      <a:fontRef idx="minor"/>
+    </dgm:style>
+  </dgm:styleLbl>
+  <dgm:styleLbl name="parChTrans1D4">
+    <dgm:scene3d>
+      <a:camera prst="orthographicFront"/>
+      <a:lightRig rig="threePt" dir="t"/>
+    </dgm:scene3d>
+    <dgm:sp3d/>
+    <dgm:txPr/>
+    <dgm:style>
+      <a:lnRef idx="2">
+        <a:scrgbClr r="0" g="0" b="0"/>
+      </a:lnRef>
+      <a:fillRef idx="0">
+        <a:scrgbClr r="0" g="0" b="0"/>
+      </a:fillRef>
+      <a:effectRef idx="0">
+        <a:scrgbClr r="0" g="0" b="0"/>
+      </a:effectRef>
+      <a:fontRef idx="minor"/>
+    </dgm:style>
+  </dgm:styleLbl>
+  <dgm:styleLbl name="fgAcc1">
+    <dgm:scene3d>
+      <a:camera prst="orthographicFront"/>
+      <a:lightRig rig="threePt" dir="t"/>
+    </dgm:scene3d>
+    <dgm:sp3d/>
+    <dgm:txPr/>
+    <dgm:style>
+      <a:lnRef idx="2">
+        <a:scrgbClr r="0" g="0" b="0"/>
+      </a:lnRef>
+      <a:fillRef idx="1">
+        <a:scrgbClr r="0" g="0" b="0"/>
+      </a:fillRef>
+      <a:effectRef idx="0">
+        <a:scrgbClr r="0" g="0" b="0"/>
+      </a:effectRef>
+      <a:fontRef idx="minor"/>
+    </dgm:style>
+  </dgm:styleLbl>
+  <dgm:styleLbl name="conFgAcc1">
+    <dgm:scene3d>
+      <a:camera prst="orthographicFront"/>
+      <a:lightRig rig="threePt" dir="t"/>
+    </dgm:scene3d>
+    <dgm:sp3d/>
+    <dgm:txPr/>
+    <dgm:style>
+      <a:lnRef idx="2">
+        <a:scrgbClr r="0" g="0" b="0"/>
+      </a:lnRef>
+      <a:fillRef idx="1">
+        <a:scrgbClr r="0" g="0" b="0"/>
+      </a:fillRef>
+      <a:effectRef idx="0">
+        <a:scrgbClr r="0" g="0" b="0"/>
+      </a:effectRef>
+      <a:fontRef idx="minor"/>
+    </dgm:style>
+  </dgm:styleLbl>
+  <dgm:styleLbl name="alignAcc1">
+    <dgm:scene3d>
+      <a:camera prst="orthographicFront"/>
+      <a:lightRig rig="threePt" dir="t"/>
+    </dgm:scene3d>
+    <dgm:sp3d/>
+    <dgm:txPr/>
+    <dgm:style>
+      <a:lnRef idx="2">
+        <a:scrgbClr r="0" g="0" b="0"/>
+      </a:lnRef>
+      <a:fillRef idx="1">
+        <a:scrgbClr r="0" g="0" b="0"/>
+      </a:fillRef>
+      <a:effectRef idx="0">
+        <a:scrgbClr r="0" g="0" b="0"/>
+      </a:effectRef>
+      <a:fontRef idx="minor"/>
+    </dgm:style>
+  </dgm:styleLbl>
+  <dgm:styleLbl name="trAlignAcc1">
+    <dgm:scene3d>
+      <a:camera prst="orthographicFront"/>
+      <a:lightRig rig="threePt" dir="t"/>
+    </dgm:scene3d>
+    <dgm:sp3d/>
+    <dgm:txPr/>
+    <dgm:style>
+      <a:lnRef idx="1">
+        <a:scrgbClr r="0" g="0" b="0"/>
+      </a:lnRef>
+      <a:fillRef idx="1">
+        <a:scrgbClr r="0" g="0" b="0"/>
+      </a:fillRef>
+      <a:effectRef idx="0">
+        <a:scrgbClr r="0" g="0" b="0"/>
+      </a:effectRef>
+      <a:fontRef idx="minor"/>
+    </dgm:style>
+  </dgm:styleLbl>
+  <dgm:styleLbl name="bgAcc1">
+    <dgm:scene3d>
+      <a:camera prst="orthographicFront"/>
+      <a:lightRig rig="threePt" dir="t"/>
+    </dgm:scene3d>
+    <dgm:sp3d/>
+    <dgm:txPr/>
+    <dgm:style>
+      <a:lnRef idx="2">
+        <a:scrgbClr r="0" g="0" b="0"/>
+      </a:lnRef>
+      <a:fillRef idx="1">
+        <a:scrgbClr r="0" g="0" b="0"/>
+      </a:fillRef>
+      <a:effectRef idx="0">
+        <a:scrgbClr r="0" g="0" b="0"/>
+      </a:effectRef>
+      <a:fontRef idx="minor"/>
+    </dgm:style>
+  </dgm:styleLbl>
+  <dgm:styleLbl name="solidFgAcc1">
+    <dgm:scene3d>
+      <a:camera prst="orthographicFront"/>
+      <a:lightRig rig="threePt" dir="t"/>
+    </dgm:scene3d>
+    <dgm:sp3d/>
+    <dgm:txPr/>
+    <dgm:style>
+      <a:lnRef idx="2">
+        <a:scrgbClr r="0" g="0" b="0"/>
+      </a:lnRef>
+      <a:fillRef idx="1">
+        <a:scrgbClr r="0" g="0" b="0"/>
+      </a:fillRef>
+      <a:effectRef idx="0">
+        <a:scrgbClr r="0" g="0" b="0"/>
+      </a:effectRef>
+      <a:fontRef idx="minor"/>
+    </dgm:style>
+  </dgm:styleLbl>
+  <dgm:styleLbl name="solidAlignAcc1">
+    <dgm:scene3d>
+      <a:camera prst="orthographicFront"/>
+      <a:lightRig rig="threePt" dir="t"/>
+    </dgm:scene3d>
+    <dgm:sp3d/>
+    <dgm:txPr/>
+    <dgm:style>
+      <a:lnRef idx="2">
+        <a:scrgbClr r="0" g="0" b="0"/>
+      </a:lnRef>
+      <a:fillRef idx="1">
+        <a:scrgbClr r="0" g="0" b="0"/>
+      </a:fillRef>
+      <a:effectRef idx="0">
+        <a:scrgbClr r="0" g="0" b="0"/>
+      </a:effectRef>
+      <a:fontRef idx="minor"/>
+    </dgm:style>
+  </dgm:styleLbl>
+  <dgm:styleLbl name="solidBgAcc1">
+    <dgm:scene3d>
+      <a:camera prst="orthographicFront"/>
+      <a:lightRig rig="threePt" dir="t"/>
+    </dgm:scene3d>
+    <dgm:sp3d/>
+    <dgm:txPr/>
+    <dgm:style>
+      <a:lnRef idx="2">
+        <a:scrgbClr r="0" g="0" b="0"/>
+      </a:lnRef>
+      <a:fillRef idx="1">
+        <a:scrgbClr r="0" g="0" b="0"/>
+      </a:fillRef>
+      <a:effectRef idx="0">
+        <a:scrgbClr r="0" g="0" b="0"/>
+      </a:effectRef>
+      <a:fontRef idx="minor"/>
+    </dgm:style>
+  </dgm:styleLbl>
+  <dgm:styleLbl name="fgAccFollowNode1">
+    <dgm:scene3d>
+      <a:camera prst="orthographicFront"/>
+      <a:lightRig rig="threePt" dir="t"/>
+    </dgm:scene3d>
+    <dgm:sp3d/>
+    <dgm:txPr/>
+    <dgm:style>
+      <a:lnRef idx="2">
+        <a:scrgbClr r="0" g="0" b="0"/>
+      </a:lnRef>
+      <a:fillRef idx="1">
+        <a:scrgbClr r="0" g="0" b="0"/>
+      </a:fillRef>
+      <a:effectRef idx="0">
+        <a:scrgbClr r="0" g="0" b="0"/>
+      </a:effectRef>
+      <a:fontRef idx="minor"/>
+    </dgm:style>
+  </dgm:styleLbl>
+  <dgm:styleLbl name="alignAccFollowNode1">
+    <dgm:scene3d>
+      <a:camera prst="orthographicFront"/>
+      <a:lightRig rig="threePt" dir="t"/>
+    </dgm:scene3d>
+    <dgm:sp3d/>
+    <dgm:txPr/>
+    <dgm:style>
+      <a:lnRef idx="2">
+        <a:scrgbClr r="0" g="0" b="0"/>
+      </a:lnRef>
+      <a:fillRef idx="1">
+        <a:scrgbClr r="0" g="0" b="0"/>
+      </a:fillRef>
+      <a:effectRef idx="0">
+        <a:scrgbClr r="0" g="0" b="0"/>
+      </a:effectRef>
+      <a:fontRef idx="minor"/>
+    </dgm:style>
+  </dgm:styleLbl>
+  <dgm:styleLbl name="bgAccFollowNode1">
+    <dgm:scene3d>
+      <a:camera prst="orthographicFront"/>
+      <a:lightRig rig="threePt" dir="t"/>
+    </dgm:scene3d>
+    <dgm:sp3d/>
+    <dgm:txPr/>
+    <dgm:style>
+      <a:lnRef idx="2">
+        <a:scrgbClr r="0" g="0" b="0"/>
+      </a:lnRef>
+      <a:fillRef idx="1">
+        <a:scrgbClr r="0" g="0" b="0"/>
+      </a:fillRef>
+      <a:effectRef idx="0">
+        <a:scrgbClr r="0" g="0" b="0"/>
+      </a:effectRef>
+      <a:fontRef idx="minor"/>
+    </dgm:style>
+  </dgm:styleLbl>
+  <dgm:styleLbl name="fgAcc0">
+    <dgm:scene3d>
+      <a:camera prst="orthographicFront"/>
+      <a:lightRig rig="threePt" dir="t"/>
+    </dgm:scene3d>
+    <dgm:sp3d/>
+    <dgm:txPr/>
+    <dgm:style>
+      <a:lnRef idx="2">
+        <a:scrgbClr r="0" g="0" b="0"/>
+      </a:lnRef>
+      <a:fillRef idx="1">
+        <a:scrgbClr r="0" g="0" b="0"/>
+      </a:fillRef>
+      <a:effectRef idx="0">
+        <a:scrgbClr r="0" g="0" b="0"/>
+      </a:effectRef>
+      <a:fontRef idx="minor"/>
+    </dgm:style>
+  </dgm:styleLbl>
+  <dgm:styleLbl name="fgAcc2">
+    <dgm:scene3d>
+      <a:camera prst="orthographicFront"/>
+      <a:lightRig rig="threePt" dir="t"/>
+    </dgm:scene3d>
+    <dgm:sp3d/>
+    <dgm:txPr/>
+    <dgm:style>
+      <a:lnRef idx="2">
+        <a:scrgbClr r="0" g="0" b="0"/>
+      </a:lnRef>
+      <a:fillRef idx="1">
+        <a:scrgbClr r="0" g="0" b="0"/>
+      </a:fillRef>
+      <a:effectRef idx="0">
+        <a:scrgbClr r="0" g="0" b="0"/>
+      </a:effectRef>
+      <a:fontRef idx="minor"/>
+    </dgm:style>
+  </dgm:styleLbl>
+  <dgm:styleLbl name="fgAcc3">
+    <dgm:scene3d>
+      <a:camera prst="orthographicFront"/>
+      <a:lightRig rig="threePt" dir="t"/>
+    </dgm:scene3d>
+    <dgm:sp3d/>
+    <dgm:txPr/>
+    <dgm:style>
+      <a:lnRef idx="2">
+        <a:scrgbClr r="0" g="0" b="0"/>
+      </a:lnRef>
+      <a:fillRef idx="1">
+        <a:scrgbClr r="0" g="0" b="0"/>
+      </a:fillRef>
+      <a:effectRef idx="0">
+        <a:scrgbClr r="0" g="0" b="0"/>
+      </a:effectRef>
+      <a:fontRef idx="minor"/>
+    </dgm:style>
+  </dgm:styleLbl>
+  <dgm:styleLbl name="fgAcc4">
+    <dgm:scene3d>
+      <a:camera prst="orthographicFront"/>
+      <a:lightRig rig="threePt" dir="t"/>
+    </dgm:scene3d>
+    <dgm:sp3d/>
+    <dgm:txPr/>
+    <dgm:style>
+      <a:lnRef idx="2">
+        <a:scrgbClr r="0" g="0" b="0"/>
+      </a:lnRef>
+      <a:fillRef idx="1">
+        <a:scrgbClr r="0" g="0" b="0"/>
+      </a:fillRef>
+      <a:effectRef idx="0">
+        <a:scrgbClr r="0" g="0" b="0"/>
+      </a:effectRef>
+      <a:fontRef idx="minor"/>
+    </dgm:style>
+  </dgm:styleLbl>
+  <dgm:styleLbl name="bgShp">
+    <dgm:scene3d>
+      <a:camera prst="orthographicFront"/>
+      <a:lightRig rig="threePt" dir="t"/>
+    </dgm:scene3d>
+    <dgm:sp3d/>
+    <dgm:txPr/>
+    <dgm:style>
+      <a:lnRef idx="0">
+        <a:scrgbClr r="0" g="0" b="0"/>
+      </a:lnRef>
+      <a:fillRef idx="1">
+        <a:scrgbClr r="0" g="0" b="0"/>
+      </a:fillRef>
+      <a:effectRef idx="0">
+        <a:scrgbClr r="0" g="0" b="0"/>
+      </a:effectRef>
+      <a:fontRef idx="minor"/>
+    </dgm:style>
+  </dgm:styleLbl>
+  <dgm:styleLbl name="dkBgShp">
+    <dgm:scene3d>
+      <a:camera prst="orthographicFront"/>
+      <a:lightRig rig="threePt" dir="t"/>
+    </dgm:scene3d>
+    <dgm:sp3d/>
+    <dgm:txPr/>
+    <dgm:style>
+      <a:lnRef idx="0">
+        <a:scrgbClr r="0" g="0" b="0"/>
+      </a:lnRef>
+      <a:fillRef idx="1">
+        <a:scrgbClr r="0" g="0" b="0"/>
+      </a:fillRef>
+      <a:effectRef idx="0">
+        <a:scrgbClr r="0" g="0" b="0"/>
+      </a:effectRef>
+      <a:fontRef idx="minor"/>
+    </dgm:style>
+  </dgm:styleLbl>
+  <dgm:styleLbl name="trBgShp">
+    <dgm:scene3d>
+      <a:camera prst="orthographicFront"/>
+      <a:lightRig rig="threePt" dir="t"/>
+    </dgm:scene3d>
+    <dgm:sp3d/>
+    <dgm:txPr/>
+    <dgm:style>
+      <a:lnRef idx="0">
+        <a:scrgbClr r="0" g="0" b="0"/>
+      </a:lnRef>
+      <a:fillRef idx="1">
+        <a:scrgbClr r="0" g="0" b="0"/>
+      </a:fillRef>
+      <a:effectRef idx="0">
+        <a:scrgbClr r="0" g="0" b="0"/>
+      </a:effectRef>
+      <a:fontRef idx="minor"/>
+    </dgm:style>
+  </dgm:styleLbl>
+  <dgm:styleLbl name="fgShp">
+    <dgm:scene3d>
+      <a:camera prst="orthographicFront"/>
+      <a:lightRig rig="threePt" dir="t"/>
+    </dgm:scene3d>
+    <dgm:sp3d/>
+    <dgm:txPr/>
+    <dgm:style>
+      <a:lnRef idx="2">
+        <a:scrgbClr r="0" g="0" b="0"/>
+      </a:lnRef>
+      <a:fillRef idx="1">
+        <a:scrgbClr r="0" g="0" b="0"/>
+      </a:fillRef>
+      <a:effectRef idx="0">
+        <a:scrgbClr r="0" g="0" b="0"/>
+      </a:effectRef>
+      <a:fontRef idx="minor"/>
+    </dgm:style>
+  </dgm:styleLbl>
+  <dgm:styleLbl name="revTx">
+    <dgm:scene3d>
+      <a:camera prst="orthographicFront"/>
+      <a:lightRig rig="threePt" dir="t"/>
+    </dgm:scene3d>
+    <dgm:sp3d/>
+    <dgm:txPr/>
+    <dgm:style>
+      <a:lnRef idx="0">
+        <a:scrgbClr r="0" g="0" b="0"/>
+      </a:lnRef>
+      <a:fillRef idx="0">
+        <a:scrgbClr r="0" g="0" b="0"/>
+      </a:fillRef>
+      <a:effectRef idx="0">
+        <a:scrgbClr r="0" g="0" b="0"/>
+      </a:effectRef>
+      <a:fontRef idx="minor"/>
+    </dgm:style>
+  </dgm:styleLbl>
+</dgm:styleDef>
+</file>
+
+<file path=ppt/diagrams/quickStyle7.xml><?xml version="1.0" encoding="utf-8"?>
 <dgm:styleDef xmlns:dgm="http://schemas.openxmlformats.org/drawingml/2006/diagram" xmlns:a="http://schemas.openxmlformats.org/drawingml/2006/main" uniqueId="urn:microsoft.com/office/officeart/2005/8/quickstyle/simple1">
   <dgm:title val=""/>
   <dgm:desc val=""/>
@@ -22457,7 +25455,7 @@
           <a:p>
             <a:fld id="{7739F995-2A69-754E-9252-9A6746B31172}" type="datetimeFigureOut">
               <a:rPr lang="hu-HU" smtClean="0"/>
-              <a:t>2026. 02. 23.</a:t>
+              <a:t>2026. 02. 27.</a:t>
             </a:fld>
             <a:endParaRPr lang="hu-HU"/>
           </a:p>
@@ -22957,7 +25955,7 @@
           <a:p>
             <a:fld id="{703CF5A7-300F-B04A-985C-B283B69AF125}" type="slidenum">
               <a:rPr lang="hu-HU" smtClean="0"/>
-              <a:t>17</a:t>
+              <a:t>18</a:t>
             </a:fld>
             <a:endParaRPr lang="hu-HU"/>
           </a:p>
@@ -23123,7 +26121,7 @@
           <a:p>
             <a:fld id="{C1F1339E-E161-F24A-B4B5-7BC3AF4BBE53}" type="datetimeFigureOut">
               <a:rPr lang="hu-HU" smtClean="0"/>
-              <a:t>2026. 02. 23.</a:t>
+              <a:t>2026. 02. 27.</a:t>
             </a:fld>
             <a:endParaRPr lang="hu-HU"/>
           </a:p>
@@ -23321,7 +26319,7 @@
           <a:p>
             <a:fld id="{C1F1339E-E161-F24A-B4B5-7BC3AF4BBE53}" type="datetimeFigureOut">
               <a:rPr lang="hu-HU" smtClean="0"/>
-              <a:t>2026. 02. 23.</a:t>
+              <a:t>2026. 02. 27.</a:t>
             </a:fld>
             <a:endParaRPr lang="hu-HU"/>
           </a:p>
@@ -23529,7 +26527,7 @@
           <a:p>
             <a:fld id="{C1F1339E-E161-F24A-B4B5-7BC3AF4BBE53}" type="datetimeFigureOut">
               <a:rPr lang="hu-HU" smtClean="0"/>
-              <a:t>2026. 02. 23.</a:t>
+              <a:t>2026. 02. 27.</a:t>
             </a:fld>
             <a:endParaRPr lang="hu-HU"/>
           </a:p>
@@ -23727,7 +26725,7 @@
           <a:p>
             <a:fld id="{C1F1339E-E161-F24A-B4B5-7BC3AF4BBE53}" type="datetimeFigureOut">
               <a:rPr lang="hu-HU" smtClean="0"/>
-              <a:t>2026. 02. 23.</a:t>
+              <a:t>2026. 02. 27.</a:t>
             </a:fld>
             <a:endParaRPr lang="hu-HU"/>
           </a:p>
@@ -24002,7 +27000,7 @@
           <a:p>
             <a:fld id="{C1F1339E-E161-F24A-B4B5-7BC3AF4BBE53}" type="datetimeFigureOut">
               <a:rPr lang="hu-HU" smtClean="0"/>
-              <a:t>2026. 02. 23.</a:t>
+              <a:t>2026. 02. 27.</a:t>
             </a:fld>
             <a:endParaRPr lang="hu-HU"/>
           </a:p>
@@ -24267,7 +27265,7 @@
           <a:p>
             <a:fld id="{C1F1339E-E161-F24A-B4B5-7BC3AF4BBE53}" type="datetimeFigureOut">
               <a:rPr lang="hu-HU" smtClean="0"/>
-              <a:t>2026. 02. 23.</a:t>
+              <a:t>2026. 02. 27.</a:t>
             </a:fld>
             <a:endParaRPr lang="hu-HU"/>
           </a:p>
@@ -24679,7 +27677,7 @@
           <a:p>
             <a:fld id="{C1F1339E-E161-F24A-B4B5-7BC3AF4BBE53}" type="datetimeFigureOut">
               <a:rPr lang="hu-HU" smtClean="0"/>
-              <a:t>2026. 02. 23.</a:t>
+              <a:t>2026. 02. 27.</a:t>
             </a:fld>
             <a:endParaRPr lang="hu-HU"/>
           </a:p>
@@ -24820,7 +27818,7 @@
           <a:p>
             <a:fld id="{C1F1339E-E161-F24A-B4B5-7BC3AF4BBE53}" type="datetimeFigureOut">
               <a:rPr lang="hu-HU" smtClean="0"/>
-              <a:t>2026. 02. 23.</a:t>
+              <a:t>2026. 02. 27.</a:t>
             </a:fld>
             <a:endParaRPr lang="hu-HU"/>
           </a:p>
@@ -24933,7 +27931,7 @@
           <a:p>
             <a:fld id="{C1F1339E-E161-F24A-B4B5-7BC3AF4BBE53}" type="datetimeFigureOut">
               <a:rPr lang="hu-HU" smtClean="0"/>
-              <a:t>2026. 02. 23.</a:t>
+              <a:t>2026. 02. 27.</a:t>
             </a:fld>
             <a:endParaRPr lang="hu-HU"/>
           </a:p>
@@ -25244,7 +28242,7 @@
           <a:p>
             <a:fld id="{C1F1339E-E161-F24A-B4B5-7BC3AF4BBE53}" type="datetimeFigureOut">
               <a:rPr lang="hu-HU" smtClean="0"/>
-              <a:t>2026. 02. 23.</a:t>
+              <a:t>2026. 02. 27.</a:t>
             </a:fld>
             <a:endParaRPr lang="hu-HU"/>
           </a:p>
@@ -25532,7 +28530,7 @@
           <a:p>
             <a:fld id="{C1F1339E-E161-F24A-B4B5-7BC3AF4BBE53}" type="datetimeFigureOut">
               <a:rPr lang="hu-HU" smtClean="0"/>
-              <a:t>2026. 02. 23.</a:t>
+              <a:t>2026. 02. 27.</a:t>
             </a:fld>
             <a:endParaRPr lang="hu-HU"/>
           </a:p>
@@ -25773,7 +28771,7 @@
           <a:p>
             <a:fld id="{C1F1339E-E161-F24A-B4B5-7BC3AF4BBE53}" type="datetimeFigureOut">
               <a:rPr lang="hu-HU" smtClean="0"/>
-              <a:t>2026. 02. 23.</a:t>
+              <a:t>2026. 02. 27.</a:t>
             </a:fld>
             <a:endParaRPr lang="hu-HU"/>
           </a:p>
@@ -32021,6 +35019,504 @@
       </p:grpSpPr>
       <p:sp useBgFill="1">
         <p:nvSpPr>
+          <p:cNvPr id="9" name="Rectangle 8">
+            <a:extLst>
+              <a:ext uri="{FF2B5EF4-FFF2-40B4-BE49-F238E27FC236}">
+                <a16:creationId xmlns:a16="http://schemas.microsoft.com/office/drawing/2014/main" id="{56E9B3E6-E277-4D68-BA48-9CB43FFBD6E2}"/>
+              </a:ext>
+              <a:ext uri="{C183D7F6-B498-43B3-948B-1728B52AA6E4}">
+                <adec:decorative xmlns:adec="http://schemas.microsoft.com/office/drawing/2017/decorative" val="1"/>
+              </a:ext>
+            </a:extLst>
+          </p:cNvPr>
+          <p:cNvSpPr>
+            <a:spLocks noGrp="1" noRot="1" noChangeAspect="1" noMove="1" noResize="1" noEditPoints="1" noAdjustHandles="1" noChangeArrowheads="1" noChangeShapeType="1" noTextEdit="1"/>
+          </p:cNvSpPr>
+          <p:nvPr>
+            <p:extLst>
+              <p:ext uri="{386F3935-93C4-4BCD-93E2-E3B085C9AB24}">
+                <p16:designElem xmlns:p16="http://schemas.microsoft.com/office/powerpoint/2015/main" val="1"/>
+              </p:ext>
+            </p:extLst>
+          </p:nvPr>
+        </p:nvSpPr>
+        <p:spPr>
+          <a:xfrm>
+            <a:off x="0" y="0"/>
+            <a:ext cx="12191999" cy="6857365"/>
+          </a:xfrm>
+          <a:prstGeom prst="rect">
+            <a:avLst/>
+          </a:prstGeom>
+          <a:ln>
+            <a:noFill/>
+          </a:ln>
+        </p:spPr>
+        <p:style>
+          <a:lnRef idx="2">
+            <a:schemeClr val="accent1">
+              <a:shade val="50000"/>
+            </a:schemeClr>
+          </a:lnRef>
+          <a:fillRef idx="1">
+            <a:schemeClr val="accent1"/>
+          </a:fillRef>
+          <a:effectRef idx="0">
+            <a:schemeClr val="accent1"/>
+          </a:effectRef>
+          <a:fontRef idx="minor">
+            <a:schemeClr val="lt1"/>
+          </a:fontRef>
+        </p:style>
+        <p:txBody>
+          <a:bodyPr rtlCol="0" anchor="ctr"/>
+          <a:lstStyle/>
+          <a:p>
+            <a:pPr algn="ctr"/>
+            <a:endParaRPr lang="en-US"/>
+          </a:p>
+        </p:txBody>
+      </p:sp>
+      <p:grpSp>
+        <p:nvGrpSpPr>
+          <p:cNvPr id="11" name="Group 10">
+            <a:extLst>
+              <a:ext uri="{FF2B5EF4-FFF2-40B4-BE49-F238E27FC236}">
+                <a16:creationId xmlns:a16="http://schemas.microsoft.com/office/drawing/2014/main" id="{AE1C45F0-260A-458C-96ED-C1F6D2151219}"/>
+              </a:ext>
+              <a:ext uri="{C183D7F6-B498-43B3-948B-1728B52AA6E4}">
+                <adec:decorative xmlns:adec="http://schemas.microsoft.com/office/drawing/2017/decorative" val="1"/>
+              </a:ext>
+            </a:extLst>
+          </p:cNvPr>
+          <p:cNvGrpSpPr>
+            <a:grpSpLocks noGrp="1" noUngrp="1" noRot="1" noChangeAspect="1" noMove="1" noResize="1"/>
+          </p:cNvGrpSpPr>
+          <p:nvPr>
+            <p:extLst>
+              <p:ext uri="{386F3935-93C4-4BCD-93E2-E3B085C9AB24}">
+                <p16:designElem xmlns:p16="http://schemas.microsoft.com/office/powerpoint/2015/main" val="1"/>
+              </p:ext>
+            </p:extLst>
+          </p:nvPr>
+        </p:nvGrpSpPr>
+        <p:grpSpPr>
+          <a:xfrm>
+            <a:off x="4" y="1216597"/>
+            <a:ext cx="731521" cy="673460"/>
+            <a:chOff x="3940602" y="308034"/>
+            <a:chExt cx="2116791" cy="3428999"/>
+          </a:xfrm>
+          <a:solidFill>
+            <a:schemeClr val="accent4"/>
+          </a:solidFill>
+        </p:grpSpPr>
+        <p:sp>
+          <p:nvSpPr>
+            <p:cNvPr id="12" name="Rectangle 11">
+              <a:extLst>
+                <a:ext uri="{FF2B5EF4-FFF2-40B4-BE49-F238E27FC236}">
+                  <a16:creationId xmlns:a16="http://schemas.microsoft.com/office/drawing/2014/main" id="{A6604B49-AD5C-4590-B051-06C8222ECD99}"/>
+                </a:ext>
+                <a:ext uri="{C183D7F6-B498-43B3-948B-1728B52AA6E4}">
+                  <adec:decorative xmlns:adec="http://schemas.microsoft.com/office/drawing/2017/decorative" val="1"/>
+                </a:ext>
+              </a:extLst>
+            </p:cNvPr>
+            <p:cNvSpPr/>
+            <p:nvPr>
+              <p:extLst>
+                <p:ext uri="{386F3935-93C4-4BCD-93E2-E3B085C9AB24}">
+                  <p16:designElem xmlns:p16="http://schemas.microsoft.com/office/powerpoint/2015/main" val="1"/>
+                </p:ext>
+              </p:extLst>
+            </p:nvPr>
+          </p:nvSpPr>
+          <p:spPr>
+            <a:xfrm>
+              <a:off x="3940602" y="308034"/>
+              <a:ext cx="566743" cy="3428999"/>
+            </a:xfrm>
+            <a:prstGeom prst="rect">
+              <a:avLst/>
+            </a:prstGeom>
+            <a:grpFill/>
+            <a:ln>
+              <a:noFill/>
+            </a:ln>
+          </p:spPr>
+          <p:style>
+            <a:lnRef idx="2">
+              <a:schemeClr val="accent1">
+                <a:shade val="50000"/>
+              </a:schemeClr>
+            </a:lnRef>
+            <a:fillRef idx="1">
+              <a:schemeClr val="accent1"/>
+            </a:fillRef>
+            <a:effectRef idx="0">
+              <a:schemeClr val="accent1"/>
+            </a:effectRef>
+            <a:fontRef idx="minor">
+              <a:schemeClr val="lt1"/>
+            </a:fontRef>
+          </p:style>
+          <p:txBody>
+            <a:bodyPr rtlCol="0" anchor="ctr"/>
+            <a:lstStyle/>
+            <a:p>
+              <a:pPr algn="ctr"/>
+              <a:endParaRPr lang="en-US"/>
+            </a:p>
+          </p:txBody>
+        </p:sp>
+        <p:sp>
+          <p:nvSpPr>
+            <p:cNvPr id="13" name="Rectangle 12">
+              <a:extLst>
+                <a:ext uri="{FF2B5EF4-FFF2-40B4-BE49-F238E27FC236}">
+                  <a16:creationId xmlns:a16="http://schemas.microsoft.com/office/drawing/2014/main" id="{743ECCAF-29C5-4537-947C-7EA1292463DB}"/>
+                </a:ext>
+                <a:ext uri="{C183D7F6-B498-43B3-948B-1728B52AA6E4}">
+                  <adec:decorative xmlns:adec="http://schemas.microsoft.com/office/drawing/2017/decorative" val="1"/>
+                </a:ext>
+              </a:extLst>
+            </p:cNvPr>
+            <p:cNvSpPr/>
+            <p:nvPr>
+              <p:extLst>
+                <p:ext uri="{386F3935-93C4-4BCD-93E2-E3B085C9AB24}">
+                  <p16:designElem xmlns:p16="http://schemas.microsoft.com/office/powerpoint/2015/main" val="1"/>
+                </p:ext>
+              </p:extLst>
+            </p:nvPr>
+          </p:nvSpPr>
+          <p:spPr>
+            <a:xfrm>
+              <a:off x="4715626" y="308034"/>
+              <a:ext cx="566743" cy="3428999"/>
+            </a:xfrm>
+            <a:prstGeom prst="rect">
+              <a:avLst/>
+            </a:prstGeom>
+            <a:grpFill/>
+            <a:ln>
+              <a:noFill/>
+            </a:ln>
+          </p:spPr>
+          <p:style>
+            <a:lnRef idx="2">
+              <a:schemeClr val="accent1">
+                <a:shade val="50000"/>
+              </a:schemeClr>
+            </a:lnRef>
+            <a:fillRef idx="1">
+              <a:schemeClr val="accent1"/>
+            </a:fillRef>
+            <a:effectRef idx="0">
+              <a:schemeClr val="accent1"/>
+            </a:effectRef>
+            <a:fontRef idx="minor">
+              <a:schemeClr val="lt1"/>
+            </a:fontRef>
+          </p:style>
+          <p:txBody>
+            <a:bodyPr rtlCol="0" anchor="ctr"/>
+            <a:lstStyle/>
+            <a:p>
+              <a:pPr algn="ctr"/>
+              <a:endParaRPr lang="en-US"/>
+            </a:p>
+          </p:txBody>
+        </p:sp>
+        <p:sp>
+          <p:nvSpPr>
+            <p:cNvPr id="14" name="Rectangle 13">
+              <a:extLst>
+                <a:ext uri="{FF2B5EF4-FFF2-40B4-BE49-F238E27FC236}">
+                  <a16:creationId xmlns:a16="http://schemas.microsoft.com/office/drawing/2014/main" id="{ED49787B-8DE6-4467-AD0A-8DECC6E0C2D6}"/>
+                </a:ext>
+                <a:ext uri="{C183D7F6-B498-43B3-948B-1728B52AA6E4}">
+                  <adec:decorative xmlns:adec="http://schemas.microsoft.com/office/drawing/2017/decorative" val="1"/>
+                </a:ext>
+              </a:extLst>
+            </p:cNvPr>
+            <p:cNvSpPr/>
+            <p:nvPr>
+              <p:extLst>
+                <p:ext uri="{386F3935-93C4-4BCD-93E2-E3B085C9AB24}">
+                  <p16:designElem xmlns:p16="http://schemas.microsoft.com/office/powerpoint/2015/main" val="1"/>
+                </p:ext>
+              </p:extLst>
+            </p:nvPr>
+          </p:nvSpPr>
+          <p:spPr>
+            <a:xfrm>
+              <a:off x="5490650" y="308034"/>
+              <a:ext cx="566743" cy="3428999"/>
+            </a:xfrm>
+            <a:prstGeom prst="rect">
+              <a:avLst/>
+            </a:prstGeom>
+            <a:grpFill/>
+            <a:ln>
+              <a:noFill/>
+            </a:ln>
+          </p:spPr>
+          <p:style>
+            <a:lnRef idx="2">
+              <a:schemeClr val="accent1">
+                <a:shade val="50000"/>
+              </a:schemeClr>
+            </a:lnRef>
+            <a:fillRef idx="1">
+              <a:schemeClr val="accent1"/>
+            </a:fillRef>
+            <a:effectRef idx="0">
+              <a:schemeClr val="accent1"/>
+            </a:effectRef>
+            <a:fontRef idx="minor">
+              <a:schemeClr val="lt1"/>
+            </a:fontRef>
+          </p:style>
+          <p:txBody>
+            <a:bodyPr rtlCol="0" anchor="ctr"/>
+            <a:lstStyle/>
+            <a:p>
+              <a:pPr algn="ctr"/>
+              <a:endParaRPr lang="en-US"/>
+            </a:p>
+          </p:txBody>
+        </p:sp>
+      </p:grpSp>
+      <p:sp>
+        <p:nvSpPr>
+          <p:cNvPr id="16" name="Rectangle 15">
+            <a:extLst>
+              <a:ext uri="{FF2B5EF4-FFF2-40B4-BE49-F238E27FC236}">
+                <a16:creationId xmlns:a16="http://schemas.microsoft.com/office/drawing/2014/main" id="{D5B0017B-2ECA-49AF-B397-DC140825DF8D}"/>
+              </a:ext>
+              <a:ext uri="{C183D7F6-B498-43B3-948B-1728B52AA6E4}">
+                <adec:decorative xmlns:adec="http://schemas.microsoft.com/office/drawing/2017/decorative" val="1"/>
+              </a:ext>
+            </a:extLst>
+          </p:cNvPr>
+          <p:cNvSpPr>
+            <a:spLocks noGrp="1" noRot="1" noChangeAspect="1" noMove="1" noResize="1" noEditPoints="1" noAdjustHandles="1" noChangeArrowheads="1" noChangeShapeType="1" noTextEdit="1"/>
+          </p:cNvSpPr>
+          <p:nvPr>
+            <p:extLst>
+              <p:ext uri="{386F3935-93C4-4BCD-93E2-E3B085C9AB24}">
+                <p16:designElem xmlns:p16="http://schemas.microsoft.com/office/powerpoint/2015/main" val="1"/>
+              </p:ext>
+            </p:extLst>
+          </p:nvPr>
+        </p:nvSpPr>
+        <p:spPr>
+          <a:xfrm>
+            <a:off x="640079" y="613954"/>
+            <a:ext cx="10907487" cy="1894116"/>
+          </a:xfrm>
+          <a:prstGeom prst="rect">
+            <a:avLst/>
+          </a:prstGeom>
+          <a:solidFill>
+            <a:schemeClr val="bg1"/>
+          </a:solidFill>
+          <a:ln>
+            <a:noFill/>
+          </a:ln>
+          <a:effectLst>
+            <a:outerShdw blurRad="139700" dist="127000" dir="5400000" algn="t" rotWithShape="0">
+              <a:prstClr val="black">
+                <a:alpha val="15000"/>
+              </a:prstClr>
+            </a:outerShdw>
+          </a:effectLst>
+        </p:spPr>
+        <p:style>
+          <a:lnRef idx="2">
+            <a:schemeClr val="accent1">
+              <a:shade val="50000"/>
+            </a:schemeClr>
+          </a:lnRef>
+          <a:fillRef idx="1">
+            <a:schemeClr val="accent1"/>
+          </a:fillRef>
+          <a:effectRef idx="0">
+            <a:schemeClr val="accent1"/>
+          </a:effectRef>
+          <a:fontRef idx="minor">
+            <a:schemeClr val="lt1"/>
+          </a:fontRef>
+        </p:style>
+        <p:txBody>
+          <a:bodyPr rtlCol="0" anchor="ctr"/>
+          <a:lstStyle/>
+          <a:p>
+            <a:pPr algn="ctr"/>
+            <a:endParaRPr lang="en-US"/>
+          </a:p>
+        </p:txBody>
+      </p:sp>
+      <p:sp>
+        <p:nvSpPr>
+          <p:cNvPr id="2" name="Cím 1">
+            <a:extLst>
+              <a:ext uri="{FF2B5EF4-FFF2-40B4-BE49-F238E27FC236}">
+                <a16:creationId xmlns:a16="http://schemas.microsoft.com/office/drawing/2014/main" id="{23611970-639B-2F83-D96F-312CCAD1A9B1}"/>
+              </a:ext>
+            </a:extLst>
+          </p:cNvPr>
+          <p:cNvSpPr>
+            <a:spLocks noGrp="1"/>
+          </p:cNvSpPr>
+          <p:nvPr>
+            <p:ph type="title"/>
+          </p:nvPr>
+        </p:nvSpPr>
+        <p:spPr>
+          <a:xfrm>
+            <a:off x="1043631" y="809898"/>
+            <a:ext cx="10173010" cy="1554480"/>
+          </a:xfrm>
+        </p:spPr>
+        <p:txBody>
+          <a:bodyPr anchor="ctr">
+            <a:normAutofit/>
+          </a:bodyPr>
+          <a:lstStyle/>
+          <a:p>
+            <a:r>
+              <a:rPr lang="hu-HU" sz="4800"/>
+              <a:t>Our future plans</a:t>
+            </a:r>
+          </a:p>
+        </p:txBody>
+      </p:sp>
+      <p:cxnSp>
+        <p:nvCxnSpPr>
+          <p:cNvPr id="18" name="Straight Connector 17">
+            <a:extLst>
+              <a:ext uri="{FF2B5EF4-FFF2-40B4-BE49-F238E27FC236}">
+                <a16:creationId xmlns:a16="http://schemas.microsoft.com/office/drawing/2014/main" id="{6CF1BAF6-AD41-4082-B212-8A1F9A2E8779}"/>
+              </a:ext>
+              <a:ext uri="{C183D7F6-B498-43B3-948B-1728B52AA6E4}">
+                <adec:decorative xmlns:adec="http://schemas.microsoft.com/office/drawing/2017/decorative" val="1"/>
+              </a:ext>
+            </a:extLst>
+          </p:cNvPr>
+          <p:cNvCxnSpPr>
+            <a:cxnSpLocks noGrp="1" noRot="1" noChangeAspect="1" noMove="1" noResize="1" noEditPoints="1" noAdjustHandles="1" noChangeArrowheads="1" noChangeShapeType="1"/>
+          </p:cNvCxnSpPr>
+          <p:nvPr>
+            <p:extLst>
+              <p:ext uri="{386F3935-93C4-4BCD-93E2-E3B085C9AB24}">
+                <p16:designElem xmlns:p16="http://schemas.microsoft.com/office/powerpoint/2015/main" val="1"/>
+              </p:ext>
+            </p:extLst>
+          </p:nvPr>
+        </p:nvCxnSpPr>
+        <p:spPr>
+          <a:xfrm flipH="1">
+            <a:off x="838200" y="6485313"/>
+            <a:ext cx="10515600" cy="0"/>
+          </a:xfrm>
+          <a:prstGeom prst="line">
+            <a:avLst/>
+          </a:prstGeom>
+          <a:ln w="57150">
+            <a:solidFill>
+              <a:schemeClr val="accent4"/>
+            </a:solidFill>
+          </a:ln>
+        </p:spPr>
+        <p:style>
+          <a:lnRef idx="1">
+            <a:schemeClr val="accent1"/>
+          </a:lnRef>
+          <a:fillRef idx="0">
+            <a:schemeClr val="accent1"/>
+          </a:fillRef>
+          <a:effectRef idx="0">
+            <a:schemeClr val="accent1"/>
+          </a:effectRef>
+          <a:fontRef idx="minor">
+            <a:schemeClr val="tx1"/>
+          </a:fontRef>
+        </p:style>
+      </p:cxnSp>
+      <p:graphicFrame>
+        <p:nvGraphicFramePr>
+          <p:cNvPr id="5" name="Tartalom helye 2">
+            <a:extLst>
+              <a:ext uri="{FF2B5EF4-FFF2-40B4-BE49-F238E27FC236}">
+                <a16:creationId xmlns:a16="http://schemas.microsoft.com/office/drawing/2014/main" id="{62BDCB82-1457-B260-8448-A31B47D07F90}"/>
+              </a:ext>
+            </a:extLst>
+          </p:cNvPr>
+          <p:cNvGraphicFramePr>
+            <a:graphicFrameLocks noGrp="1"/>
+          </p:cNvGraphicFramePr>
+          <p:nvPr>
+            <p:ph idx="1"/>
+            <p:extLst>
+              <p:ext uri="{D42A27DB-BD31-4B8C-83A1-F6EECF244321}">
+                <p14:modId xmlns:p14="http://schemas.microsoft.com/office/powerpoint/2010/main" val="47958921"/>
+              </p:ext>
+            </p:extLst>
+          </p:nvPr>
+        </p:nvGraphicFramePr>
+        <p:xfrm>
+          <a:off x="904602" y="3017519"/>
+          <a:ext cx="10378440" cy="3209902"/>
+        </p:xfrm>
+        <a:graphic>
+          <a:graphicData uri="http://schemas.openxmlformats.org/drawingml/2006/diagram">
+            <dgm:relIds xmlns:dgm="http://schemas.openxmlformats.org/drawingml/2006/diagram" xmlns:r="http://schemas.openxmlformats.org/officeDocument/2006/relationships" r:dm="rId2" r:lo="rId3" r:qs="rId4" r:cs="rId5"/>
+          </a:graphicData>
+        </a:graphic>
+      </p:graphicFrame>
+    </p:spTree>
+    <p:extLst>
+      <p:ext uri="{BB962C8B-B14F-4D97-AF65-F5344CB8AC3E}">
+        <p14:creationId xmlns:p14="http://schemas.microsoft.com/office/powerpoint/2010/main" val="4214258107"/>
+      </p:ext>
+    </p:extLst>
+  </p:cSld>
+  <p:clrMapOvr>
+    <a:masterClrMapping/>
+  </p:clrMapOvr>
+</p:sld>
+</file>
+
+<file path=ppt/slides/slide18.xml><?xml version="1.0" encoding="utf-8"?>
+<p:sld xmlns:a="http://schemas.openxmlformats.org/drawingml/2006/main" xmlns:r="http://schemas.openxmlformats.org/officeDocument/2006/relationships" xmlns:p="http://schemas.openxmlformats.org/presentationml/2006/main">
+  <p:cSld>
+    <p:bg>
+      <p:bgPr>
+        <a:solidFill>
+          <a:schemeClr val="bg1"/>
+        </a:solidFill>
+        <a:effectLst/>
+      </p:bgPr>
+    </p:bg>
+    <p:spTree>
+      <p:nvGrpSpPr>
+        <p:cNvPr id="1" name=""/>
+        <p:cNvGrpSpPr/>
+        <p:nvPr/>
+      </p:nvGrpSpPr>
+      <p:grpSpPr>
+        <a:xfrm>
+          <a:off x="0" y="0"/>
+          <a:ext cx="0" cy="0"/>
+          <a:chOff x="0" y="0"/>
+          <a:chExt cx="0" cy="0"/>
+        </a:xfrm>
+      </p:grpSpPr>
+      <p:sp useBgFill="1">
+        <p:nvSpPr>
           <p:cNvPr id="11" name="Rectangle 10">
             <a:extLst>
               <a:ext uri="{FF2B5EF4-FFF2-40B4-BE49-F238E27FC236}">
@@ -33233,6 +36729,837 @@
   <p:transition>
     <p:push dir="u"/>
   </p:transition>
+</p:sld>
+</file>
+
+<file path=ppt/slides/slide19.xml><?xml version="1.0" encoding="utf-8"?>
+<p:sld xmlns:a="http://schemas.openxmlformats.org/drawingml/2006/main" xmlns:r="http://schemas.openxmlformats.org/officeDocument/2006/relationships" xmlns:p="http://schemas.openxmlformats.org/presentationml/2006/main">
+  <p:cSld>
+    <p:bg>
+      <p:bgPr>
+        <a:solidFill>
+          <a:schemeClr val="bg1"/>
+        </a:solidFill>
+        <a:effectLst/>
+      </p:bgPr>
+    </p:bg>
+    <p:spTree>
+      <p:nvGrpSpPr>
+        <p:cNvPr id="1" name=""/>
+        <p:cNvGrpSpPr/>
+        <p:nvPr/>
+      </p:nvGrpSpPr>
+      <p:grpSpPr>
+        <a:xfrm>
+          <a:off x="0" y="0"/>
+          <a:ext cx="0" cy="0"/>
+          <a:chOff x="0" y="0"/>
+          <a:chExt cx="0" cy="0"/>
+        </a:xfrm>
+      </p:grpSpPr>
+      <p:sp useBgFill="1">
+        <p:nvSpPr>
+          <p:cNvPr id="8" name="Rectangle 7">
+            <a:extLst>
+              <a:ext uri="{FF2B5EF4-FFF2-40B4-BE49-F238E27FC236}">
+                <a16:creationId xmlns:a16="http://schemas.microsoft.com/office/drawing/2014/main" id="{8C790BE2-4E4F-4AAF-81A2-4A6F4885EBE6}"/>
+              </a:ext>
+              <a:ext uri="{C183D7F6-B498-43B3-948B-1728B52AA6E4}">
+                <adec:decorative xmlns:adec="http://schemas.microsoft.com/office/drawing/2017/decorative" val="1"/>
+              </a:ext>
+            </a:extLst>
+          </p:cNvPr>
+          <p:cNvSpPr>
+            <a:spLocks noGrp="1" noRot="1" noChangeAspect="1" noMove="1" noResize="1" noEditPoints="1" noAdjustHandles="1" noChangeArrowheads="1" noChangeShapeType="1" noTextEdit="1"/>
+          </p:cNvSpPr>
+          <p:nvPr>
+            <p:extLst>
+              <p:ext uri="{386F3935-93C4-4BCD-93E2-E3B085C9AB24}">
+                <p16:designElem xmlns:p16="http://schemas.microsoft.com/office/powerpoint/2015/main" val="1"/>
+              </p:ext>
+            </p:extLst>
+          </p:nvPr>
+        </p:nvSpPr>
+        <p:spPr>
+          <a:xfrm>
+            <a:off x="0" y="0"/>
+            <a:ext cx="12192000" cy="6858000"/>
+          </a:xfrm>
+          <a:prstGeom prst="rect">
+            <a:avLst/>
+          </a:prstGeom>
+          <a:ln w="12700" cap="flat" cmpd="sng" algn="ctr">
+            <a:noFill/>
+            <a:prstDash val="solid"/>
+            <a:miter lim="800000"/>
+          </a:ln>
+          <a:effectLst/>
+          <a:extLst>
+            <a:ext uri="{91240B29-F687-4F45-9708-019B960494DF}">
+              <a14:hiddenLine xmlns:a14="http://schemas.microsoft.com/office/drawing/2010/main" w="12700" cap="flat" cmpd="sng" algn="ctr">
+                <a:solidFill>
+                  <a:schemeClr val="accent1">
+                    <a:shade val="50000"/>
+                  </a:schemeClr>
+                </a:solidFill>
+                <a:prstDash val="solid"/>
+                <a:miter lim="800000"/>
+              </a14:hiddenLine>
+            </a:ext>
+          </a:extLst>
+        </p:spPr>
+        <p:style>
+          <a:lnRef idx="2">
+            <a:schemeClr val="accent1">
+              <a:shade val="50000"/>
+            </a:schemeClr>
+          </a:lnRef>
+          <a:fillRef idx="1">
+            <a:schemeClr val="accent1"/>
+          </a:fillRef>
+          <a:effectRef idx="0">
+            <a:schemeClr val="accent1"/>
+          </a:effectRef>
+          <a:fontRef idx="minor">
+            <a:schemeClr val="lt1"/>
+          </a:fontRef>
+        </p:style>
+        <p:txBody>
+          <a:bodyPr rtlCol="0" anchor="ctr"/>
+          <a:lstStyle/>
+          <a:p>
+            <a:pPr algn="ctr"/>
+            <a:endParaRPr lang="en-US"/>
+          </a:p>
+        </p:txBody>
+      </p:sp>
+      <p:sp>
+        <p:nvSpPr>
+          <p:cNvPr id="10" name="Rectangle 9">
+            <a:extLst>
+              <a:ext uri="{FF2B5EF4-FFF2-40B4-BE49-F238E27FC236}">
+                <a16:creationId xmlns:a16="http://schemas.microsoft.com/office/drawing/2014/main" id="{D28B54C3-B57B-472A-B96E-1FCB67093DC2}"/>
+              </a:ext>
+              <a:ext uri="{C183D7F6-B498-43B3-948B-1728B52AA6E4}">
+                <adec:decorative xmlns:adec="http://schemas.microsoft.com/office/drawing/2017/decorative" val="1"/>
+              </a:ext>
+            </a:extLst>
+          </p:cNvPr>
+          <p:cNvSpPr>
+            <a:spLocks noGrp="1" noRot="1" noChangeAspect="1" noMove="1" noResize="1" noEditPoints="1" noAdjustHandles="1" noChangeArrowheads="1" noChangeShapeType="1" noTextEdit="1"/>
+          </p:cNvSpPr>
+          <p:nvPr>
+            <p:extLst>
+              <p:ext uri="{386F3935-93C4-4BCD-93E2-E3B085C9AB24}">
+                <p16:designElem xmlns:p16="http://schemas.microsoft.com/office/powerpoint/2015/main" val="1"/>
+              </p:ext>
+            </p:extLst>
+          </p:nvPr>
+        </p:nvSpPr>
+        <p:spPr>
+          <a:xfrm flipH="1">
+            <a:off x="-1" y="0"/>
+            <a:ext cx="12191999" cy="6858000"/>
+          </a:xfrm>
+          <a:prstGeom prst="rect">
+            <a:avLst/>
+          </a:prstGeom>
+          <a:gradFill>
+            <a:gsLst>
+              <a:gs pos="0">
+                <a:schemeClr val="accent1">
+                  <a:lumMod val="50000"/>
+                </a:schemeClr>
+              </a:gs>
+              <a:gs pos="100000">
+                <a:srgbClr val="000000"/>
+              </a:gs>
+            </a:gsLst>
+            <a:lin ang="13800000" scaled="0"/>
+          </a:gradFill>
+          <a:ln>
+            <a:noFill/>
+          </a:ln>
+        </p:spPr>
+        <p:style>
+          <a:lnRef idx="2">
+            <a:schemeClr val="accent1">
+              <a:shade val="50000"/>
+            </a:schemeClr>
+          </a:lnRef>
+          <a:fillRef idx="1">
+            <a:schemeClr val="accent1"/>
+          </a:fillRef>
+          <a:effectRef idx="0">
+            <a:schemeClr val="accent1"/>
+          </a:effectRef>
+          <a:fontRef idx="minor">
+            <a:schemeClr val="lt1"/>
+          </a:fontRef>
+        </p:style>
+        <p:txBody>
+          <a:bodyPr rtlCol="0" anchor="ctr"/>
+          <a:lstStyle/>
+          <a:p>
+            <a:pPr algn="ctr"/>
+            <a:endParaRPr lang="en-US"/>
+          </a:p>
+        </p:txBody>
+      </p:sp>
+      <p:sp>
+        <p:nvSpPr>
+          <p:cNvPr id="12" name="Rectangle 11">
+            <a:extLst>
+              <a:ext uri="{FF2B5EF4-FFF2-40B4-BE49-F238E27FC236}">
+                <a16:creationId xmlns:a16="http://schemas.microsoft.com/office/drawing/2014/main" id="{7DB3C429-F8DA-49B9-AF84-21996FCF78B5}"/>
+              </a:ext>
+              <a:ext uri="{C183D7F6-B498-43B3-948B-1728B52AA6E4}">
+                <adec:decorative xmlns:adec="http://schemas.microsoft.com/office/drawing/2017/decorative" val="1"/>
+              </a:ext>
+            </a:extLst>
+          </p:cNvPr>
+          <p:cNvSpPr>
+            <a:spLocks noGrp="1" noRot="1" noChangeAspect="1" noMove="1" noResize="1" noEditPoints="1" noAdjustHandles="1" noChangeArrowheads="1" noChangeShapeType="1" noTextEdit="1"/>
+          </p:cNvSpPr>
+          <p:nvPr>
+            <p:extLst>
+              <p:ext uri="{386F3935-93C4-4BCD-93E2-E3B085C9AB24}">
+                <p16:designElem xmlns:p16="http://schemas.microsoft.com/office/powerpoint/2015/main" val="1"/>
+              </p:ext>
+            </p:extLst>
+          </p:nvPr>
+        </p:nvSpPr>
+        <p:spPr>
+          <a:xfrm rot="10800000">
+            <a:off x="0" y="-4"/>
+            <a:ext cx="12192000" cy="6402581"/>
+          </a:xfrm>
+          <a:prstGeom prst="rect">
+            <a:avLst/>
+          </a:prstGeom>
+          <a:gradFill>
+            <a:gsLst>
+              <a:gs pos="1000">
+                <a:schemeClr val="accent1">
+                  <a:lumMod val="75000"/>
+                  <a:alpha val="59000"/>
+                </a:schemeClr>
+              </a:gs>
+              <a:gs pos="100000">
+                <a:srgbClr val="000000"/>
+              </a:gs>
+            </a:gsLst>
+            <a:lin ang="15000000" scaled="0"/>
+          </a:gradFill>
+          <a:ln>
+            <a:noFill/>
+          </a:ln>
+        </p:spPr>
+        <p:style>
+          <a:lnRef idx="2">
+            <a:schemeClr val="accent1">
+              <a:shade val="50000"/>
+            </a:schemeClr>
+          </a:lnRef>
+          <a:fillRef idx="1">
+            <a:schemeClr val="accent1"/>
+          </a:fillRef>
+          <a:effectRef idx="0">
+            <a:schemeClr val="accent1"/>
+          </a:effectRef>
+          <a:fontRef idx="minor">
+            <a:schemeClr val="lt1"/>
+          </a:fontRef>
+        </p:style>
+        <p:txBody>
+          <a:bodyPr rtlCol="0" anchor="ctr"/>
+          <a:lstStyle/>
+          <a:p>
+            <a:pPr algn="ctr"/>
+            <a:endParaRPr lang="en-US"/>
+          </a:p>
+        </p:txBody>
+      </p:sp>
+      <p:sp>
+        <p:nvSpPr>
+          <p:cNvPr id="14" name="Rectangle 13">
+            <a:extLst>
+              <a:ext uri="{FF2B5EF4-FFF2-40B4-BE49-F238E27FC236}">
+                <a16:creationId xmlns:a16="http://schemas.microsoft.com/office/drawing/2014/main" id="{E12088DD-B1AD-40E0-8B86-1D87A2CCD9BE}"/>
+              </a:ext>
+              <a:ext uri="{C183D7F6-B498-43B3-948B-1728B52AA6E4}">
+                <adec:decorative xmlns:adec="http://schemas.microsoft.com/office/drawing/2017/decorative" val="1"/>
+              </a:ext>
+            </a:extLst>
+          </p:cNvPr>
+          <p:cNvSpPr>
+            <a:spLocks noGrp="1" noRot="1" noChangeAspect="1" noMove="1" noResize="1" noEditPoints="1" noAdjustHandles="1" noChangeArrowheads="1" noChangeShapeType="1" noTextEdit="1"/>
+          </p:cNvSpPr>
+          <p:nvPr>
+            <p:extLst>
+              <p:ext uri="{386F3935-93C4-4BCD-93E2-E3B085C9AB24}">
+                <p16:designElem xmlns:p16="http://schemas.microsoft.com/office/powerpoint/2015/main" val="1"/>
+              </p:ext>
+            </p:extLst>
+          </p:nvPr>
+        </p:nvSpPr>
+        <p:spPr>
+          <a:xfrm rot="5400000" flipH="1">
+            <a:off x="2663054" y="-2653923"/>
+            <a:ext cx="6858001" cy="12165846"/>
+          </a:xfrm>
+          <a:prstGeom prst="rect">
+            <a:avLst/>
+          </a:prstGeom>
+          <a:gradFill>
+            <a:gsLst>
+              <a:gs pos="13000">
+                <a:schemeClr val="accent1">
+                  <a:lumMod val="50000"/>
+                  <a:alpha val="0"/>
+                </a:schemeClr>
+              </a:gs>
+              <a:gs pos="99000">
+                <a:srgbClr val="000000">
+                  <a:alpha val="28000"/>
+                </a:srgbClr>
+              </a:gs>
+            </a:gsLst>
+            <a:lin ang="0" scaled="0"/>
+          </a:gradFill>
+          <a:ln>
+            <a:noFill/>
+          </a:ln>
+        </p:spPr>
+        <p:style>
+          <a:lnRef idx="2">
+            <a:schemeClr val="accent1">
+              <a:shade val="50000"/>
+            </a:schemeClr>
+          </a:lnRef>
+          <a:fillRef idx="1">
+            <a:schemeClr val="accent1"/>
+          </a:fillRef>
+          <a:effectRef idx="0">
+            <a:schemeClr val="accent1"/>
+          </a:effectRef>
+          <a:fontRef idx="minor">
+            <a:schemeClr val="lt1"/>
+          </a:fontRef>
+        </p:style>
+        <p:txBody>
+          <a:bodyPr rtlCol="0" anchor="ctr"/>
+          <a:lstStyle/>
+          <a:p>
+            <a:pPr algn="ctr"/>
+            <a:endParaRPr lang="en-US" dirty="0"/>
+          </a:p>
+        </p:txBody>
+      </p:sp>
+      <p:sp>
+        <p:nvSpPr>
+          <p:cNvPr id="16" name="Rectangle 15">
+            <a:extLst>
+              <a:ext uri="{FF2B5EF4-FFF2-40B4-BE49-F238E27FC236}">
+                <a16:creationId xmlns:a16="http://schemas.microsoft.com/office/drawing/2014/main" id="{C4C9F2B0-1044-46EB-8AEB-C3BFFDE6C2CC}"/>
+              </a:ext>
+              <a:ext uri="{C183D7F6-B498-43B3-948B-1728B52AA6E4}">
+                <adec:decorative xmlns:adec="http://schemas.microsoft.com/office/drawing/2017/decorative" val="1"/>
+              </a:ext>
+            </a:extLst>
+          </p:cNvPr>
+          <p:cNvSpPr>
+            <a:spLocks noGrp="1" noRot="1" noChangeAspect="1" noMove="1" noResize="1" noEditPoints="1" noAdjustHandles="1" noChangeArrowheads="1" noChangeShapeType="1" noTextEdit="1"/>
+          </p:cNvSpPr>
+          <p:nvPr>
+            <p:extLst>
+              <p:ext uri="{386F3935-93C4-4BCD-93E2-E3B085C9AB24}">
+                <p16:designElem xmlns:p16="http://schemas.microsoft.com/office/powerpoint/2015/main" val="1"/>
+              </p:ext>
+            </p:extLst>
+          </p:nvPr>
+        </p:nvSpPr>
+        <p:spPr>
+          <a:xfrm flipH="1">
+            <a:off x="6094763" y="0"/>
+            <a:ext cx="6096001" cy="6858000"/>
+          </a:xfrm>
+          <a:prstGeom prst="rect">
+            <a:avLst/>
+          </a:prstGeom>
+          <a:gradFill>
+            <a:gsLst>
+              <a:gs pos="13000">
+                <a:schemeClr val="accent1">
+                  <a:lumMod val="50000"/>
+                  <a:alpha val="0"/>
+                </a:schemeClr>
+              </a:gs>
+              <a:gs pos="99000">
+                <a:schemeClr val="accent1">
+                  <a:lumMod val="75000"/>
+                  <a:alpha val="50000"/>
+                </a:schemeClr>
+              </a:gs>
+            </a:gsLst>
+            <a:lin ang="6000000" scaled="0"/>
+          </a:gradFill>
+          <a:ln>
+            <a:noFill/>
+          </a:ln>
+        </p:spPr>
+        <p:style>
+          <a:lnRef idx="2">
+            <a:schemeClr val="accent1">
+              <a:shade val="50000"/>
+            </a:schemeClr>
+          </a:lnRef>
+          <a:fillRef idx="1">
+            <a:schemeClr val="accent1"/>
+          </a:fillRef>
+          <a:effectRef idx="0">
+            <a:schemeClr val="accent1"/>
+          </a:effectRef>
+          <a:fontRef idx="minor">
+            <a:schemeClr val="lt1"/>
+          </a:fontRef>
+        </p:style>
+        <p:txBody>
+          <a:bodyPr rtlCol="0" anchor="ctr"/>
+          <a:lstStyle/>
+          <a:p>
+            <a:pPr algn="ctr"/>
+            <a:endParaRPr lang="en-US" dirty="0"/>
+          </a:p>
+        </p:txBody>
+      </p:sp>
+      <p:sp>
+        <p:nvSpPr>
+          <p:cNvPr id="18" name="Rectangle 17">
+            <a:extLst>
+              <a:ext uri="{FF2B5EF4-FFF2-40B4-BE49-F238E27FC236}">
+                <a16:creationId xmlns:a16="http://schemas.microsoft.com/office/drawing/2014/main" id="{0C395952-4E26-45A2-8756-2ADFD6E53C6E}"/>
+              </a:ext>
+              <a:ext uri="{C183D7F6-B498-43B3-948B-1728B52AA6E4}">
+                <adec:decorative xmlns:adec="http://schemas.microsoft.com/office/drawing/2017/decorative" val="1"/>
+              </a:ext>
+            </a:extLst>
+          </p:cNvPr>
+          <p:cNvSpPr>
+            <a:spLocks noGrp="1" noRot="1" noChangeAspect="1" noMove="1" noResize="1" noEditPoints="1" noAdjustHandles="1" noChangeArrowheads="1" noChangeShapeType="1" noTextEdit="1"/>
+          </p:cNvSpPr>
+          <p:nvPr>
+            <p:extLst>
+              <p:ext uri="{386F3935-93C4-4BCD-93E2-E3B085C9AB24}">
+                <p16:designElem xmlns:p16="http://schemas.microsoft.com/office/powerpoint/2015/main" val="1"/>
+              </p:ext>
+            </p:extLst>
+          </p:nvPr>
+        </p:nvSpPr>
+        <p:spPr>
+          <a:xfrm flipH="1">
+            <a:off x="-4" y="-3"/>
+            <a:ext cx="12182871" cy="6871922"/>
+          </a:xfrm>
+          <a:prstGeom prst="rect">
+            <a:avLst/>
+          </a:prstGeom>
+          <a:gradFill>
+            <a:gsLst>
+              <a:gs pos="13000">
+                <a:srgbClr val="000000">
+                  <a:alpha val="35000"/>
+                </a:srgbClr>
+              </a:gs>
+              <a:gs pos="99000">
+                <a:schemeClr val="accent1">
+                  <a:lumMod val="75000"/>
+                  <a:alpha val="0"/>
+                </a:schemeClr>
+              </a:gs>
+            </a:gsLst>
+            <a:lin ang="4800000" scaled="0"/>
+          </a:gradFill>
+          <a:ln>
+            <a:noFill/>
+          </a:ln>
+        </p:spPr>
+        <p:style>
+          <a:lnRef idx="2">
+            <a:schemeClr val="accent1">
+              <a:shade val="50000"/>
+            </a:schemeClr>
+          </a:lnRef>
+          <a:fillRef idx="1">
+            <a:schemeClr val="accent1"/>
+          </a:fillRef>
+          <a:effectRef idx="0">
+            <a:schemeClr val="accent1"/>
+          </a:effectRef>
+          <a:fontRef idx="minor">
+            <a:schemeClr val="lt1"/>
+          </a:fontRef>
+        </p:style>
+        <p:txBody>
+          <a:bodyPr rtlCol="0" anchor="ctr"/>
+          <a:lstStyle/>
+          <a:p>
+            <a:pPr algn="ctr"/>
+            <a:endParaRPr lang="en-US" dirty="0"/>
+          </a:p>
+        </p:txBody>
+      </p:sp>
+      <p:sp>
+        <p:nvSpPr>
+          <p:cNvPr id="20" name="Freeform: Shape 19">
+            <a:extLst>
+              <a:ext uri="{FF2B5EF4-FFF2-40B4-BE49-F238E27FC236}">
+                <a16:creationId xmlns:a16="http://schemas.microsoft.com/office/drawing/2014/main" id="{4734BADF-9461-4621-B112-2D7BABEA7DD0}"/>
+              </a:ext>
+              <a:ext uri="{C183D7F6-B498-43B3-948B-1728B52AA6E4}">
+                <adec:decorative xmlns:adec="http://schemas.microsoft.com/office/drawing/2017/decorative" val="1"/>
+              </a:ext>
+            </a:extLst>
+          </p:cNvPr>
+          <p:cNvSpPr>
+            <a:spLocks noGrp="1" noRot="1" noChangeAspect="1" noMove="1" noResize="1" noEditPoints="1" noAdjustHandles="1" noChangeArrowheads="1" noChangeShapeType="1" noTextEdit="1"/>
+          </p:cNvSpPr>
+          <p:nvPr>
+            <p:extLst>
+              <p:ext uri="{386F3935-93C4-4BCD-93E2-E3B085C9AB24}">
+                <p16:designElem xmlns:p16="http://schemas.microsoft.com/office/powerpoint/2015/main" val="1"/>
+              </p:ext>
+            </p:extLst>
+          </p:nvPr>
+        </p:nvSpPr>
+        <p:spPr>
+          <a:xfrm>
+            <a:off x="987713" y="4049"/>
+            <a:ext cx="10216576" cy="4729040"/>
+          </a:xfrm>
+          <a:custGeom>
+            <a:avLst/>
+            <a:gdLst>
+              <a:gd name="connsiteX0" fmla="*/ 0 w 10216576"/>
+              <a:gd name="connsiteY0" fmla="*/ 0 h 4729040"/>
+              <a:gd name="connsiteX1" fmla="*/ 10216576 w 10216576"/>
+              <a:gd name="connsiteY1" fmla="*/ 0 h 4729040"/>
+              <a:gd name="connsiteX2" fmla="*/ 10210268 w 10216576"/>
+              <a:gd name="connsiteY2" fmla="*/ 124944 h 4729040"/>
+              <a:gd name="connsiteX3" fmla="*/ 5108288 w 10216576"/>
+              <a:gd name="connsiteY3" fmla="*/ 4729040 h 4729040"/>
+              <a:gd name="connsiteX4" fmla="*/ 6309 w 10216576"/>
+              <a:gd name="connsiteY4" fmla="*/ 124944 h 4729040"/>
+            </a:gdLst>
+            <a:ahLst/>
+            <a:cxnLst>
+              <a:cxn ang="0">
+                <a:pos x="connsiteX0" y="connsiteY0"/>
+              </a:cxn>
+              <a:cxn ang="0">
+                <a:pos x="connsiteX1" y="connsiteY1"/>
+              </a:cxn>
+              <a:cxn ang="0">
+                <a:pos x="connsiteX2" y="connsiteY2"/>
+              </a:cxn>
+              <a:cxn ang="0">
+                <a:pos x="connsiteX3" y="connsiteY3"/>
+              </a:cxn>
+              <a:cxn ang="0">
+                <a:pos x="connsiteX4" y="connsiteY4"/>
+              </a:cxn>
+            </a:cxnLst>
+            <a:rect l="l" t="t" r="r" b="b"/>
+            <a:pathLst>
+              <a:path w="10216576" h="4729040">
+                <a:moveTo>
+                  <a:pt x="0" y="0"/>
+                </a:moveTo>
+                <a:lnTo>
+                  <a:pt x="10216576" y="0"/>
+                </a:lnTo>
+                <a:lnTo>
+                  <a:pt x="10210268" y="124944"/>
+                </a:lnTo>
+                <a:cubicBezTo>
+                  <a:pt x="9947637" y="2710997"/>
+                  <a:pt x="7763635" y="4729040"/>
+                  <a:pt x="5108288" y="4729040"/>
+                </a:cubicBezTo>
+                <a:cubicBezTo>
+                  <a:pt x="2452942" y="4729040"/>
+                  <a:pt x="268937" y="2710997"/>
+                  <a:pt x="6309" y="124944"/>
+                </a:cubicBezTo>
+                <a:close/>
+              </a:path>
+            </a:pathLst>
+          </a:custGeom>
+          <a:gradFill>
+            <a:gsLst>
+              <a:gs pos="7000">
+                <a:schemeClr val="accent1">
+                  <a:lumMod val="50000"/>
+                  <a:alpha val="4000"/>
+                </a:schemeClr>
+              </a:gs>
+              <a:gs pos="99000">
+                <a:schemeClr val="accent1">
+                  <a:alpha val="24000"/>
+                </a:schemeClr>
+              </a:gs>
+            </a:gsLst>
+            <a:lin ang="10200000" scaled="0"/>
+          </a:gradFill>
+          <a:ln>
+            <a:noFill/>
+          </a:ln>
+        </p:spPr>
+        <p:style>
+          <a:lnRef idx="2">
+            <a:schemeClr val="accent1">
+              <a:shade val="50000"/>
+            </a:schemeClr>
+          </a:lnRef>
+          <a:fillRef idx="1">
+            <a:schemeClr val="accent1"/>
+          </a:fillRef>
+          <a:effectRef idx="0">
+            <a:schemeClr val="accent1"/>
+          </a:effectRef>
+          <a:fontRef idx="minor">
+            <a:schemeClr val="lt1"/>
+          </a:fontRef>
+        </p:style>
+        <p:txBody>
+          <a:bodyPr wrap="square" rtlCol="0" anchor="ctr">
+            <a:noAutofit/>
+          </a:bodyPr>
+          <a:lstStyle/>
+          <a:p>
+            <a:pPr algn="ctr"/>
+            <a:endParaRPr lang="en-US"/>
+          </a:p>
+        </p:txBody>
+      </p:sp>
+      <p:sp>
+        <p:nvSpPr>
+          <p:cNvPr id="2" name="Cím 1">
+            <a:extLst>
+              <a:ext uri="{FF2B5EF4-FFF2-40B4-BE49-F238E27FC236}">
+                <a16:creationId xmlns:a16="http://schemas.microsoft.com/office/drawing/2014/main" id="{201BAD54-73F1-377B-FA23-5847303D036B}"/>
+              </a:ext>
+            </a:extLst>
+          </p:cNvPr>
+          <p:cNvSpPr>
+            <a:spLocks noGrp="1"/>
+          </p:cNvSpPr>
+          <p:nvPr>
+            <p:ph type="title"/>
+          </p:nvPr>
+        </p:nvSpPr>
+        <p:spPr>
+          <a:xfrm>
+            <a:off x="2026693" y="1030406"/>
+            <a:ext cx="8147713" cy="3081242"/>
+          </a:xfrm>
+        </p:spPr>
+        <p:txBody>
+          <a:bodyPr vert="horz" lIns="91440" tIns="45720" rIns="91440" bIns="45720" rtlCol="0" anchor="ctr">
+            <a:normAutofit/>
+          </a:bodyPr>
+          <a:lstStyle/>
+          <a:p>
+            <a:pPr algn="ctr"/>
+            <a:r>
+              <a:rPr lang="en-US" sz="4800" kern="1200">
+                <a:solidFill>
+                  <a:srgbClr val="FFFFFF"/>
+                </a:solidFill>
+                <a:latin typeface="+mj-lt"/>
+                <a:ea typeface="+mj-ea"/>
+                <a:cs typeface="+mj-cs"/>
+              </a:rPr>
+              <a:t>Thank you for your attention. </a:t>
+            </a:r>
+            <a:r>
+              <a:rPr lang="en-US" sz="4800" kern="1200">
+                <a:solidFill>
+                  <a:srgbClr val="FFFFFF"/>
+                </a:solidFill>
+                <a:latin typeface="+mj-lt"/>
+                <a:ea typeface="+mj-ea"/>
+                <a:cs typeface="+mj-cs"/>
+                <a:sym typeface="Wingdings" pitchFamily="2" charset="2"/>
+              </a:rPr>
+              <a:t></a:t>
+            </a:r>
+            <a:endParaRPr lang="en-US" sz="4800" kern="1200">
+              <a:solidFill>
+                <a:srgbClr val="FFFFFF"/>
+              </a:solidFill>
+              <a:latin typeface="+mj-lt"/>
+              <a:ea typeface="+mj-ea"/>
+              <a:cs typeface="+mj-cs"/>
+            </a:endParaRPr>
+          </a:p>
+        </p:txBody>
+      </p:sp>
+      <p:sp>
+        <p:nvSpPr>
+          <p:cNvPr id="3" name="Tartalom helye 2">
+            <a:extLst>
+              <a:ext uri="{FF2B5EF4-FFF2-40B4-BE49-F238E27FC236}">
+                <a16:creationId xmlns:a16="http://schemas.microsoft.com/office/drawing/2014/main" id="{39742F4C-8F7B-135E-780B-39F5E1FBDE6D}"/>
+              </a:ext>
+            </a:extLst>
+          </p:cNvPr>
+          <p:cNvSpPr>
+            <a:spLocks noGrp="1"/>
+          </p:cNvSpPr>
+          <p:nvPr>
+            <p:ph idx="1"/>
+          </p:nvPr>
+        </p:nvSpPr>
+        <p:spPr>
+          <a:xfrm>
+            <a:off x="1768490" y="2827677"/>
+            <a:ext cx="9078628" cy="860620"/>
+          </a:xfrm>
+        </p:spPr>
+        <p:txBody>
+          <a:bodyPr vert="horz" lIns="91440" tIns="45720" rIns="91440" bIns="45720" rtlCol="0" anchor="ctr">
+            <a:normAutofit/>
+          </a:bodyPr>
+          <a:lstStyle/>
+          <a:p>
+            <a:pPr marL="0" indent="0" algn="ctr">
+              <a:buNone/>
+            </a:pPr>
+            <a:r>
+              <a:rPr lang="en-US" sz="2400" dirty="0">
+                <a:solidFill>
+                  <a:srgbClr val="FFFFFF"/>
+                </a:solidFill>
+              </a:rPr>
+              <a:t>W</a:t>
+            </a:r>
+            <a:r>
+              <a:rPr lang="en-US" sz="2400" kern="1200" dirty="0">
+                <a:solidFill>
+                  <a:srgbClr val="FFFFFF"/>
+                </a:solidFill>
+                <a:latin typeface="+mn-lt"/>
+                <a:ea typeface="+mn-ea"/>
+                <a:cs typeface="+mn-cs"/>
+              </a:rPr>
+              <a:t>e look forward to your questions</a:t>
+            </a:r>
+          </a:p>
+        </p:txBody>
+      </p:sp>
+    </p:spTree>
+    <p:extLst>
+      <p:ext uri="{BB962C8B-B14F-4D97-AF65-F5344CB8AC3E}">
+        <p14:creationId xmlns:p14="http://schemas.microsoft.com/office/powerpoint/2010/main" val="639912028"/>
+      </p:ext>
+    </p:extLst>
+  </p:cSld>
+  <p:clrMapOvr>
+    <a:masterClrMapping/>
+  </p:clrMapOvr>
+  <p:timing>
+    <p:tnLst>
+      <p:par>
+        <p:cTn id="1" dur="indefinite" restart="never" nodeType="tmRoot">
+          <p:childTnLst>
+            <p:seq concurrent="1" nextAc="seek">
+              <p:cTn id="2" dur="indefinite" nodeType="mainSeq">
+                <p:childTnLst>
+                  <p:par>
+                    <p:cTn id="3" fill="hold">
+                      <p:stCondLst>
+                        <p:cond delay="indefinite"/>
+                        <p:cond evt="onBegin" delay="0">
+                          <p:tn val="2"/>
+                        </p:cond>
+                      </p:stCondLst>
+                      <p:childTnLst>
+                        <p:par>
+                          <p:cTn id="4" fill="hold">
+                            <p:stCondLst>
+                              <p:cond delay="0"/>
+                            </p:stCondLst>
+                            <p:childTnLst>
+                              <p:par>
+                                <p:cTn id="5" presetID="10" presetClass="entr" presetSubtype="0" fill="hold" grpId="0" nodeType="withEffect">
+                                  <p:stCondLst>
+                                    <p:cond delay="500"/>
+                                  </p:stCondLst>
+                                  <p:iterate>
+                                    <p:tmPct val="10000"/>
+                                  </p:iterate>
+                                  <p:childTnLst>
+                                    <p:set>
+                                      <p:cBhvr>
+                                        <p:cTn id="6" dur="1" fill="hold">
+                                          <p:stCondLst>
+                                            <p:cond delay="0"/>
+                                          </p:stCondLst>
+                                        </p:cTn>
+                                        <p:tgtEl>
+                                          <p:spTgt spid="2"/>
+                                        </p:tgtEl>
+                                        <p:attrNameLst>
+                                          <p:attrName>style.visibility</p:attrName>
+                                        </p:attrNameLst>
+                                      </p:cBhvr>
+                                      <p:to>
+                                        <p:strVal val="visible"/>
+                                      </p:to>
+                                    </p:set>
+                                    <p:animEffect transition="in" filter="fade">
+                                      <p:cBhvr>
+                                        <p:cTn id="7" dur="700"/>
+                                        <p:tgtEl>
+                                          <p:spTgt spid="2"/>
+                                        </p:tgtEl>
+                                      </p:cBhvr>
+                                    </p:animEffect>
+                                  </p:childTnLst>
+                                </p:cTn>
+                              </p:par>
+                            </p:childTnLst>
+                          </p:cTn>
+                        </p:par>
+                      </p:childTnLst>
+                    </p:cTn>
+                  </p:par>
+                </p:childTnLst>
+              </p:cTn>
+              <p:prevCondLst>
+                <p:cond evt="onPrev" delay="0">
+                  <p:tgtEl>
+                    <p:sldTgt/>
+                  </p:tgtEl>
+                </p:cond>
+              </p:prevCondLst>
+              <p:nextCondLst>
+                <p:cond evt="onNext" delay="0">
+                  <p:tgtEl>
+                    <p:sldTgt/>
+                  </p:tgtEl>
+                </p:cond>
+              </p:nextCondLst>
+            </p:seq>
+          </p:childTnLst>
+        </p:cTn>
+      </p:par>
+    </p:tnLst>
+    <p:bldLst>
+      <p:bldP spid="2" grpId="0"/>
+    </p:bldLst>
+  </p:timing>
 </p:sld>
 </file>
 

</xml_diff>